<commit_message>
=After Experiment V, with the GRU_RGCN on WikiText-2
Former-commit-id: 1165660624c83069d1dc23fab7a37d48d7c92d50 [formerly ec6d5135709892cfd059ddafe38c70d5a5be4370]
Former-commit-id: 9f1ab76329706d24c067297c097c2d1eb9f80cd8
Former-commit-id: ad29fb09b78a4ce660f1b6b127453bf668f20469
</commit_message>
<xml_diff>
--- a/Media/Plan_Task1.pptx
+++ b/Media/Plan_Task1.pptx
@@ -5,8 +5,7 @@
     <p:sldMasterId id="2147483648" r:id="rId1"/>
   </p:sldMasterIdLst>
   <p:sldIdLst>
-    <p:sldId id="256" r:id="rId2"/>
-    <p:sldId id="257" r:id="rId3"/>
+    <p:sldId id="257" r:id="rId2"/>
   </p:sldIdLst>
   <p:sldSz cx="12192000" cy="6858000"/>
   <p:notesSz cx="6858000" cy="9144000"/>
@@ -261,7 +260,7 @@
           <a:lstStyle/>
           <a:p>
             <a:fld id="{803220A4-8895-6D46-A558-2CE2469121C7}" type="datetimeFigureOut">
-              <a:t>10/21/19</a:t>
+              <a:t>3/11/20</a:t>
             </a:fld>
             <a:endParaRPr lang="en-US"/>
           </a:p>
@@ -459,7 +458,7 @@
           <a:lstStyle/>
           <a:p>
             <a:fld id="{803220A4-8895-6D46-A558-2CE2469121C7}" type="datetimeFigureOut">
-              <a:t>10/21/19</a:t>
+              <a:t>3/11/20</a:t>
             </a:fld>
             <a:endParaRPr lang="en-US"/>
           </a:p>
@@ -667,7 +666,7 @@
           <a:lstStyle/>
           <a:p>
             <a:fld id="{803220A4-8895-6D46-A558-2CE2469121C7}" type="datetimeFigureOut">
-              <a:t>10/21/19</a:t>
+              <a:t>3/11/20</a:t>
             </a:fld>
             <a:endParaRPr lang="en-US"/>
           </a:p>
@@ -865,7 +864,7 @@
           <a:lstStyle/>
           <a:p>
             <a:fld id="{803220A4-8895-6D46-A558-2CE2469121C7}" type="datetimeFigureOut">
-              <a:t>10/21/19</a:t>
+              <a:t>3/11/20</a:t>
             </a:fld>
             <a:endParaRPr lang="en-US"/>
           </a:p>
@@ -1139,7 +1138,7 @@
           <a:lstStyle/>
           <a:p>
             <a:fld id="{803220A4-8895-6D46-A558-2CE2469121C7}" type="datetimeFigureOut">
-              <a:t>10/21/19</a:t>
+              <a:t>3/11/20</a:t>
             </a:fld>
             <a:endParaRPr lang="en-US"/>
           </a:p>
@@ -1405,7 +1404,7 @@
           <a:lstStyle/>
           <a:p>
             <a:fld id="{803220A4-8895-6D46-A558-2CE2469121C7}" type="datetimeFigureOut">
-              <a:t>10/21/19</a:t>
+              <a:t>3/11/20</a:t>
             </a:fld>
             <a:endParaRPr lang="en-US"/>
           </a:p>
@@ -1818,7 +1817,7 @@
           <a:lstStyle/>
           <a:p>
             <a:fld id="{803220A4-8895-6D46-A558-2CE2469121C7}" type="datetimeFigureOut">
-              <a:t>10/21/19</a:t>
+              <a:t>3/11/20</a:t>
             </a:fld>
             <a:endParaRPr lang="en-US"/>
           </a:p>
@@ -1958,7 +1957,7 @@
           <a:lstStyle/>
           <a:p>
             <a:fld id="{803220A4-8895-6D46-A558-2CE2469121C7}" type="datetimeFigureOut">
-              <a:t>10/21/19</a:t>
+              <a:t>3/11/20</a:t>
             </a:fld>
             <a:endParaRPr lang="en-US"/>
           </a:p>
@@ -2069,7 +2068,7 @@
           <a:lstStyle/>
           <a:p>
             <a:fld id="{803220A4-8895-6D46-A558-2CE2469121C7}" type="datetimeFigureOut">
-              <a:t>10/21/19</a:t>
+              <a:t>3/11/20</a:t>
             </a:fld>
             <a:endParaRPr lang="en-US"/>
           </a:p>
@@ -2380,7 +2379,7 @@
           <a:lstStyle/>
           <a:p>
             <a:fld id="{803220A4-8895-6D46-A558-2CE2469121C7}" type="datetimeFigureOut">
-              <a:t>10/21/19</a:t>
+              <a:t>3/11/20</a:t>
             </a:fld>
             <a:endParaRPr lang="en-US"/>
           </a:p>
@@ -2667,7 +2666,7 @@
           <a:lstStyle/>
           <a:p>
             <a:fld id="{803220A4-8895-6D46-A558-2CE2469121C7}" type="datetimeFigureOut">
-              <a:t>10/21/19</a:t>
+              <a:t>3/11/20</a:t>
             </a:fld>
             <a:endParaRPr lang="en-US"/>
           </a:p>
@@ -2908,7 +2907,7 @@
           </a:lstStyle>
           <a:p>
             <a:fld id="{803220A4-8895-6D46-A558-2CE2469121C7}" type="datetimeFigureOut">
-              <a:t>10/21/19</a:t>
+              <a:t>3/11/20</a:t>
             </a:fld>
             <a:endParaRPr lang="en-US"/>
           </a:p>
@@ -3326,85 +3325,6 @@
       </p:grpSpPr>
       <p:sp>
         <p:nvSpPr>
-          <p:cNvPr id="4" name="TextBox 3">
-            <a:extLst>
-              <a:ext uri="{FF2B5EF4-FFF2-40B4-BE49-F238E27FC236}">
-                <a16:creationId xmlns:a16="http://schemas.microsoft.com/office/drawing/2014/main" id="{CADB7FCE-5BBD-F647-AEF4-FE633DC2B9F1}"/>
-              </a:ext>
-            </a:extLst>
-          </p:cNvPr>
-          <p:cNvSpPr txBox="1"/>
-          <p:nvPr/>
-        </p:nvSpPr>
-        <p:spPr>
-          <a:xfrm>
-            <a:off x="714632" y="2228671"/>
-            <a:ext cx="10762735" cy="1200329"/>
-          </a:xfrm>
-          <a:prstGeom prst="rect">
-            <a:avLst/>
-          </a:prstGeom>
-          <a:noFill/>
-        </p:spPr>
-        <p:txBody>
-          <a:bodyPr wrap="square" rtlCol="0">
-            <a:spAutoFit/>
-          </a:bodyPr>
-          <a:lstStyle/>
-          <a:p>
-            <a:pPr marL="285750" indent="-285750">
-              <a:buFont typeface="Arial" panose="020B0604020202020204" pitchFamily="34" charset="0"/>
-              <a:buChar char="•"/>
-            </a:pPr>
-            <a:r>
-              <a:rPr lang="en-US" sz="2400"/>
-              <a:t>Objective: Multi-sense Language Model</a:t>
-            </a:r>
-          </a:p>
-          <a:p>
-            <a:pPr marL="285750" indent="-285750">
-              <a:buFont typeface="Arial" panose="020B0604020202020204" pitchFamily="34" charset="0"/>
-              <a:buChar char="•"/>
-            </a:pPr>
-            <a:r>
-              <a:rPr lang="en-US" sz="2400"/>
-              <a:t>Write-Assistant should suggest a sense of a word; it will also be able to link the dictionary definition</a:t>
-            </a:r>
-          </a:p>
-        </p:txBody>
-      </p:sp>
-    </p:spTree>
-    <p:extLst>
-      <p:ext uri="{BB962C8B-B14F-4D97-AF65-F5344CB8AC3E}">
-        <p14:creationId xmlns:p14="http://schemas.microsoft.com/office/powerpoint/2010/main" val="2034077816"/>
-      </p:ext>
-    </p:extLst>
-  </p:cSld>
-  <p:clrMapOvr>
-    <a:masterClrMapping/>
-  </p:clrMapOvr>
-</p:sld>
-</file>
-
-<file path=ppt/slides/slide2.xml><?xml version="1.0" encoding="utf-8"?>
-<p:sld xmlns:a="http://schemas.openxmlformats.org/drawingml/2006/main" xmlns:r="http://schemas.openxmlformats.org/officeDocument/2006/relationships" xmlns:p="http://schemas.openxmlformats.org/presentationml/2006/main">
-  <p:cSld>
-    <p:spTree>
-      <p:nvGrpSpPr>
-        <p:cNvPr id="1" name=""/>
-        <p:cNvGrpSpPr/>
-        <p:nvPr/>
-      </p:nvGrpSpPr>
-      <p:grpSpPr>
-        <a:xfrm>
-          <a:off x="0" y="0"/>
-          <a:ext cx="0" cy="0"/>
-          <a:chOff x="0" y="0"/>
-          <a:chExt cx="0" cy="0"/>
-        </a:xfrm>
-      </p:grpSpPr>
-      <p:sp>
-        <p:nvSpPr>
           <p:cNvPr id="4" name="Hexagon 3">
             <a:extLst>
               <a:ext uri="{FF2B5EF4-FFF2-40B4-BE49-F238E27FC236}">

</xml_diff>

<commit_message>
=v1.0 of SelfAttentionK on Senses
Former-commit-id: 9dde9c2d5516cb8cf1f27662887edffcb52f0575 [formerly 51a6d1f48354a5325bc0f4df4aa6f2b8f700a091]
Former-commit-id: 5df8be0c8f6f5ca11b08e0166baeb07ac1a8704b
Former-commit-id: 53cce58e533c0a3acb74715acbc4e76b8f90c434
</commit_message>
<xml_diff>
--- a/Media/Plan_Task1.pptx
+++ b/Media/Plan_Task1.pptx
@@ -6,6 +6,7 @@
   </p:sldMasterIdLst>
   <p:sldIdLst>
     <p:sldId id="257" r:id="rId2"/>
+    <p:sldId id="258" r:id="rId3"/>
   </p:sldIdLst>
   <p:sldSz cx="12192000" cy="6858000"/>
   <p:notesSz cx="6858000" cy="9144000"/>
@@ -260,7 +261,7 @@
           <a:lstStyle/>
           <a:p>
             <a:fld id="{803220A4-8895-6D46-A558-2CE2469121C7}" type="datetimeFigureOut">
-              <a:t>3/11/20</a:t>
+              <a:t>4/25/20</a:t>
             </a:fld>
             <a:endParaRPr lang="en-US"/>
           </a:p>
@@ -458,7 +459,7 @@
           <a:lstStyle/>
           <a:p>
             <a:fld id="{803220A4-8895-6D46-A558-2CE2469121C7}" type="datetimeFigureOut">
-              <a:t>3/11/20</a:t>
+              <a:t>4/25/20</a:t>
             </a:fld>
             <a:endParaRPr lang="en-US"/>
           </a:p>
@@ -666,7 +667,7 @@
           <a:lstStyle/>
           <a:p>
             <a:fld id="{803220A4-8895-6D46-A558-2CE2469121C7}" type="datetimeFigureOut">
-              <a:t>3/11/20</a:t>
+              <a:t>4/25/20</a:t>
             </a:fld>
             <a:endParaRPr lang="en-US"/>
           </a:p>
@@ -864,7 +865,7 @@
           <a:lstStyle/>
           <a:p>
             <a:fld id="{803220A4-8895-6D46-A558-2CE2469121C7}" type="datetimeFigureOut">
-              <a:t>3/11/20</a:t>
+              <a:t>4/25/20</a:t>
             </a:fld>
             <a:endParaRPr lang="en-US"/>
           </a:p>
@@ -1138,7 +1139,7 @@
           <a:lstStyle/>
           <a:p>
             <a:fld id="{803220A4-8895-6D46-A558-2CE2469121C7}" type="datetimeFigureOut">
-              <a:t>3/11/20</a:t>
+              <a:t>4/25/20</a:t>
             </a:fld>
             <a:endParaRPr lang="en-US"/>
           </a:p>
@@ -1404,7 +1405,7 @@
           <a:lstStyle/>
           <a:p>
             <a:fld id="{803220A4-8895-6D46-A558-2CE2469121C7}" type="datetimeFigureOut">
-              <a:t>3/11/20</a:t>
+              <a:t>4/25/20</a:t>
             </a:fld>
             <a:endParaRPr lang="en-US"/>
           </a:p>
@@ -1817,7 +1818,7 @@
           <a:lstStyle/>
           <a:p>
             <a:fld id="{803220A4-8895-6D46-A558-2CE2469121C7}" type="datetimeFigureOut">
-              <a:t>3/11/20</a:t>
+              <a:t>4/25/20</a:t>
             </a:fld>
             <a:endParaRPr lang="en-US"/>
           </a:p>
@@ -1957,7 +1958,7 @@
           <a:lstStyle/>
           <a:p>
             <a:fld id="{803220A4-8895-6D46-A558-2CE2469121C7}" type="datetimeFigureOut">
-              <a:t>3/11/20</a:t>
+              <a:t>4/25/20</a:t>
             </a:fld>
             <a:endParaRPr lang="en-US"/>
           </a:p>
@@ -2068,7 +2069,7 @@
           <a:lstStyle/>
           <a:p>
             <a:fld id="{803220A4-8895-6D46-A558-2CE2469121C7}" type="datetimeFigureOut">
-              <a:t>3/11/20</a:t>
+              <a:t>4/25/20</a:t>
             </a:fld>
             <a:endParaRPr lang="en-US"/>
           </a:p>
@@ -2379,7 +2380,7 @@
           <a:lstStyle/>
           <a:p>
             <a:fld id="{803220A4-8895-6D46-A558-2CE2469121C7}" type="datetimeFigureOut">
-              <a:t>3/11/20</a:t>
+              <a:t>4/25/20</a:t>
             </a:fld>
             <a:endParaRPr lang="en-US"/>
           </a:p>
@@ -2666,7 +2667,7 @@
           <a:lstStyle/>
           <a:p>
             <a:fld id="{803220A4-8895-6D46-A558-2CE2469121C7}" type="datetimeFigureOut">
-              <a:t>3/11/20</a:t>
+              <a:t>4/25/20</a:t>
             </a:fld>
             <a:endParaRPr lang="en-US"/>
           </a:p>
@@ -2907,7 +2908,7 @@
           </a:lstStyle>
           <a:p>
             <a:fld id="{803220A4-8895-6D46-A558-2CE2469121C7}" type="datetimeFigureOut">
-              <a:t>3/11/20</a:t>
+              <a:t>4/25/20</a:t>
             </a:fld>
             <a:endParaRPr lang="en-US"/>
           </a:p>
@@ -5729,6 +5730,2261 @@
 </p:sld>
 </file>
 
+<file path=ppt/slides/slide2.xml><?xml version="1.0" encoding="utf-8"?>
+<p:sld xmlns:a="http://schemas.openxmlformats.org/drawingml/2006/main" xmlns:r="http://schemas.openxmlformats.org/officeDocument/2006/relationships" xmlns:p="http://schemas.openxmlformats.org/presentationml/2006/main">
+  <p:cSld>
+    <p:spTree>
+      <p:nvGrpSpPr>
+        <p:cNvPr id="1" name=""/>
+        <p:cNvGrpSpPr/>
+        <p:nvPr/>
+      </p:nvGrpSpPr>
+      <p:grpSpPr>
+        <a:xfrm>
+          <a:off x="0" y="0"/>
+          <a:ext cx="0" cy="0"/>
+          <a:chOff x="0" y="0"/>
+          <a:chExt cx="0" cy="0"/>
+        </a:xfrm>
+      </p:grpSpPr>
+      <p:sp>
+        <p:nvSpPr>
+          <p:cNvPr id="4" name="Hexagon 3">
+            <a:extLst>
+              <a:ext uri="{FF2B5EF4-FFF2-40B4-BE49-F238E27FC236}">
+                <a16:creationId xmlns:a16="http://schemas.microsoft.com/office/drawing/2014/main" id="{23CB137D-5BB4-1242-8225-A9DF14533DE8}"/>
+              </a:ext>
+            </a:extLst>
+          </p:cNvPr>
+          <p:cNvSpPr/>
+          <p:nvPr/>
+        </p:nvSpPr>
+        <p:spPr>
+          <a:xfrm>
+            <a:off x="2646808" y="1980170"/>
+            <a:ext cx="1234161" cy="819668"/>
+          </a:xfrm>
+          <a:prstGeom prst="hexagon">
+            <a:avLst/>
+          </a:prstGeom>
+        </p:spPr>
+        <p:style>
+          <a:lnRef idx="1">
+            <a:schemeClr val="accent6"/>
+          </a:lnRef>
+          <a:fillRef idx="2">
+            <a:schemeClr val="accent6"/>
+          </a:fillRef>
+          <a:effectRef idx="1">
+            <a:schemeClr val="accent6"/>
+          </a:effectRef>
+          <a:fontRef idx="minor">
+            <a:schemeClr val="dk1"/>
+          </a:fontRef>
+        </p:style>
+        <p:txBody>
+          <a:bodyPr rtlCol="0" anchor="ctr"/>
+          <a:lstStyle/>
+          <a:p>
+            <a:pPr algn="ctr"/>
+            <a:r>
+              <a:rPr lang="en-US"/>
+              <a:t>move.n.1</a:t>
+            </a:r>
+          </a:p>
+        </p:txBody>
+      </p:sp>
+      <p:sp>
+        <p:nvSpPr>
+          <p:cNvPr id="5" name="Hexagon 4">
+            <a:extLst>
+              <a:ext uri="{FF2B5EF4-FFF2-40B4-BE49-F238E27FC236}">
+                <a16:creationId xmlns:a16="http://schemas.microsoft.com/office/drawing/2014/main" id="{737AC331-5BBD-FA48-A45D-777447720597}"/>
+              </a:ext>
+            </a:extLst>
+          </p:cNvPr>
+          <p:cNvSpPr/>
+          <p:nvPr/>
+        </p:nvSpPr>
+        <p:spPr>
+          <a:xfrm>
+            <a:off x="7789443" y="2134278"/>
+            <a:ext cx="1243912" cy="819667"/>
+          </a:xfrm>
+          <a:prstGeom prst="hexagon">
+            <a:avLst/>
+          </a:prstGeom>
+        </p:spPr>
+        <p:style>
+          <a:lnRef idx="1">
+            <a:schemeClr val="accent6"/>
+          </a:lnRef>
+          <a:fillRef idx="2">
+            <a:schemeClr val="accent6"/>
+          </a:fillRef>
+          <a:effectRef idx="1">
+            <a:schemeClr val="accent6"/>
+          </a:effectRef>
+          <a:fontRef idx="minor">
+            <a:schemeClr val="dk1"/>
+          </a:fontRef>
+        </p:style>
+        <p:txBody>
+          <a:bodyPr rtlCol="0" anchor="ctr"/>
+          <a:lstStyle/>
+          <a:p>
+            <a:pPr algn="ctr"/>
+            <a:r>
+              <a:rPr lang="en-US"/>
+              <a:t>Move.v.2</a:t>
+            </a:r>
+          </a:p>
+        </p:txBody>
+      </p:sp>
+      <p:sp>
+        <p:nvSpPr>
+          <p:cNvPr id="6" name="Hexagon 5">
+            <a:extLst>
+              <a:ext uri="{FF2B5EF4-FFF2-40B4-BE49-F238E27FC236}">
+                <a16:creationId xmlns:a16="http://schemas.microsoft.com/office/drawing/2014/main" id="{C8F0319D-7AA5-824D-BFDE-D271CAAF9E88}"/>
+              </a:ext>
+            </a:extLst>
+          </p:cNvPr>
+          <p:cNvSpPr/>
+          <p:nvPr/>
+        </p:nvSpPr>
+        <p:spPr>
+          <a:xfrm>
+            <a:off x="6070555" y="461321"/>
+            <a:ext cx="1243912" cy="704335"/>
+          </a:xfrm>
+          <a:prstGeom prst="hexagon">
+            <a:avLst/>
+          </a:prstGeom>
+        </p:spPr>
+        <p:style>
+          <a:lnRef idx="1">
+            <a:schemeClr val="accent6"/>
+          </a:lnRef>
+          <a:fillRef idx="2">
+            <a:schemeClr val="accent6"/>
+          </a:fillRef>
+          <a:effectRef idx="1">
+            <a:schemeClr val="accent6"/>
+          </a:effectRef>
+          <a:fontRef idx="minor">
+            <a:schemeClr val="dk1"/>
+          </a:fontRef>
+        </p:style>
+        <p:txBody>
+          <a:bodyPr rtlCol="0" anchor="ctr"/>
+          <a:lstStyle/>
+          <a:p>
+            <a:pPr algn="ctr"/>
+            <a:r>
+              <a:rPr lang="en-US"/>
+              <a:t>move.5</a:t>
+            </a:r>
+          </a:p>
+        </p:txBody>
+      </p:sp>
+      <p:sp>
+        <p:nvSpPr>
+          <p:cNvPr id="7" name="Oval 6">
+            <a:extLst>
+              <a:ext uri="{FF2B5EF4-FFF2-40B4-BE49-F238E27FC236}">
+                <a16:creationId xmlns:a16="http://schemas.microsoft.com/office/drawing/2014/main" id="{EAF0B2C6-3FB8-494B-A72B-E60CB3D27B58}"/>
+              </a:ext>
+            </a:extLst>
+          </p:cNvPr>
+          <p:cNvSpPr/>
+          <p:nvPr/>
+        </p:nvSpPr>
+        <p:spPr>
+          <a:xfrm>
+            <a:off x="1359297" y="498392"/>
+            <a:ext cx="889686" cy="704335"/>
+          </a:xfrm>
+          <a:prstGeom prst="ellipse">
+            <a:avLst/>
+          </a:prstGeom>
+        </p:spPr>
+        <p:style>
+          <a:lnRef idx="1">
+            <a:schemeClr val="accent5"/>
+          </a:lnRef>
+          <a:fillRef idx="2">
+            <a:schemeClr val="accent5"/>
+          </a:fillRef>
+          <a:effectRef idx="1">
+            <a:schemeClr val="accent5"/>
+          </a:effectRef>
+          <a:fontRef idx="minor">
+            <a:schemeClr val="dk1"/>
+          </a:fontRef>
+        </p:style>
+        <p:txBody>
+          <a:bodyPr rtlCol="0" anchor="ctr"/>
+          <a:lstStyle/>
+          <a:p>
+            <a:pPr algn="ctr"/>
+            <a:r>
+              <a:rPr lang="en-US"/>
+              <a:t>Def. 1,1</a:t>
+            </a:r>
+          </a:p>
+        </p:txBody>
+      </p:sp>
+      <p:sp>
+        <p:nvSpPr>
+          <p:cNvPr id="8" name="Oval 7">
+            <a:extLst>
+              <a:ext uri="{FF2B5EF4-FFF2-40B4-BE49-F238E27FC236}">
+                <a16:creationId xmlns:a16="http://schemas.microsoft.com/office/drawing/2014/main" id="{94D6FCF9-1A7F-A142-BB51-AB185300A51C}"/>
+              </a:ext>
+            </a:extLst>
+          </p:cNvPr>
+          <p:cNvSpPr/>
+          <p:nvPr/>
+        </p:nvSpPr>
+        <p:spPr>
+          <a:xfrm>
+            <a:off x="2407032" y="741412"/>
+            <a:ext cx="889686" cy="704335"/>
+          </a:xfrm>
+          <a:prstGeom prst="ellipse">
+            <a:avLst/>
+          </a:prstGeom>
+        </p:spPr>
+        <p:style>
+          <a:lnRef idx="1">
+            <a:schemeClr val="accent5"/>
+          </a:lnRef>
+          <a:fillRef idx="2">
+            <a:schemeClr val="accent5"/>
+          </a:fillRef>
+          <a:effectRef idx="1">
+            <a:schemeClr val="accent5"/>
+          </a:effectRef>
+          <a:fontRef idx="minor">
+            <a:schemeClr val="dk1"/>
+          </a:fontRef>
+        </p:style>
+        <p:txBody>
+          <a:bodyPr rtlCol="0" anchor="ctr"/>
+          <a:lstStyle/>
+          <a:p>
+            <a:pPr algn="ctr"/>
+            <a:r>
+              <a:rPr lang="en-US"/>
+              <a:t>Def. 1,2</a:t>
+            </a:r>
+          </a:p>
+        </p:txBody>
+      </p:sp>
+      <p:sp>
+        <p:nvSpPr>
+          <p:cNvPr id="9" name="Oval 8">
+            <a:extLst>
+              <a:ext uri="{FF2B5EF4-FFF2-40B4-BE49-F238E27FC236}">
+                <a16:creationId xmlns:a16="http://schemas.microsoft.com/office/drawing/2014/main" id="{2790D075-13C2-C347-9403-0740D4F65874}"/>
+              </a:ext>
+            </a:extLst>
+          </p:cNvPr>
+          <p:cNvSpPr/>
+          <p:nvPr/>
+        </p:nvSpPr>
+        <p:spPr>
+          <a:xfrm>
+            <a:off x="3866930" y="461321"/>
+            <a:ext cx="889686" cy="704335"/>
+          </a:xfrm>
+          <a:prstGeom prst="ellipse">
+            <a:avLst/>
+          </a:prstGeom>
+        </p:spPr>
+        <p:style>
+          <a:lnRef idx="1">
+            <a:schemeClr val="accent5"/>
+          </a:lnRef>
+          <a:fillRef idx="2">
+            <a:schemeClr val="accent5"/>
+          </a:fillRef>
+          <a:effectRef idx="1">
+            <a:schemeClr val="accent5"/>
+          </a:effectRef>
+          <a:fontRef idx="minor">
+            <a:schemeClr val="dk1"/>
+          </a:fontRef>
+        </p:style>
+        <p:txBody>
+          <a:bodyPr rtlCol="0" anchor="ctr"/>
+          <a:lstStyle/>
+          <a:p>
+            <a:pPr algn="ctr"/>
+            <a:r>
+              <a:rPr lang="en-US"/>
+              <a:t>Def. 1,8</a:t>
+            </a:r>
+          </a:p>
+        </p:txBody>
+      </p:sp>
+      <p:sp>
+        <p:nvSpPr>
+          <p:cNvPr id="10" name="Oval 9">
+            <a:extLst>
+              <a:ext uri="{FF2B5EF4-FFF2-40B4-BE49-F238E27FC236}">
+                <a16:creationId xmlns:a16="http://schemas.microsoft.com/office/drawing/2014/main" id="{FB1EEE0F-550B-0240-B3E5-35DDEF14A90F}"/>
+              </a:ext>
+            </a:extLst>
+          </p:cNvPr>
+          <p:cNvSpPr/>
+          <p:nvPr/>
+        </p:nvSpPr>
+        <p:spPr>
+          <a:xfrm>
+            <a:off x="7731506" y="710341"/>
+            <a:ext cx="889686" cy="704335"/>
+          </a:xfrm>
+          <a:prstGeom prst="ellipse">
+            <a:avLst/>
+          </a:prstGeom>
+        </p:spPr>
+        <p:style>
+          <a:lnRef idx="1">
+            <a:schemeClr val="accent5"/>
+          </a:lnRef>
+          <a:fillRef idx="2">
+            <a:schemeClr val="accent5"/>
+          </a:fillRef>
+          <a:effectRef idx="1">
+            <a:schemeClr val="accent5"/>
+          </a:effectRef>
+          <a:fontRef idx="minor">
+            <a:schemeClr val="dk1"/>
+          </a:fontRef>
+        </p:style>
+        <p:txBody>
+          <a:bodyPr rtlCol="0" anchor="ctr"/>
+          <a:lstStyle/>
+          <a:p>
+            <a:pPr algn="ctr"/>
+            <a:r>
+              <a:rPr lang="en-US"/>
+              <a:t>Def. 2,1</a:t>
+            </a:r>
+          </a:p>
+        </p:txBody>
+      </p:sp>
+      <p:sp>
+        <p:nvSpPr>
+          <p:cNvPr id="11" name="Oval 10">
+            <a:extLst>
+              <a:ext uri="{FF2B5EF4-FFF2-40B4-BE49-F238E27FC236}">
+                <a16:creationId xmlns:a16="http://schemas.microsoft.com/office/drawing/2014/main" id="{C6BE791C-99A4-8F4D-A04C-05B295A62934}"/>
+              </a:ext>
+            </a:extLst>
+          </p:cNvPr>
+          <p:cNvSpPr/>
+          <p:nvPr/>
+        </p:nvSpPr>
+        <p:spPr>
+          <a:xfrm>
+            <a:off x="8826110" y="1062508"/>
+            <a:ext cx="889686" cy="704335"/>
+          </a:xfrm>
+          <a:prstGeom prst="ellipse">
+            <a:avLst/>
+          </a:prstGeom>
+        </p:spPr>
+        <p:style>
+          <a:lnRef idx="1">
+            <a:schemeClr val="accent5"/>
+          </a:lnRef>
+          <a:fillRef idx="2">
+            <a:schemeClr val="accent5"/>
+          </a:fillRef>
+          <a:effectRef idx="1">
+            <a:schemeClr val="accent5"/>
+          </a:effectRef>
+          <a:fontRef idx="minor">
+            <a:schemeClr val="dk1"/>
+          </a:fontRef>
+        </p:style>
+        <p:txBody>
+          <a:bodyPr rtlCol="0" anchor="ctr"/>
+          <a:lstStyle/>
+          <a:p>
+            <a:pPr algn="ctr"/>
+            <a:r>
+              <a:rPr lang="en-US"/>
+              <a:t>Def. 2,2</a:t>
+            </a:r>
+          </a:p>
+        </p:txBody>
+      </p:sp>
+      <p:sp>
+        <p:nvSpPr>
+          <p:cNvPr id="12" name="Oval 11">
+            <a:extLst>
+              <a:ext uri="{FF2B5EF4-FFF2-40B4-BE49-F238E27FC236}">
+                <a16:creationId xmlns:a16="http://schemas.microsoft.com/office/drawing/2014/main" id="{E933661C-109E-2846-9B9C-81D797E03499}"/>
+              </a:ext>
+            </a:extLst>
+          </p:cNvPr>
+          <p:cNvSpPr/>
+          <p:nvPr/>
+        </p:nvSpPr>
+        <p:spPr>
+          <a:xfrm>
+            <a:off x="1771636" y="2982093"/>
+            <a:ext cx="889686" cy="704335"/>
+          </a:xfrm>
+          <a:prstGeom prst="ellipse">
+            <a:avLst/>
+          </a:prstGeom>
+        </p:spPr>
+        <p:style>
+          <a:lnRef idx="1">
+            <a:schemeClr val="accent5"/>
+          </a:lnRef>
+          <a:fillRef idx="3">
+            <a:schemeClr val="accent5"/>
+          </a:fillRef>
+          <a:effectRef idx="2">
+            <a:schemeClr val="accent5"/>
+          </a:effectRef>
+          <a:fontRef idx="minor">
+            <a:schemeClr val="lt1"/>
+          </a:fontRef>
+        </p:style>
+        <p:txBody>
+          <a:bodyPr rtlCol="0" anchor="ctr"/>
+          <a:lstStyle/>
+          <a:p>
+            <a:pPr algn="ctr"/>
+            <a:r>
+              <a:rPr lang="en-US"/>
+              <a:t>Ex. 1,1</a:t>
+            </a:r>
+          </a:p>
+        </p:txBody>
+      </p:sp>
+      <p:sp>
+        <p:nvSpPr>
+          <p:cNvPr id="13" name="Oval 12">
+            <a:extLst>
+              <a:ext uri="{FF2B5EF4-FFF2-40B4-BE49-F238E27FC236}">
+                <a16:creationId xmlns:a16="http://schemas.microsoft.com/office/drawing/2014/main" id="{BB407A9B-2A37-6B45-B74A-F806A97AB9C4}"/>
+              </a:ext>
+            </a:extLst>
+          </p:cNvPr>
+          <p:cNvSpPr/>
+          <p:nvPr/>
+        </p:nvSpPr>
+        <p:spPr>
+          <a:xfrm>
+            <a:off x="2912576" y="3519612"/>
+            <a:ext cx="889686" cy="704335"/>
+          </a:xfrm>
+          <a:prstGeom prst="ellipse">
+            <a:avLst/>
+          </a:prstGeom>
+        </p:spPr>
+        <p:style>
+          <a:lnRef idx="1">
+            <a:schemeClr val="accent5"/>
+          </a:lnRef>
+          <a:fillRef idx="3">
+            <a:schemeClr val="accent5"/>
+          </a:fillRef>
+          <a:effectRef idx="2">
+            <a:schemeClr val="accent5"/>
+          </a:effectRef>
+          <a:fontRef idx="minor">
+            <a:schemeClr val="lt1"/>
+          </a:fontRef>
+        </p:style>
+        <p:txBody>
+          <a:bodyPr rtlCol="0" anchor="ctr"/>
+          <a:lstStyle/>
+          <a:p>
+            <a:pPr algn="ctr"/>
+            <a:r>
+              <a:rPr lang="en-US"/>
+              <a:t>Ex. 1,2</a:t>
+            </a:r>
+          </a:p>
+        </p:txBody>
+      </p:sp>
+      <p:sp>
+        <p:nvSpPr>
+          <p:cNvPr id="14" name="Oval 13">
+            <a:extLst>
+              <a:ext uri="{FF2B5EF4-FFF2-40B4-BE49-F238E27FC236}">
+                <a16:creationId xmlns:a16="http://schemas.microsoft.com/office/drawing/2014/main" id="{1928B82E-10EB-9B4C-9051-35858A549285}"/>
+              </a:ext>
+            </a:extLst>
+          </p:cNvPr>
+          <p:cNvSpPr/>
+          <p:nvPr/>
+        </p:nvSpPr>
+        <p:spPr>
+          <a:xfrm>
+            <a:off x="3880969" y="4304278"/>
+            <a:ext cx="889686" cy="704335"/>
+          </a:xfrm>
+          <a:prstGeom prst="ellipse">
+            <a:avLst/>
+          </a:prstGeom>
+        </p:spPr>
+        <p:style>
+          <a:lnRef idx="1">
+            <a:schemeClr val="accent5"/>
+          </a:lnRef>
+          <a:fillRef idx="3">
+            <a:schemeClr val="accent5"/>
+          </a:fillRef>
+          <a:effectRef idx="2">
+            <a:schemeClr val="accent5"/>
+          </a:effectRef>
+          <a:fontRef idx="minor">
+            <a:schemeClr val="lt1"/>
+          </a:fontRef>
+        </p:style>
+        <p:txBody>
+          <a:bodyPr rtlCol="0" anchor="ctr"/>
+          <a:lstStyle/>
+          <a:p>
+            <a:pPr algn="ctr"/>
+            <a:r>
+              <a:rPr lang="en-US"/>
+              <a:t>Ex. 1,10</a:t>
+            </a:r>
+          </a:p>
+        </p:txBody>
+      </p:sp>
+      <p:sp>
+        <p:nvSpPr>
+          <p:cNvPr id="15" name="Oval 14">
+            <a:extLst>
+              <a:ext uri="{FF2B5EF4-FFF2-40B4-BE49-F238E27FC236}">
+                <a16:creationId xmlns:a16="http://schemas.microsoft.com/office/drawing/2014/main" id="{4B3A3DA1-3524-6947-AEC8-7B51B2E19083}"/>
+              </a:ext>
+            </a:extLst>
+          </p:cNvPr>
+          <p:cNvSpPr/>
+          <p:nvPr/>
+        </p:nvSpPr>
+        <p:spPr>
+          <a:xfrm>
+            <a:off x="7240325" y="3371164"/>
+            <a:ext cx="889686" cy="704335"/>
+          </a:xfrm>
+          <a:prstGeom prst="ellipse">
+            <a:avLst/>
+          </a:prstGeom>
+        </p:spPr>
+        <p:style>
+          <a:lnRef idx="1">
+            <a:schemeClr val="accent5"/>
+          </a:lnRef>
+          <a:fillRef idx="3">
+            <a:schemeClr val="accent5"/>
+          </a:fillRef>
+          <a:effectRef idx="2">
+            <a:schemeClr val="accent5"/>
+          </a:effectRef>
+          <a:fontRef idx="minor">
+            <a:schemeClr val="lt1"/>
+          </a:fontRef>
+        </p:style>
+        <p:txBody>
+          <a:bodyPr rtlCol="0" anchor="ctr"/>
+          <a:lstStyle/>
+          <a:p>
+            <a:pPr algn="ctr"/>
+            <a:r>
+              <a:rPr lang="en-US"/>
+              <a:t>Ex. 2,1</a:t>
+            </a:r>
+          </a:p>
+        </p:txBody>
+      </p:sp>
+      <p:sp>
+        <p:nvSpPr>
+          <p:cNvPr id="16" name="Oval 15">
+            <a:extLst>
+              <a:ext uri="{FF2B5EF4-FFF2-40B4-BE49-F238E27FC236}">
+                <a16:creationId xmlns:a16="http://schemas.microsoft.com/office/drawing/2014/main" id="{34646155-B817-374A-A232-C0B892632DB7}"/>
+              </a:ext>
+            </a:extLst>
+          </p:cNvPr>
+          <p:cNvSpPr/>
+          <p:nvPr/>
+        </p:nvSpPr>
+        <p:spPr>
+          <a:xfrm>
+            <a:off x="8284986" y="3869558"/>
+            <a:ext cx="889686" cy="704335"/>
+          </a:xfrm>
+          <a:prstGeom prst="ellipse">
+            <a:avLst/>
+          </a:prstGeom>
+        </p:spPr>
+        <p:style>
+          <a:lnRef idx="1">
+            <a:schemeClr val="accent5"/>
+          </a:lnRef>
+          <a:fillRef idx="3">
+            <a:schemeClr val="accent5"/>
+          </a:fillRef>
+          <a:effectRef idx="2">
+            <a:schemeClr val="accent5"/>
+          </a:effectRef>
+          <a:fontRef idx="minor">
+            <a:schemeClr val="lt1"/>
+          </a:fontRef>
+        </p:style>
+        <p:txBody>
+          <a:bodyPr rtlCol="0" anchor="ctr"/>
+          <a:lstStyle/>
+          <a:p>
+            <a:pPr algn="ctr"/>
+            <a:r>
+              <a:rPr lang="en-US"/>
+              <a:t>Ex. 2,2</a:t>
+            </a:r>
+          </a:p>
+        </p:txBody>
+      </p:sp>
+      <p:cxnSp>
+        <p:nvCxnSpPr>
+          <p:cNvPr id="19" name="Straight Arrow Connector 18">
+            <a:extLst>
+              <a:ext uri="{FF2B5EF4-FFF2-40B4-BE49-F238E27FC236}">
+                <a16:creationId xmlns:a16="http://schemas.microsoft.com/office/drawing/2014/main" id="{57242243-82A7-9E4D-BE25-79B9DDF8054D}"/>
+              </a:ext>
+            </a:extLst>
+          </p:cNvPr>
+          <p:cNvCxnSpPr>
+            <a:cxnSpLocks/>
+            <a:stCxn id="7" idx="5"/>
+            <a:endCxn id="4" idx="4"/>
+          </p:cNvCxnSpPr>
+          <p:nvPr/>
+        </p:nvCxnSpPr>
+        <p:spPr>
+          <a:xfrm>
+            <a:off x="2118692" y="1099580"/>
+            <a:ext cx="733033" cy="880590"/>
+          </a:xfrm>
+          <a:prstGeom prst="straightConnector1">
+            <a:avLst/>
+          </a:prstGeom>
+          <a:ln>
+            <a:tailEnd type="triangle"/>
+          </a:ln>
+        </p:spPr>
+        <p:style>
+          <a:lnRef idx="1">
+            <a:schemeClr val="accent1"/>
+          </a:lnRef>
+          <a:fillRef idx="0">
+            <a:schemeClr val="accent1"/>
+          </a:fillRef>
+          <a:effectRef idx="0">
+            <a:schemeClr val="accent1"/>
+          </a:effectRef>
+          <a:fontRef idx="minor">
+            <a:schemeClr val="tx1"/>
+          </a:fontRef>
+        </p:style>
+      </p:cxnSp>
+      <p:cxnSp>
+        <p:nvCxnSpPr>
+          <p:cNvPr id="21" name="Straight Arrow Connector 20">
+            <a:extLst>
+              <a:ext uri="{FF2B5EF4-FFF2-40B4-BE49-F238E27FC236}">
+                <a16:creationId xmlns:a16="http://schemas.microsoft.com/office/drawing/2014/main" id="{2CC2FD02-87A6-7445-B7DF-8DA0E85D885E}"/>
+              </a:ext>
+            </a:extLst>
+          </p:cNvPr>
+          <p:cNvCxnSpPr>
+            <a:cxnSpLocks/>
+            <a:stCxn id="8" idx="4"/>
+            <a:endCxn id="4" idx="4"/>
+          </p:cNvCxnSpPr>
+          <p:nvPr/>
+        </p:nvCxnSpPr>
+        <p:spPr>
+          <a:xfrm flipH="1">
+            <a:off x="2851725" y="1445747"/>
+            <a:ext cx="150" cy="534423"/>
+          </a:xfrm>
+          <a:prstGeom prst="straightConnector1">
+            <a:avLst/>
+          </a:prstGeom>
+          <a:ln>
+            <a:tailEnd type="triangle"/>
+          </a:ln>
+        </p:spPr>
+        <p:style>
+          <a:lnRef idx="1">
+            <a:schemeClr val="accent1"/>
+          </a:lnRef>
+          <a:fillRef idx="0">
+            <a:schemeClr val="accent1"/>
+          </a:fillRef>
+          <a:effectRef idx="0">
+            <a:schemeClr val="accent1"/>
+          </a:effectRef>
+          <a:fontRef idx="minor">
+            <a:schemeClr val="tx1"/>
+          </a:fontRef>
+        </p:style>
+      </p:cxnSp>
+      <p:cxnSp>
+        <p:nvCxnSpPr>
+          <p:cNvPr id="24" name="Straight Arrow Connector 23">
+            <a:extLst>
+              <a:ext uri="{FF2B5EF4-FFF2-40B4-BE49-F238E27FC236}">
+                <a16:creationId xmlns:a16="http://schemas.microsoft.com/office/drawing/2014/main" id="{DD9DE5AF-DBCF-A840-9FFE-B8472BE61B06}"/>
+              </a:ext>
+            </a:extLst>
+          </p:cNvPr>
+          <p:cNvCxnSpPr>
+            <a:cxnSpLocks/>
+            <a:stCxn id="9" idx="3"/>
+            <a:endCxn id="4" idx="5"/>
+          </p:cNvCxnSpPr>
+          <p:nvPr/>
+        </p:nvCxnSpPr>
+        <p:spPr>
+          <a:xfrm flipH="1">
+            <a:off x="3676052" y="1062509"/>
+            <a:ext cx="321169" cy="917661"/>
+          </a:xfrm>
+          <a:prstGeom prst="straightConnector1">
+            <a:avLst/>
+          </a:prstGeom>
+          <a:ln>
+            <a:tailEnd type="triangle"/>
+          </a:ln>
+        </p:spPr>
+        <p:style>
+          <a:lnRef idx="1">
+            <a:schemeClr val="accent1"/>
+          </a:lnRef>
+          <a:fillRef idx="0">
+            <a:schemeClr val="accent1"/>
+          </a:fillRef>
+          <a:effectRef idx="0">
+            <a:schemeClr val="accent1"/>
+          </a:effectRef>
+          <a:fontRef idx="minor">
+            <a:schemeClr val="tx1"/>
+          </a:fontRef>
+        </p:style>
+      </p:cxnSp>
+      <p:cxnSp>
+        <p:nvCxnSpPr>
+          <p:cNvPr id="26" name="Straight Arrow Connector 25">
+            <a:extLst>
+              <a:ext uri="{FF2B5EF4-FFF2-40B4-BE49-F238E27FC236}">
+                <a16:creationId xmlns:a16="http://schemas.microsoft.com/office/drawing/2014/main" id="{BFC77110-2ABC-564B-B7D2-77DA3A0028E0}"/>
+              </a:ext>
+            </a:extLst>
+          </p:cNvPr>
+          <p:cNvCxnSpPr>
+            <a:cxnSpLocks/>
+            <a:stCxn id="10" idx="3"/>
+            <a:endCxn id="5" idx="4"/>
+          </p:cNvCxnSpPr>
+          <p:nvPr/>
+        </p:nvCxnSpPr>
+        <p:spPr>
+          <a:xfrm>
+            <a:off x="7861797" y="1311529"/>
+            <a:ext cx="132563" cy="822749"/>
+          </a:xfrm>
+          <a:prstGeom prst="straightConnector1">
+            <a:avLst/>
+          </a:prstGeom>
+          <a:ln>
+            <a:tailEnd type="triangle"/>
+          </a:ln>
+        </p:spPr>
+        <p:style>
+          <a:lnRef idx="1">
+            <a:schemeClr val="accent1"/>
+          </a:lnRef>
+          <a:fillRef idx="0">
+            <a:schemeClr val="accent1"/>
+          </a:fillRef>
+          <a:effectRef idx="0">
+            <a:schemeClr val="accent1"/>
+          </a:effectRef>
+          <a:fontRef idx="minor">
+            <a:schemeClr val="tx1"/>
+          </a:fontRef>
+        </p:style>
+      </p:cxnSp>
+      <p:cxnSp>
+        <p:nvCxnSpPr>
+          <p:cNvPr id="28" name="Straight Arrow Connector 27">
+            <a:extLst>
+              <a:ext uri="{FF2B5EF4-FFF2-40B4-BE49-F238E27FC236}">
+                <a16:creationId xmlns:a16="http://schemas.microsoft.com/office/drawing/2014/main" id="{14B706C4-1BA8-C241-8C6A-756B362B5039}"/>
+              </a:ext>
+            </a:extLst>
+          </p:cNvPr>
+          <p:cNvCxnSpPr>
+            <a:cxnSpLocks/>
+            <a:stCxn id="11" idx="3"/>
+            <a:endCxn id="5" idx="5"/>
+          </p:cNvCxnSpPr>
+          <p:nvPr/>
+        </p:nvCxnSpPr>
+        <p:spPr>
+          <a:xfrm flipH="1">
+            <a:off x="8828438" y="1663696"/>
+            <a:ext cx="127963" cy="470582"/>
+          </a:xfrm>
+          <a:prstGeom prst="straightConnector1">
+            <a:avLst/>
+          </a:prstGeom>
+          <a:ln>
+            <a:tailEnd type="triangle"/>
+          </a:ln>
+        </p:spPr>
+        <p:style>
+          <a:lnRef idx="1">
+            <a:schemeClr val="accent1"/>
+          </a:lnRef>
+          <a:fillRef idx="0">
+            <a:schemeClr val="accent1"/>
+          </a:fillRef>
+          <a:effectRef idx="0">
+            <a:schemeClr val="accent1"/>
+          </a:effectRef>
+          <a:fontRef idx="minor">
+            <a:schemeClr val="tx1"/>
+          </a:fontRef>
+        </p:style>
+      </p:cxnSp>
+      <p:cxnSp>
+        <p:nvCxnSpPr>
+          <p:cNvPr id="30" name="Straight Arrow Connector 29">
+            <a:extLst>
+              <a:ext uri="{FF2B5EF4-FFF2-40B4-BE49-F238E27FC236}">
+                <a16:creationId xmlns:a16="http://schemas.microsoft.com/office/drawing/2014/main" id="{3B5E2498-3C53-6349-B0E1-85D186CEF882}"/>
+              </a:ext>
+            </a:extLst>
+          </p:cNvPr>
+          <p:cNvCxnSpPr>
+            <a:cxnSpLocks/>
+            <a:stCxn id="12" idx="0"/>
+            <a:endCxn id="4" idx="2"/>
+          </p:cNvCxnSpPr>
+          <p:nvPr/>
+        </p:nvCxnSpPr>
+        <p:spPr>
+          <a:xfrm flipV="1">
+            <a:off x="2216479" y="2799838"/>
+            <a:ext cx="635246" cy="182255"/>
+          </a:xfrm>
+          <a:prstGeom prst="straightConnector1">
+            <a:avLst/>
+          </a:prstGeom>
+          <a:ln>
+            <a:tailEnd type="triangle"/>
+          </a:ln>
+        </p:spPr>
+        <p:style>
+          <a:lnRef idx="1">
+            <a:schemeClr val="accent1"/>
+          </a:lnRef>
+          <a:fillRef idx="0">
+            <a:schemeClr val="accent1"/>
+          </a:fillRef>
+          <a:effectRef idx="0">
+            <a:schemeClr val="accent1"/>
+          </a:effectRef>
+          <a:fontRef idx="minor">
+            <a:schemeClr val="tx1"/>
+          </a:fontRef>
+        </p:style>
+      </p:cxnSp>
+      <p:cxnSp>
+        <p:nvCxnSpPr>
+          <p:cNvPr id="32" name="Straight Arrow Connector 31">
+            <a:extLst>
+              <a:ext uri="{FF2B5EF4-FFF2-40B4-BE49-F238E27FC236}">
+                <a16:creationId xmlns:a16="http://schemas.microsoft.com/office/drawing/2014/main" id="{E68738F2-EB6C-5340-BFC3-E3AB725B20DB}"/>
+              </a:ext>
+            </a:extLst>
+          </p:cNvPr>
+          <p:cNvCxnSpPr>
+            <a:cxnSpLocks/>
+            <a:stCxn id="13" idx="0"/>
+            <a:endCxn id="4" idx="1"/>
+          </p:cNvCxnSpPr>
+          <p:nvPr/>
+        </p:nvCxnSpPr>
+        <p:spPr>
+          <a:xfrm flipV="1">
+            <a:off x="3357419" y="2799838"/>
+            <a:ext cx="318633" cy="719774"/>
+          </a:xfrm>
+          <a:prstGeom prst="straightConnector1">
+            <a:avLst/>
+          </a:prstGeom>
+          <a:ln>
+            <a:tailEnd type="triangle"/>
+          </a:ln>
+        </p:spPr>
+        <p:style>
+          <a:lnRef idx="1">
+            <a:schemeClr val="accent1"/>
+          </a:lnRef>
+          <a:fillRef idx="0">
+            <a:schemeClr val="accent1"/>
+          </a:fillRef>
+          <a:effectRef idx="0">
+            <a:schemeClr val="accent1"/>
+          </a:effectRef>
+          <a:fontRef idx="minor">
+            <a:schemeClr val="tx1"/>
+          </a:fontRef>
+        </p:style>
+      </p:cxnSp>
+      <p:cxnSp>
+        <p:nvCxnSpPr>
+          <p:cNvPr id="34" name="Straight Arrow Connector 33">
+            <a:extLst>
+              <a:ext uri="{FF2B5EF4-FFF2-40B4-BE49-F238E27FC236}">
+                <a16:creationId xmlns:a16="http://schemas.microsoft.com/office/drawing/2014/main" id="{D2C8F6C5-20CD-9040-B576-D99FE84853E4}"/>
+              </a:ext>
+            </a:extLst>
+          </p:cNvPr>
+          <p:cNvCxnSpPr>
+            <a:cxnSpLocks/>
+            <a:stCxn id="14" idx="0"/>
+            <a:endCxn id="4" idx="1"/>
+          </p:cNvCxnSpPr>
+          <p:nvPr/>
+        </p:nvCxnSpPr>
+        <p:spPr>
+          <a:xfrm flipH="1" flipV="1">
+            <a:off x="3676052" y="2799838"/>
+            <a:ext cx="649760" cy="1504440"/>
+          </a:xfrm>
+          <a:prstGeom prst="straightConnector1">
+            <a:avLst/>
+          </a:prstGeom>
+          <a:ln>
+            <a:tailEnd type="triangle"/>
+          </a:ln>
+        </p:spPr>
+        <p:style>
+          <a:lnRef idx="1">
+            <a:schemeClr val="accent1"/>
+          </a:lnRef>
+          <a:fillRef idx="0">
+            <a:schemeClr val="accent1"/>
+          </a:fillRef>
+          <a:effectRef idx="0">
+            <a:schemeClr val="accent1"/>
+          </a:effectRef>
+          <a:fontRef idx="minor">
+            <a:schemeClr val="tx1"/>
+          </a:fontRef>
+        </p:style>
+      </p:cxnSp>
+      <p:cxnSp>
+        <p:nvCxnSpPr>
+          <p:cNvPr id="37" name="Straight Arrow Connector 36">
+            <a:extLst>
+              <a:ext uri="{FF2B5EF4-FFF2-40B4-BE49-F238E27FC236}">
+                <a16:creationId xmlns:a16="http://schemas.microsoft.com/office/drawing/2014/main" id="{492A2287-310F-B946-AEF1-82B998E15392}"/>
+              </a:ext>
+            </a:extLst>
+          </p:cNvPr>
+          <p:cNvCxnSpPr>
+            <a:cxnSpLocks/>
+            <a:stCxn id="15" idx="1"/>
+            <a:endCxn id="5" idx="2"/>
+          </p:cNvCxnSpPr>
+          <p:nvPr/>
+        </p:nvCxnSpPr>
+        <p:spPr>
+          <a:xfrm flipV="1">
+            <a:off x="7370616" y="2953945"/>
+            <a:ext cx="623744" cy="520366"/>
+          </a:xfrm>
+          <a:prstGeom prst="straightConnector1">
+            <a:avLst/>
+          </a:prstGeom>
+          <a:ln>
+            <a:tailEnd type="triangle"/>
+          </a:ln>
+        </p:spPr>
+        <p:style>
+          <a:lnRef idx="1">
+            <a:schemeClr val="accent1"/>
+          </a:lnRef>
+          <a:fillRef idx="0">
+            <a:schemeClr val="accent1"/>
+          </a:fillRef>
+          <a:effectRef idx="0">
+            <a:schemeClr val="accent1"/>
+          </a:effectRef>
+          <a:fontRef idx="minor">
+            <a:schemeClr val="tx1"/>
+          </a:fontRef>
+        </p:style>
+      </p:cxnSp>
+      <p:cxnSp>
+        <p:nvCxnSpPr>
+          <p:cNvPr id="39" name="Straight Arrow Connector 38">
+            <a:extLst>
+              <a:ext uri="{FF2B5EF4-FFF2-40B4-BE49-F238E27FC236}">
+                <a16:creationId xmlns:a16="http://schemas.microsoft.com/office/drawing/2014/main" id="{94CD089F-5773-E04C-BDC5-512549EA62F0}"/>
+              </a:ext>
+            </a:extLst>
+          </p:cNvPr>
+          <p:cNvCxnSpPr>
+            <a:cxnSpLocks/>
+            <a:stCxn id="16" idx="0"/>
+            <a:endCxn id="5" idx="1"/>
+          </p:cNvCxnSpPr>
+          <p:nvPr/>
+        </p:nvCxnSpPr>
+        <p:spPr>
+          <a:xfrm flipV="1">
+            <a:off x="8729829" y="2953945"/>
+            <a:ext cx="98609" cy="915613"/>
+          </a:xfrm>
+          <a:prstGeom prst="straightConnector1">
+            <a:avLst/>
+          </a:prstGeom>
+          <a:ln>
+            <a:tailEnd type="triangle"/>
+          </a:ln>
+        </p:spPr>
+        <p:style>
+          <a:lnRef idx="1">
+            <a:schemeClr val="accent1"/>
+          </a:lnRef>
+          <a:fillRef idx="0">
+            <a:schemeClr val="accent1"/>
+          </a:fillRef>
+          <a:effectRef idx="0">
+            <a:schemeClr val="accent1"/>
+          </a:effectRef>
+          <a:fontRef idx="minor">
+            <a:schemeClr val="tx1"/>
+          </a:fontRef>
+        </p:style>
+      </p:cxnSp>
+      <p:sp>
+        <p:nvSpPr>
+          <p:cNvPr id="50" name="Rectangle 49">
+            <a:extLst>
+              <a:ext uri="{FF2B5EF4-FFF2-40B4-BE49-F238E27FC236}">
+                <a16:creationId xmlns:a16="http://schemas.microsoft.com/office/drawing/2014/main" id="{B8D579BA-5C4C-E14D-A374-B9DDC758B117}"/>
+              </a:ext>
+            </a:extLst>
+          </p:cNvPr>
+          <p:cNvSpPr/>
+          <p:nvPr/>
+        </p:nvSpPr>
+        <p:spPr>
+          <a:xfrm>
+            <a:off x="5224212" y="2907785"/>
+            <a:ext cx="963827" cy="815546"/>
+          </a:xfrm>
+          <a:prstGeom prst="rect">
+            <a:avLst/>
+          </a:prstGeom>
+        </p:spPr>
+        <p:style>
+          <a:lnRef idx="2">
+            <a:schemeClr val="accent4">
+              <a:shade val="50000"/>
+            </a:schemeClr>
+          </a:lnRef>
+          <a:fillRef idx="1">
+            <a:schemeClr val="accent4"/>
+          </a:fillRef>
+          <a:effectRef idx="0">
+            <a:schemeClr val="accent4"/>
+          </a:effectRef>
+          <a:fontRef idx="minor">
+            <a:schemeClr val="lt1"/>
+          </a:fontRef>
+        </p:style>
+        <p:txBody>
+          <a:bodyPr rtlCol="0" anchor="ctr"/>
+          <a:lstStyle/>
+          <a:p>
+            <a:pPr algn="ctr"/>
+            <a:r>
+              <a:rPr lang="en-US" b="1"/>
+              <a:t>move.</a:t>
+            </a:r>
+            <a:br>
+              <a:rPr lang="en-US" b="1"/>
+            </a:br>
+            <a:r>
+              <a:rPr lang="en-US" b="1"/>
+              <a:t>global</a:t>
+            </a:r>
+          </a:p>
+        </p:txBody>
+      </p:sp>
+      <p:cxnSp>
+        <p:nvCxnSpPr>
+          <p:cNvPr id="74" name="Straight Arrow Connector 73">
+            <a:extLst>
+              <a:ext uri="{FF2B5EF4-FFF2-40B4-BE49-F238E27FC236}">
+                <a16:creationId xmlns:a16="http://schemas.microsoft.com/office/drawing/2014/main" id="{2CA80652-C6E3-4A4A-9B7C-3339EEF97881}"/>
+              </a:ext>
+            </a:extLst>
+          </p:cNvPr>
+          <p:cNvCxnSpPr>
+            <a:stCxn id="50" idx="0"/>
+            <a:endCxn id="4" idx="0"/>
+          </p:cNvCxnSpPr>
+          <p:nvPr/>
+        </p:nvCxnSpPr>
+        <p:spPr>
+          <a:xfrm flipH="1" flipV="1">
+            <a:off x="3880969" y="2390004"/>
+            <a:ext cx="1825157" cy="517781"/>
+          </a:xfrm>
+          <a:prstGeom prst="straightConnector1">
+            <a:avLst/>
+          </a:prstGeom>
+          <a:ln>
+            <a:tailEnd type="triangle"/>
+          </a:ln>
+        </p:spPr>
+        <p:style>
+          <a:lnRef idx="1">
+            <a:schemeClr val="accent1"/>
+          </a:lnRef>
+          <a:fillRef idx="0">
+            <a:schemeClr val="accent1"/>
+          </a:fillRef>
+          <a:effectRef idx="0">
+            <a:schemeClr val="accent1"/>
+          </a:effectRef>
+          <a:fontRef idx="minor">
+            <a:schemeClr val="tx1"/>
+          </a:fontRef>
+        </p:style>
+      </p:cxnSp>
+      <p:cxnSp>
+        <p:nvCxnSpPr>
+          <p:cNvPr id="77" name="Straight Arrow Connector 76">
+            <a:extLst>
+              <a:ext uri="{FF2B5EF4-FFF2-40B4-BE49-F238E27FC236}">
+                <a16:creationId xmlns:a16="http://schemas.microsoft.com/office/drawing/2014/main" id="{FCC9F9F5-A0D1-274E-8660-513EEA6C0190}"/>
+              </a:ext>
+            </a:extLst>
+          </p:cNvPr>
+          <p:cNvCxnSpPr>
+            <a:stCxn id="50" idx="0"/>
+            <a:endCxn id="5" idx="3"/>
+          </p:cNvCxnSpPr>
+          <p:nvPr/>
+        </p:nvCxnSpPr>
+        <p:spPr>
+          <a:xfrm flipV="1">
+            <a:off x="5706126" y="2544112"/>
+            <a:ext cx="2083317" cy="363673"/>
+          </a:xfrm>
+          <a:prstGeom prst="straightConnector1">
+            <a:avLst/>
+          </a:prstGeom>
+          <a:ln>
+            <a:tailEnd type="triangle"/>
+          </a:ln>
+        </p:spPr>
+        <p:style>
+          <a:lnRef idx="1">
+            <a:schemeClr val="accent1"/>
+          </a:lnRef>
+          <a:fillRef idx="0">
+            <a:schemeClr val="accent1"/>
+          </a:fillRef>
+          <a:effectRef idx="0">
+            <a:schemeClr val="accent1"/>
+          </a:effectRef>
+          <a:fontRef idx="minor">
+            <a:schemeClr val="tx1"/>
+          </a:fontRef>
+        </p:style>
+      </p:cxnSp>
+      <p:cxnSp>
+        <p:nvCxnSpPr>
+          <p:cNvPr id="86" name="Straight Arrow Connector 85">
+            <a:extLst>
+              <a:ext uri="{FF2B5EF4-FFF2-40B4-BE49-F238E27FC236}">
+                <a16:creationId xmlns:a16="http://schemas.microsoft.com/office/drawing/2014/main" id="{FAAAF412-15B6-6444-B038-670139F1877E}"/>
+              </a:ext>
+            </a:extLst>
+          </p:cNvPr>
+          <p:cNvCxnSpPr>
+            <a:stCxn id="50" idx="0"/>
+            <a:endCxn id="6" idx="2"/>
+          </p:cNvCxnSpPr>
+          <p:nvPr/>
+        </p:nvCxnSpPr>
+        <p:spPr>
+          <a:xfrm flipV="1">
+            <a:off x="5706126" y="1165656"/>
+            <a:ext cx="540513" cy="1742129"/>
+          </a:xfrm>
+          <a:prstGeom prst="straightConnector1">
+            <a:avLst/>
+          </a:prstGeom>
+          <a:ln>
+            <a:tailEnd type="triangle"/>
+          </a:ln>
+        </p:spPr>
+        <p:style>
+          <a:lnRef idx="1">
+            <a:schemeClr val="accent1"/>
+          </a:lnRef>
+          <a:fillRef idx="0">
+            <a:schemeClr val="accent1"/>
+          </a:fillRef>
+          <a:effectRef idx="0">
+            <a:schemeClr val="accent1"/>
+          </a:effectRef>
+          <a:fontRef idx="minor">
+            <a:schemeClr val="tx1"/>
+          </a:fontRef>
+        </p:style>
+      </p:cxnSp>
+      <p:sp>
+        <p:nvSpPr>
+          <p:cNvPr id="87" name="Rectangle 86">
+            <a:extLst>
+              <a:ext uri="{FF2B5EF4-FFF2-40B4-BE49-F238E27FC236}">
+                <a16:creationId xmlns:a16="http://schemas.microsoft.com/office/drawing/2014/main" id="{DF7E396D-D895-144E-ABBF-93B50E5CBD08}"/>
+              </a:ext>
+            </a:extLst>
+          </p:cNvPr>
+          <p:cNvSpPr/>
+          <p:nvPr/>
+        </p:nvSpPr>
+        <p:spPr>
+          <a:xfrm>
+            <a:off x="4325812" y="5292998"/>
+            <a:ext cx="963827" cy="815546"/>
+          </a:xfrm>
+          <a:prstGeom prst="rect">
+            <a:avLst/>
+          </a:prstGeom>
+        </p:spPr>
+        <p:style>
+          <a:lnRef idx="2">
+            <a:schemeClr val="accent4">
+              <a:shade val="50000"/>
+            </a:schemeClr>
+          </a:lnRef>
+          <a:fillRef idx="1">
+            <a:schemeClr val="accent4"/>
+          </a:fillRef>
+          <a:effectRef idx="0">
+            <a:schemeClr val="accent4"/>
+          </a:effectRef>
+          <a:fontRef idx="minor">
+            <a:schemeClr val="lt1"/>
+          </a:fontRef>
+        </p:style>
+        <p:txBody>
+          <a:bodyPr rtlCol="0" anchor="ctr"/>
+          <a:lstStyle/>
+          <a:p>
+            <a:pPr algn="ctr"/>
+            <a:r>
+              <a:rPr lang="en-US"/>
+              <a:t>syn1.</a:t>
+            </a:r>
+            <a:br>
+              <a:rPr lang="en-US"/>
+            </a:br>
+            <a:r>
+              <a:rPr lang="en-US"/>
+              <a:t>global</a:t>
+            </a:r>
+          </a:p>
+        </p:txBody>
+      </p:sp>
+      <p:sp>
+        <p:nvSpPr>
+          <p:cNvPr id="88" name="Rectangle 87">
+            <a:extLst>
+              <a:ext uri="{FF2B5EF4-FFF2-40B4-BE49-F238E27FC236}">
+                <a16:creationId xmlns:a16="http://schemas.microsoft.com/office/drawing/2014/main" id="{60E71F45-C6CC-0B4A-BF8B-7B8E99EC8AC5}"/>
+              </a:ext>
+            </a:extLst>
+          </p:cNvPr>
+          <p:cNvSpPr/>
+          <p:nvPr/>
+        </p:nvSpPr>
+        <p:spPr>
+          <a:xfrm>
+            <a:off x="6210597" y="4885225"/>
+            <a:ext cx="963827" cy="815546"/>
+          </a:xfrm>
+          <a:prstGeom prst="rect">
+            <a:avLst/>
+          </a:prstGeom>
+        </p:spPr>
+        <p:style>
+          <a:lnRef idx="2">
+            <a:schemeClr val="accent4">
+              <a:shade val="50000"/>
+            </a:schemeClr>
+          </a:lnRef>
+          <a:fillRef idx="1">
+            <a:schemeClr val="accent4"/>
+          </a:fillRef>
+          <a:effectRef idx="0">
+            <a:schemeClr val="accent4"/>
+          </a:effectRef>
+          <a:fontRef idx="minor">
+            <a:schemeClr val="lt1"/>
+          </a:fontRef>
+        </p:style>
+        <p:txBody>
+          <a:bodyPr rtlCol="0" anchor="ctr"/>
+          <a:lstStyle/>
+          <a:p>
+            <a:pPr algn="ctr"/>
+            <a:r>
+              <a:rPr lang="en-US"/>
+              <a:t>syn2.</a:t>
+            </a:r>
+            <a:br>
+              <a:rPr lang="en-US"/>
+            </a:br>
+            <a:r>
+              <a:rPr lang="en-US"/>
+              <a:t>global</a:t>
+            </a:r>
+          </a:p>
+        </p:txBody>
+      </p:sp>
+      <p:sp>
+        <p:nvSpPr>
+          <p:cNvPr id="89" name="Rectangle 88">
+            <a:extLst>
+              <a:ext uri="{FF2B5EF4-FFF2-40B4-BE49-F238E27FC236}">
+                <a16:creationId xmlns:a16="http://schemas.microsoft.com/office/drawing/2014/main" id="{60F5BE5E-7866-9F47-9CB4-9ED7E0155F3F}"/>
+              </a:ext>
+            </a:extLst>
+          </p:cNvPr>
+          <p:cNvSpPr/>
+          <p:nvPr/>
+        </p:nvSpPr>
+        <p:spPr>
+          <a:xfrm>
+            <a:off x="8956401" y="5292998"/>
+            <a:ext cx="963827" cy="815546"/>
+          </a:xfrm>
+          <a:prstGeom prst="rect">
+            <a:avLst/>
+          </a:prstGeom>
+        </p:spPr>
+        <p:style>
+          <a:lnRef idx="2">
+            <a:schemeClr val="accent4">
+              <a:shade val="50000"/>
+            </a:schemeClr>
+          </a:lnRef>
+          <a:fillRef idx="1">
+            <a:schemeClr val="accent4"/>
+          </a:fillRef>
+          <a:effectRef idx="0">
+            <a:schemeClr val="accent4"/>
+          </a:effectRef>
+          <a:fontRef idx="minor">
+            <a:schemeClr val="lt1"/>
+          </a:fontRef>
+        </p:style>
+        <p:txBody>
+          <a:bodyPr rtlCol="0" anchor="ctr"/>
+          <a:lstStyle/>
+          <a:p>
+            <a:pPr algn="ctr"/>
+            <a:r>
+              <a:rPr lang="en-US"/>
+              <a:t>ant1.</a:t>
+            </a:r>
+            <a:br>
+              <a:rPr lang="en-US"/>
+            </a:br>
+            <a:r>
+              <a:rPr lang="en-US"/>
+              <a:t>global</a:t>
+            </a:r>
+          </a:p>
+        </p:txBody>
+      </p:sp>
+      <p:cxnSp>
+        <p:nvCxnSpPr>
+          <p:cNvPr id="91" name="Straight Arrow Connector 90">
+            <a:extLst>
+              <a:ext uri="{FF2B5EF4-FFF2-40B4-BE49-F238E27FC236}">
+                <a16:creationId xmlns:a16="http://schemas.microsoft.com/office/drawing/2014/main" id="{3EA62AF8-D830-9541-863A-8A0083BBB424}"/>
+              </a:ext>
+            </a:extLst>
+          </p:cNvPr>
+          <p:cNvCxnSpPr>
+            <a:stCxn id="50" idx="2"/>
+            <a:endCxn id="87" idx="0"/>
+          </p:cNvCxnSpPr>
+          <p:nvPr/>
+        </p:nvCxnSpPr>
+        <p:spPr>
+          <a:xfrm flipH="1">
+            <a:off x="4807726" y="3723331"/>
+            <a:ext cx="898400" cy="1569667"/>
+          </a:xfrm>
+          <a:prstGeom prst="straightConnector1">
+            <a:avLst/>
+          </a:prstGeom>
+          <a:ln>
+            <a:tailEnd type="triangle"/>
+          </a:ln>
+        </p:spPr>
+        <p:style>
+          <a:lnRef idx="1">
+            <a:schemeClr val="accent1"/>
+          </a:lnRef>
+          <a:fillRef idx="0">
+            <a:schemeClr val="accent1"/>
+          </a:fillRef>
+          <a:effectRef idx="0">
+            <a:schemeClr val="accent1"/>
+          </a:effectRef>
+          <a:fontRef idx="minor">
+            <a:schemeClr val="tx1"/>
+          </a:fontRef>
+        </p:style>
+      </p:cxnSp>
+      <p:cxnSp>
+        <p:nvCxnSpPr>
+          <p:cNvPr id="93" name="Straight Arrow Connector 92">
+            <a:extLst>
+              <a:ext uri="{FF2B5EF4-FFF2-40B4-BE49-F238E27FC236}">
+                <a16:creationId xmlns:a16="http://schemas.microsoft.com/office/drawing/2014/main" id="{04101A02-DFC9-BA45-A82C-C65FDD6BF8DF}"/>
+              </a:ext>
+            </a:extLst>
+          </p:cNvPr>
+          <p:cNvCxnSpPr>
+            <a:stCxn id="50" idx="2"/>
+            <a:endCxn id="88" idx="0"/>
+          </p:cNvCxnSpPr>
+          <p:nvPr/>
+        </p:nvCxnSpPr>
+        <p:spPr>
+          <a:xfrm>
+            <a:off x="5706126" y="3723331"/>
+            <a:ext cx="986385" cy="1161894"/>
+          </a:xfrm>
+          <a:prstGeom prst="straightConnector1">
+            <a:avLst/>
+          </a:prstGeom>
+          <a:ln>
+            <a:tailEnd type="triangle"/>
+          </a:ln>
+        </p:spPr>
+        <p:style>
+          <a:lnRef idx="1">
+            <a:schemeClr val="accent1"/>
+          </a:lnRef>
+          <a:fillRef idx="0">
+            <a:schemeClr val="accent1"/>
+          </a:fillRef>
+          <a:effectRef idx="0">
+            <a:schemeClr val="accent1"/>
+          </a:effectRef>
+          <a:fontRef idx="minor">
+            <a:schemeClr val="tx1"/>
+          </a:fontRef>
+        </p:style>
+      </p:cxnSp>
+      <p:cxnSp>
+        <p:nvCxnSpPr>
+          <p:cNvPr id="95" name="Straight Arrow Connector 94">
+            <a:extLst>
+              <a:ext uri="{FF2B5EF4-FFF2-40B4-BE49-F238E27FC236}">
+                <a16:creationId xmlns:a16="http://schemas.microsoft.com/office/drawing/2014/main" id="{0135BF46-92CE-8F48-96D7-C7AA19A18277}"/>
+              </a:ext>
+            </a:extLst>
+          </p:cNvPr>
+          <p:cNvCxnSpPr>
+            <a:stCxn id="50" idx="2"/>
+            <a:endCxn id="89" idx="0"/>
+          </p:cNvCxnSpPr>
+          <p:nvPr/>
+        </p:nvCxnSpPr>
+        <p:spPr>
+          <a:xfrm>
+            <a:off x="5706126" y="3723331"/>
+            <a:ext cx="3732189" cy="1569667"/>
+          </a:xfrm>
+          <a:prstGeom prst="straightConnector1">
+            <a:avLst/>
+          </a:prstGeom>
+          <a:ln>
+            <a:tailEnd type="triangle"/>
+          </a:ln>
+        </p:spPr>
+        <p:style>
+          <a:lnRef idx="1">
+            <a:schemeClr val="accent1"/>
+          </a:lnRef>
+          <a:fillRef idx="0">
+            <a:schemeClr val="accent1"/>
+          </a:fillRef>
+          <a:effectRef idx="0">
+            <a:schemeClr val="accent1"/>
+          </a:effectRef>
+          <a:fontRef idx="minor">
+            <a:schemeClr val="tx1"/>
+          </a:fontRef>
+        </p:style>
+      </p:cxnSp>
+      <p:sp>
+        <p:nvSpPr>
+          <p:cNvPr id="101" name="Right Arrow 100">
+            <a:extLst>
+              <a:ext uri="{FF2B5EF4-FFF2-40B4-BE49-F238E27FC236}">
+                <a16:creationId xmlns:a16="http://schemas.microsoft.com/office/drawing/2014/main" id="{70E3DB8A-E338-F14A-BD74-671F7AE596D7}"/>
+              </a:ext>
+            </a:extLst>
+          </p:cNvPr>
+          <p:cNvSpPr/>
+          <p:nvPr/>
+        </p:nvSpPr>
+        <p:spPr>
+          <a:xfrm rot="19247124">
+            <a:off x="1344859" y="3632202"/>
+            <a:ext cx="566894" cy="182255"/>
+          </a:xfrm>
+          <a:prstGeom prst="rightArrow">
+            <a:avLst/>
+          </a:prstGeom>
+        </p:spPr>
+        <p:style>
+          <a:lnRef idx="2">
+            <a:schemeClr val="accent1">
+              <a:shade val="50000"/>
+            </a:schemeClr>
+          </a:lnRef>
+          <a:fillRef idx="1">
+            <a:schemeClr val="accent1"/>
+          </a:fillRef>
+          <a:effectRef idx="0">
+            <a:schemeClr val="accent1"/>
+          </a:effectRef>
+          <a:fontRef idx="minor">
+            <a:schemeClr val="lt1"/>
+          </a:fontRef>
+        </p:style>
+        <p:txBody>
+          <a:bodyPr rtlCol="0" anchor="ctr"/>
+          <a:lstStyle/>
+          <a:p>
+            <a:pPr algn="ctr"/>
+            <a:endParaRPr lang="en-US"/>
+          </a:p>
+        </p:txBody>
+      </p:sp>
+      <p:sp>
+        <p:nvSpPr>
+          <p:cNvPr id="102" name="Right Arrow 101">
+            <a:extLst>
+              <a:ext uri="{FF2B5EF4-FFF2-40B4-BE49-F238E27FC236}">
+                <a16:creationId xmlns:a16="http://schemas.microsoft.com/office/drawing/2014/main" id="{05C41163-055C-FE41-A593-F2BE542EC8F9}"/>
+              </a:ext>
+            </a:extLst>
+          </p:cNvPr>
+          <p:cNvSpPr/>
+          <p:nvPr/>
+        </p:nvSpPr>
+        <p:spPr>
+          <a:xfrm rot="19247124">
+            <a:off x="1136595" y="1280612"/>
+            <a:ext cx="566894" cy="182255"/>
+          </a:xfrm>
+          <a:prstGeom prst="rightArrow">
+            <a:avLst/>
+          </a:prstGeom>
+        </p:spPr>
+        <p:style>
+          <a:lnRef idx="2">
+            <a:schemeClr val="accent1">
+              <a:shade val="50000"/>
+            </a:schemeClr>
+          </a:lnRef>
+          <a:fillRef idx="1">
+            <a:schemeClr val="accent1"/>
+          </a:fillRef>
+          <a:effectRef idx="0">
+            <a:schemeClr val="accent1"/>
+          </a:effectRef>
+          <a:fontRef idx="minor">
+            <a:schemeClr val="lt1"/>
+          </a:fontRef>
+        </p:style>
+        <p:txBody>
+          <a:bodyPr rtlCol="0" anchor="ctr"/>
+          <a:lstStyle/>
+          <a:p>
+            <a:pPr algn="ctr"/>
+            <a:endParaRPr lang="en-US"/>
+          </a:p>
+        </p:txBody>
+      </p:sp>
+      <p:sp>
+        <p:nvSpPr>
+          <p:cNvPr id="103" name="TextBox 102">
+            <a:extLst>
+              <a:ext uri="{FF2B5EF4-FFF2-40B4-BE49-F238E27FC236}">
+                <a16:creationId xmlns:a16="http://schemas.microsoft.com/office/drawing/2014/main" id="{7B5B22F8-7A5B-E349-BF97-C19BC42AEBCA}"/>
+              </a:ext>
+            </a:extLst>
+          </p:cNvPr>
+          <p:cNvSpPr txBox="1"/>
+          <p:nvPr/>
+        </p:nvSpPr>
+        <p:spPr>
+          <a:xfrm>
+            <a:off x="2145868" y="1331471"/>
+            <a:ext cx="383148" cy="338554"/>
+          </a:xfrm>
+          <a:prstGeom prst="rect">
+            <a:avLst/>
+          </a:prstGeom>
+          <a:noFill/>
+        </p:spPr>
+        <p:txBody>
+          <a:bodyPr wrap="square" rtlCol="0">
+            <a:spAutoFit/>
+          </a:bodyPr>
+          <a:lstStyle/>
+          <a:p>
+            <a:r>
+              <a:rPr lang="en-US" sz="1600" i="1"/>
+              <a:t>d</a:t>
+            </a:r>
+          </a:p>
+        </p:txBody>
+      </p:sp>
+      <p:sp>
+        <p:nvSpPr>
+          <p:cNvPr id="104" name="TextBox 103">
+            <a:extLst>
+              <a:ext uri="{FF2B5EF4-FFF2-40B4-BE49-F238E27FC236}">
+                <a16:creationId xmlns:a16="http://schemas.microsoft.com/office/drawing/2014/main" id="{CE76B53E-FF1B-1D4B-B96C-CD6DFA2175DE}"/>
+              </a:ext>
+            </a:extLst>
+          </p:cNvPr>
+          <p:cNvSpPr txBox="1"/>
+          <p:nvPr/>
+        </p:nvSpPr>
+        <p:spPr>
+          <a:xfrm flipH="1">
+            <a:off x="2681416" y="1483871"/>
+            <a:ext cx="299550" cy="338554"/>
+          </a:xfrm>
+          <a:prstGeom prst="rect">
+            <a:avLst/>
+          </a:prstGeom>
+          <a:noFill/>
+        </p:spPr>
+        <p:txBody>
+          <a:bodyPr wrap="square" rtlCol="0">
+            <a:spAutoFit/>
+          </a:bodyPr>
+          <a:lstStyle/>
+          <a:p>
+            <a:r>
+              <a:rPr lang="en-US" sz="1600" i="1"/>
+              <a:t>d</a:t>
+            </a:r>
+          </a:p>
+        </p:txBody>
+      </p:sp>
+      <p:sp>
+        <p:nvSpPr>
+          <p:cNvPr id="105" name="TextBox 104">
+            <a:extLst>
+              <a:ext uri="{FF2B5EF4-FFF2-40B4-BE49-F238E27FC236}">
+                <a16:creationId xmlns:a16="http://schemas.microsoft.com/office/drawing/2014/main" id="{C6352254-34FD-7743-8692-5ABBA31BEF03}"/>
+              </a:ext>
+            </a:extLst>
+          </p:cNvPr>
+          <p:cNvSpPr txBox="1"/>
+          <p:nvPr/>
+        </p:nvSpPr>
+        <p:spPr>
+          <a:xfrm flipH="1">
+            <a:off x="3759555" y="1414675"/>
+            <a:ext cx="299550" cy="338554"/>
+          </a:xfrm>
+          <a:prstGeom prst="rect">
+            <a:avLst/>
+          </a:prstGeom>
+          <a:noFill/>
+        </p:spPr>
+        <p:txBody>
+          <a:bodyPr wrap="square" rtlCol="0">
+            <a:spAutoFit/>
+          </a:bodyPr>
+          <a:lstStyle/>
+          <a:p>
+            <a:r>
+              <a:rPr lang="en-US" sz="1600" i="1"/>
+              <a:t>d</a:t>
+            </a:r>
+          </a:p>
+        </p:txBody>
+      </p:sp>
+      <p:sp>
+        <p:nvSpPr>
+          <p:cNvPr id="106" name="TextBox 105">
+            <a:extLst>
+              <a:ext uri="{FF2B5EF4-FFF2-40B4-BE49-F238E27FC236}">
+                <a16:creationId xmlns:a16="http://schemas.microsoft.com/office/drawing/2014/main" id="{76C2895E-8C5E-CF42-93AD-FF09BA0C859D}"/>
+              </a:ext>
+            </a:extLst>
+          </p:cNvPr>
+          <p:cNvSpPr txBox="1"/>
+          <p:nvPr/>
+        </p:nvSpPr>
+        <p:spPr>
+          <a:xfrm flipH="1">
+            <a:off x="7694810" y="1537745"/>
+            <a:ext cx="299550" cy="338554"/>
+          </a:xfrm>
+          <a:prstGeom prst="rect">
+            <a:avLst/>
+          </a:prstGeom>
+          <a:noFill/>
+        </p:spPr>
+        <p:txBody>
+          <a:bodyPr wrap="square" rtlCol="0">
+            <a:spAutoFit/>
+          </a:bodyPr>
+          <a:lstStyle/>
+          <a:p>
+            <a:r>
+              <a:rPr lang="en-US" sz="1600" i="1"/>
+              <a:t>d</a:t>
+            </a:r>
+          </a:p>
+        </p:txBody>
+      </p:sp>
+      <p:sp>
+        <p:nvSpPr>
+          <p:cNvPr id="107" name="TextBox 106">
+            <a:extLst>
+              <a:ext uri="{FF2B5EF4-FFF2-40B4-BE49-F238E27FC236}">
+                <a16:creationId xmlns:a16="http://schemas.microsoft.com/office/drawing/2014/main" id="{1866A2C7-740E-C945-94CF-709D7EBB2990}"/>
+              </a:ext>
+            </a:extLst>
+          </p:cNvPr>
+          <p:cNvSpPr txBox="1"/>
+          <p:nvPr/>
+        </p:nvSpPr>
+        <p:spPr>
+          <a:xfrm flipH="1">
+            <a:off x="8845103" y="1710738"/>
+            <a:ext cx="299550" cy="338554"/>
+          </a:xfrm>
+          <a:prstGeom prst="rect">
+            <a:avLst/>
+          </a:prstGeom>
+          <a:noFill/>
+        </p:spPr>
+        <p:txBody>
+          <a:bodyPr wrap="square" rtlCol="0">
+            <a:spAutoFit/>
+          </a:bodyPr>
+          <a:lstStyle/>
+          <a:p>
+            <a:r>
+              <a:rPr lang="en-US" sz="1600" i="1"/>
+              <a:t>d</a:t>
+            </a:r>
+          </a:p>
+        </p:txBody>
+      </p:sp>
+      <p:sp>
+        <p:nvSpPr>
+          <p:cNvPr id="108" name="TextBox 107">
+            <a:extLst>
+              <a:ext uri="{FF2B5EF4-FFF2-40B4-BE49-F238E27FC236}">
+                <a16:creationId xmlns:a16="http://schemas.microsoft.com/office/drawing/2014/main" id="{0422520D-299D-C34C-BAE2-C6A21C0750F3}"/>
+              </a:ext>
+            </a:extLst>
+          </p:cNvPr>
+          <p:cNvSpPr txBox="1"/>
+          <p:nvPr/>
+        </p:nvSpPr>
+        <p:spPr>
+          <a:xfrm flipH="1">
+            <a:off x="8718063" y="3271605"/>
+            <a:ext cx="299550" cy="338554"/>
+          </a:xfrm>
+          <a:prstGeom prst="rect">
+            <a:avLst/>
+          </a:prstGeom>
+          <a:noFill/>
+        </p:spPr>
+        <p:txBody>
+          <a:bodyPr wrap="square" rtlCol="0">
+            <a:spAutoFit/>
+          </a:bodyPr>
+          <a:lstStyle/>
+          <a:p>
+            <a:r>
+              <a:rPr lang="en-US" sz="1600" i="1"/>
+              <a:t>e</a:t>
+            </a:r>
+          </a:p>
+        </p:txBody>
+      </p:sp>
+      <p:sp>
+        <p:nvSpPr>
+          <p:cNvPr id="109" name="TextBox 108">
+            <a:extLst>
+              <a:ext uri="{FF2B5EF4-FFF2-40B4-BE49-F238E27FC236}">
+                <a16:creationId xmlns:a16="http://schemas.microsoft.com/office/drawing/2014/main" id="{3317F754-2ACE-3541-B89B-10182D277E67}"/>
+              </a:ext>
+            </a:extLst>
+          </p:cNvPr>
+          <p:cNvSpPr txBox="1"/>
+          <p:nvPr/>
+        </p:nvSpPr>
+        <p:spPr>
+          <a:xfrm flipH="1">
+            <a:off x="7488715" y="2988554"/>
+            <a:ext cx="299550" cy="338554"/>
+          </a:xfrm>
+          <a:prstGeom prst="rect">
+            <a:avLst/>
+          </a:prstGeom>
+          <a:noFill/>
+        </p:spPr>
+        <p:txBody>
+          <a:bodyPr wrap="square" rtlCol="0">
+            <a:spAutoFit/>
+          </a:bodyPr>
+          <a:lstStyle/>
+          <a:p>
+            <a:r>
+              <a:rPr lang="en-US" sz="1600" i="1"/>
+              <a:t>e</a:t>
+            </a:r>
+          </a:p>
+        </p:txBody>
+      </p:sp>
+      <p:sp>
+        <p:nvSpPr>
+          <p:cNvPr id="110" name="TextBox 109">
+            <a:extLst>
+              <a:ext uri="{FF2B5EF4-FFF2-40B4-BE49-F238E27FC236}">
+                <a16:creationId xmlns:a16="http://schemas.microsoft.com/office/drawing/2014/main" id="{A0BD7C73-83CD-5545-992A-2439917F9E3D}"/>
+              </a:ext>
+            </a:extLst>
+          </p:cNvPr>
+          <p:cNvSpPr txBox="1"/>
+          <p:nvPr/>
+        </p:nvSpPr>
+        <p:spPr>
+          <a:xfrm flipH="1">
+            <a:off x="4093982" y="3823532"/>
+            <a:ext cx="299550" cy="338554"/>
+          </a:xfrm>
+          <a:prstGeom prst="rect">
+            <a:avLst/>
+          </a:prstGeom>
+          <a:noFill/>
+        </p:spPr>
+        <p:txBody>
+          <a:bodyPr wrap="square" rtlCol="0">
+            <a:spAutoFit/>
+          </a:bodyPr>
+          <a:lstStyle/>
+          <a:p>
+            <a:r>
+              <a:rPr lang="en-US" sz="1600" i="1"/>
+              <a:t>e</a:t>
+            </a:r>
+          </a:p>
+        </p:txBody>
+      </p:sp>
+      <p:sp>
+        <p:nvSpPr>
+          <p:cNvPr id="111" name="TextBox 110">
+            <a:extLst>
+              <a:ext uri="{FF2B5EF4-FFF2-40B4-BE49-F238E27FC236}">
+                <a16:creationId xmlns:a16="http://schemas.microsoft.com/office/drawing/2014/main" id="{7CFBED07-4FDD-5B46-A699-114AC129271C}"/>
+              </a:ext>
+            </a:extLst>
+          </p:cNvPr>
+          <p:cNvSpPr txBox="1"/>
+          <p:nvPr/>
+        </p:nvSpPr>
+        <p:spPr>
+          <a:xfrm flipH="1">
+            <a:off x="3286885" y="3167761"/>
+            <a:ext cx="299550" cy="338554"/>
+          </a:xfrm>
+          <a:prstGeom prst="rect">
+            <a:avLst/>
+          </a:prstGeom>
+          <a:noFill/>
+        </p:spPr>
+        <p:txBody>
+          <a:bodyPr wrap="square" rtlCol="0">
+            <a:spAutoFit/>
+          </a:bodyPr>
+          <a:lstStyle/>
+          <a:p>
+            <a:r>
+              <a:rPr lang="en-US" sz="1600" i="1"/>
+              <a:t>e</a:t>
+            </a:r>
+          </a:p>
+        </p:txBody>
+      </p:sp>
+      <p:sp>
+        <p:nvSpPr>
+          <p:cNvPr id="112" name="TextBox 111">
+            <a:extLst>
+              <a:ext uri="{FF2B5EF4-FFF2-40B4-BE49-F238E27FC236}">
+                <a16:creationId xmlns:a16="http://schemas.microsoft.com/office/drawing/2014/main" id="{CBC4F443-A676-054C-AE26-EE234F90F5A4}"/>
+              </a:ext>
+            </a:extLst>
+          </p:cNvPr>
+          <p:cNvSpPr txBox="1"/>
+          <p:nvPr/>
+        </p:nvSpPr>
+        <p:spPr>
+          <a:xfrm flipH="1">
+            <a:off x="2361772" y="2684535"/>
+            <a:ext cx="299550" cy="338554"/>
+          </a:xfrm>
+          <a:prstGeom prst="rect">
+            <a:avLst/>
+          </a:prstGeom>
+          <a:noFill/>
+        </p:spPr>
+        <p:txBody>
+          <a:bodyPr wrap="square" rtlCol="0">
+            <a:spAutoFit/>
+          </a:bodyPr>
+          <a:lstStyle/>
+          <a:p>
+            <a:r>
+              <a:rPr lang="en-US" sz="1600" i="1"/>
+              <a:t>e</a:t>
+            </a:r>
+          </a:p>
+        </p:txBody>
+      </p:sp>
+      <p:sp>
+        <p:nvSpPr>
+          <p:cNvPr id="113" name="TextBox 112">
+            <a:extLst>
+              <a:ext uri="{FF2B5EF4-FFF2-40B4-BE49-F238E27FC236}">
+                <a16:creationId xmlns:a16="http://schemas.microsoft.com/office/drawing/2014/main" id="{666AB102-1489-AC43-80F1-FE0DD59F9B65}"/>
+              </a:ext>
+            </a:extLst>
+          </p:cNvPr>
+          <p:cNvSpPr txBox="1"/>
+          <p:nvPr/>
+        </p:nvSpPr>
+        <p:spPr>
+          <a:xfrm flipH="1">
+            <a:off x="4525570" y="2345981"/>
+            <a:ext cx="490169" cy="338554"/>
+          </a:xfrm>
+          <a:prstGeom prst="rect">
+            <a:avLst/>
+          </a:prstGeom>
+          <a:noFill/>
+        </p:spPr>
+        <p:txBody>
+          <a:bodyPr wrap="square" rtlCol="0">
+            <a:spAutoFit/>
+          </a:bodyPr>
+          <a:lstStyle/>
+          <a:p>
+            <a:r>
+              <a:rPr lang="en-US" sz="1600" i="1"/>
+              <a:t>sc</a:t>
+            </a:r>
+          </a:p>
+        </p:txBody>
+      </p:sp>
+      <p:sp>
+        <p:nvSpPr>
+          <p:cNvPr id="114" name="TextBox 113">
+            <a:extLst>
+              <a:ext uri="{FF2B5EF4-FFF2-40B4-BE49-F238E27FC236}">
+                <a16:creationId xmlns:a16="http://schemas.microsoft.com/office/drawing/2014/main" id="{F4E39BAE-017D-1347-8E27-C86A7C7F1AB2}"/>
+              </a:ext>
+            </a:extLst>
+          </p:cNvPr>
+          <p:cNvSpPr txBox="1"/>
+          <p:nvPr/>
+        </p:nvSpPr>
+        <p:spPr>
+          <a:xfrm flipH="1">
+            <a:off x="5923457" y="1838678"/>
+            <a:ext cx="490169" cy="338554"/>
+          </a:xfrm>
+          <a:prstGeom prst="rect">
+            <a:avLst/>
+          </a:prstGeom>
+          <a:noFill/>
+        </p:spPr>
+        <p:txBody>
+          <a:bodyPr wrap="square" rtlCol="0">
+            <a:spAutoFit/>
+          </a:bodyPr>
+          <a:lstStyle/>
+          <a:p>
+            <a:r>
+              <a:rPr lang="en-US" sz="1600" i="1"/>
+              <a:t>sc</a:t>
+            </a:r>
+          </a:p>
+        </p:txBody>
+      </p:sp>
+      <p:sp>
+        <p:nvSpPr>
+          <p:cNvPr id="115" name="TextBox 114">
+            <a:extLst>
+              <a:ext uri="{FF2B5EF4-FFF2-40B4-BE49-F238E27FC236}">
+                <a16:creationId xmlns:a16="http://schemas.microsoft.com/office/drawing/2014/main" id="{C86625F1-9162-3742-930D-4C32A1565841}"/>
+              </a:ext>
+            </a:extLst>
+          </p:cNvPr>
+          <p:cNvSpPr txBox="1"/>
+          <p:nvPr/>
+        </p:nvSpPr>
+        <p:spPr>
+          <a:xfrm flipH="1">
+            <a:off x="6623354" y="2461284"/>
+            <a:ext cx="490169" cy="338554"/>
+          </a:xfrm>
+          <a:prstGeom prst="rect">
+            <a:avLst/>
+          </a:prstGeom>
+          <a:noFill/>
+        </p:spPr>
+        <p:txBody>
+          <a:bodyPr wrap="square" rtlCol="0">
+            <a:spAutoFit/>
+          </a:bodyPr>
+          <a:lstStyle/>
+          <a:p>
+            <a:r>
+              <a:rPr lang="en-US" sz="1600" i="1"/>
+              <a:t>sc</a:t>
+            </a:r>
+          </a:p>
+        </p:txBody>
+      </p:sp>
+      <p:sp>
+        <p:nvSpPr>
+          <p:cNvPr id="116" name="TextBox 115">
+            <a:extLst>
+              <a:ext uri="{FF2B5EF4-FFF2-40B4-BE49-F238E27FC236}">
+                <a16:creationId xmlns:a16="http://schemas.microsoft.com/office/drawing/2014/main" id="{C3C5C888-F36C-0E42-9738-10880A32565F}"/>
+              </a:ext>
+            </a:extLst>
+          </p:cNvPr>
+          <p:cNvSpPr txBox="1"/>
+          <p:nvPr/>
+        </p:nvSpPr>
+        <p:spPr>
+          <a:xfrm flipH="1">
+            <a:off x="5044554" y="4338887"/>
+            <a:ext cx="490169" cy="338554"/>
+          </a:xfrm>
+          <a:prstGeom prst="rect">
+            <a:avLst/>
+          </a:prstGeom>
+          <a:noFill/>
+        </p:spPr>
+        <p:txBody>
+          <a:bodyPr wrap="square" rtlCol="0">
+            <a:spAutoFit/>
+          </a:bodyPr>
+          <a:lstStyle/>
+          <a:p>
+            <a:r>
+              <a:rPr lang="en-US" sz="1600" i="1"/>
+              <a:t>syn</a:t>
+            </a:r>
+          </a:p>
+        </p:txBody>
+      </p:sp>
+      <p:sp>
+        <p:nvSpPr>
+          <p:cNvPr id="117" name="TextBox 116">
+            <a:extLst>
+              <a:ext uri="{FF2B5EF4-FFF2-40B4-BE49-F238E27FC236}">
+                <a16:creationId xmlns:a16="http://schemas.microsoft.com/office/drawing/2014/main" id="{812E84F0-A992-9B44-8A6D-A1E4D9FEE884}"/>
+              </a:ext>
+            </a:extLst>
+          </p:cNvPr>
+          <p:cNvSpPr txBox="1"/>
+          <p:nvPr/>
+        </p:nvSpPr>
+        <p:spPr>
+          <a:xfrm flipH="1">
+            <a:off x="6012194" y="4262583"/>
+            <a:ext cx="490169" cy="338554"/>
+          </a:xfrm>
+          <a:prstGeom prst="rect">
+            <a:avLst/>
+          </a:prstGeom>
+          <a:noFill/>
+        </p:spPr>
+        <p:txBody>
+          <a:bodyPr wrap="square" rtlCol="0">
+            <a:spAutoFit/>
+          </a:bodyPr>
+          <a:lstStyle/>
+          <a:p>
+            <a:r>
+              <a:rPr lang="en-US" sz="1600" i="1"/>
+              <a:t>syn</a:t>
+            </a:r>
+          </a:p>
+        </p:txBody>
+      </p:sp>
+      <p:sp>
+        <p:nvSpPr>
+          <p:cNvPr id="118" name="TextBox 117">
+            <a:extLst>
+              <a:ext uri="{FF2B5EF4-FFF2-40B4-BE49-F238E27FC236}">
+                <a16:creationId xmlns:a16="http://schemas.microsoft.com/office/drawing/2014/main" id="{7E7E4AAF-C7EF-424D-9B8B-35B47E86B76B}"/>
+              </a:ext>
+            </a:extLst>
+          </p:cNvPr>
+          <p:cNvSpPr txBox="1"/>
+          <p:nvPr/>
+        </p:nvSpPr>
+        <p:spPr>
+          <a:xfrm flipH="1">
+            <a:off x="7590702" y="4537172"/>
+            <a:ext cx="490169" cy="338554"/>
+          </a:xfrm>
+          <a:prstGeom prst="rect">
+            <a:avLst/>
+          </a:prstGeom>
+          <a:noFill/>
+        </p:spPr>
+        <p:txBody>
+          <a:bodyPr wrap="square" rtlCol="0">
+            <a:spAutoFit/>
+          </a:bodyPr>
+          <a:lstStyle/>
+          <a:p>
+            <a:r>
+              <a:rPr lang="en-US" sz="1600" i="1"/>
+              <a:t>ant</a:t>
+            </a:r>
+          </a:p>
+        </p:txBody>
+      </p:sp>
+      <p:sp>
+        <p:nvSpPr>
+          <p:cNvPr id="53" name="Rectangle 52">
+            <a:extLst>
+              <a:ext uri="{FF2B5EF4-FFF2-40B4-BE49-F238E27FC236}">
+                <a16:creationId xmlns:a16="http://schemas.microsoft.com/office/drawing/2014/main" id="{E4A62AC1-0E5B-3447-8185-435CB4862F92}"/>
+              </a:ext>
+            </a:extLst>
+          </p:cNvPr>
+          <p:cNvSpPr/>
+          <p:nvPr/>
+        </p:nvSpPr>
+        <p:spPr>
+          <a:xfrm>
+            <a:off x="10620892" y="3054012"/>
+            <a:ext cx="963827" cy="815546"/>
+          </a:xfrm>
+          <a:prstGeom prst="rect">
+            <a:avLst/>
+          </a:prstGeom>
+        </p:spPr>
+        <p:style>
+          <a:lnRef idx="2">
+            <a:schemeClr val="accent4">
+              <a:shade val="50000"/>
+            </a:schemeClr>
+          </a:lnRef>
+          <a:fillRef idx="1">
+            <a:schemeClr val="accent4"/>
+          </a:fillRef>
+          <a:effectRef idx="0">
+            <a:schemeClr val="accent4"/>
+          </a:effectRef>
+          <a:fontRef idx="minor">
+            <a:schemeClr val="lt1"/>
+          </a:fontRef>
+        </p:style>
+        <p:txBody>
+          <a:bodyPr rtlCol="0" anchor="ctr"/>
+          <a:lstStyle/>
+          <a:p>
+            <a:pPr algn="ctr"/>
+            <a:r>
+              <a:rPr lang="en-US"/>
+              <a:t>for.</a:t>
+            </a:r>
+            <a:br>
+              <a:rPr lang="en-US"/>
+            </a:br>
+            <a:r>
+              <a:rPr lang="en-US"/>
+              <a:t>global</a:t>
+            </a:r>
+          </a:p>
+        </p:txBody>
+      </p:sp>
+    </p:spTree>
+    <p:extLst>
+      <p:ext uri="{BB962C8B-B14F-4D97-AF65-F5344CB8AC3E}">
+        <p14:creationId xmlns:p14="http://schemas.microsoft.com/office/powerpoint/2010/main" val="3131586427"/>
+      </p:ext>
+    </p:extLst>
+  </p:cSld>
+  <p:clrMapOvr>
+    <a:masterClrMapping/>
+  </p:clrMapOvr>
+</p:sld>
+</file>
+
 <file path=ppt/theme/theme1.xml><?xml version="1.0" encoding="utf-8"?>
 <a:theme xmlns:a="http://schemas.openxmlformats.org/drawingml/2006/main" name="Office Theme">
   <a:themeElements>

</xml_diff>

<commit_message>
=Readjusting SelectK senses architecture...
Former-commit-id: d162eb4a92c020e2d4d7d1f5ea89c25d4c856006 [formerly 90bbdb2572d3c475ad97bfd80d1261ebcb62304b]
Former-commit-id: 4f754dd474107e944ed91099e99e7d3131b88920
Former-commit-id: 446ef13374c7361c1b24d6af4ce0479570ceb8e6
</commit_message>
<xml_diff>
--- a/Media/Plan_Task1.pptx
+++ b/Media/Plan_Task1.pptx
@@ -4,9 +4,14 @@
   <p:sldMasterIdLst>
     <p:sldMasterId id="2147483648" r:id="rId1"/>
   </p:sldMasterIdLst>
+  <p:notesMasterIdLst>
+    <p:notesMasterId r:id="rId6"/>
+  </p:notesMasterIdLst>
   <p:sldIdLst>
     <p:sldId id="257" r:id="rId2"/>
     <p:sldId id="258" r:id="rId3"/>
+    <p:sldId id="259" r:id="rId4"/>
+    <p:sldId id="260" r:id="rId5"/>
   </p:sldIdLst>
   <p:sldSz cx="12192000" cy="6858000"/>
   <p:notesSz cx="6858000" cy="9144000"/>
@@ -113,6 +118,520 @@
 </p:presentation>
 </file>
 
+<file path=ppt/notesMasters/notesMaster1.xml><?xml version="1.0" encoding="utf-8"?>
+<p:notesMaster xmlns:a="http://schemas.openxmlformats.org/drawingml/2006/main" xmlns:r="http://schemas.openxmlformats.org/officeDocument/2006/relationships" xmlns:p="http://schemas.openxmlformats.org/presentationml/2006/main">
+  <p:cSld>
+    <p:bg>
+      <p:bgRef idx="1001">
+        <a:schemeClr val="bg1"/>
+      </p:bgRef>
+    </p:bg>
+    <p:spTree>
+      <p:nvGrpSpPr>
+        <p:cNvPr id="1" name=""/>
+        <p:cNvGrpSpPr/>
+        <p:nvPr/>
+      </p:nvGrpSpPr>
+      <p:grpSpPr>
+        <a:xfrm>
+          <a:off x="0" y="0"/>
+          <a:ext cx="0" cy="0"/>
+          <a:chOff x="0" y="0"/>
+          <a:chExt cx="0" cy="0"/>
+        </a:xfrm>
+      </p:grpSpPr>
+      <p:sp>
+        <p:nvSpPr>
+          <p:cNvPr id="2" name="Header Placeholder 1"/>
+          <p:cNvSpPr>
+            <a:spLocks noGrp="1"/>
+          </p:cNvSpPr>
+          <p:nvPr>
+            <p:ph type="hdr" sz="quarter"/>
+          </p:nvPr>
+        </p:nvSpPr>
+        <p:spPr>
+          <a:xfrm>
+            <a:off x="0" y="0"/>
+            <a:ext cx="2971800" cy="458788"/>
+          </a:xfrm>
+          <a:prstGeom prst="rect">
+            <a:avLst/>
+          </a:prstGeom>
+        </p:spPr>
+        <p:txBody>
+          <a:bodyPr vert="horz" lIns="91440" tIns="45720" rIns="91440" bIns="45720" rtlCol="0"/>
+          <a:lstStyle>
+            <a:lvl1pPr algn="l">
+              <a:defRPr sz="1200"/>
+            </a:lvl1pPr>
+          </a:lstStyle>
+          <a:p>
+            <a:endParaRPr lang="en-US"/>
+          </a:p>
+        </p:txBody>
+      </p:sp>
+      <p:sp>
+        <p:nvSpPr>
+          <p:cNvPr id="3" name="Date Placeholder 2"/>
+          <p:cNvSpPr>
+            <a:spLocks noGrp="1"/>
+          </p:cNvSpPr>
+          <p:nvPr>
+            <p:ph type="dt" idx="1"/>
+          </p:nvPr>
+        </p:nvSpPr>
+        <p:spPr>
+          <a:xfrm>
+            <a:off x="3884613" y="0"/>
+            <a:ext cx="2971800" cy="458788"/>
+          </a:xfrm>
+          <a:prstGeom prst="rect">
+            <a:avLst/>
+          </a:prstGeom>
+        </p:spPr>
+        <p:txBody>
+          <a:bodyPr vert="horz" lIns="91440" tIns="45720" rIns="91440" bIns="45720" rtlCol="0"/>
+          <a:lstStyle>
+            <a:lvl1pPr algn="r">
+              <a:defRPr sz="1200"/>
+            </a:lvl1pPr>
+          </a:lstStyle>
+          <a:p>
+            <a:fld id="{074A7C60-B66F-6647-A862-700E380C2D75}" type="datetimeFigureOut">
+              <a:t>5/24/20</a:t>
+            </a:fld>
+            <a:endParaRPr lang="en-US"/>
+          </a:p>
+        </p:txBody>
+      </p:sp>
+      <p:sp>
+        <p:nvSpPr>
+          <p:cNvPr id="4" name="Slide Image Placeholder 3"/>
+          <p:cNvSpPr>
+            <a:spLocks noGrp="1" noRot="1" noChangeAspect="1"/>
+          </p:cNvSpPr>
+          <p:nvPr>
+            <p:ph type="sldImg" idx="2"/>
+          </p:nvPr>
+        </p:nvSpPr>
+        <p:spPr>
+          <a:xfrm>
+            <a:off x="685800" y="1143000"/>
+            <a:ext cx="5486400" cy="3086100"/>
+          </a:xfrm>
+          <a:prstGeom prst="rect">
+            <a:avLst/>
+          </a:prstGeom>
+          <a:noFill/>
+          <a:ln w="12700">
+            <a:solidFill>
+              <a:prstClr val="black"/>
+            </a:solidFill>
+          </a:ln>
+        </p:spPr>
+        <p:txBody>
+          <a:bodyPr vert="horz" lIns="91440" tIns="45720" rIns="91440" bIns="45720" rtlCol="0" anchor="ctr"/>
+          <a:lstStyle/>
+          <a:p>
+            <a:endParaRPr lang="en-US"/>
+          </a:p>
+        </p:txBody>
+      </p:sp>
+      <p:sp>
+        <p:nvSpPr>
+          <p:cNvPr id="5" name="Notes Placeholder 4"/>
+          <p:cNvSpPr>
+            <a:spLocks noGrp="1"/>
+          </p:cNvSpPr>
+          <p:nvPr>
+            <p:ph type="body" sz="quarter" idx="3"/>
+          </p:nvPr>
+        </p:nvSpPr>
+        <p:spPr>
+          <a:xfrm>
+            <a:off x="685800" y="4400550"/>
+            <a:ext cx="5486400" cy="3600450"/>
+          </a:xfrm>
+          <a:prstGeom prst="rect">
+            <a:avLst/>
+          </a:prstGeom>
+        </p:spPr>
+        <p:txBody>
+          <a:bodyPr vert="horz" lIns="91440" tIns="45720" rIns="91440" bIns="45720" rtlCol="0"/>
+          <a:lstStyle/>
+          <a:p>
+            <a:pPr lvl="0"/>
+            <a:r>
+              <a:rPr lang="en-GB"/>
+              <a:t>Click to edit Master text styles</a:t>
+            </a:r>
+          </a:p>
+          <a:p>
+            <a:pPr lvl="1"/>
+            <a:r>
+              <a:rPr lang="en-GB"/>
+              <a:t>Second level</a:t>
+            </a:r>
+          </a:p>
+          <a:p>
+            <a:pPr lvl="2"/>
+            <a:r>
+              <a:rPr lang="en-GB"/>
+              <a:t>Third level</a:t>
+            </a:r>
+          </a:p>
+          <a:p>
+            <a:pPr lvl="3"/>
+            <a:r>
+              <a:rPr lang="en-GB"/>
+              <a:t>Fourth level</a:t>
+            </a:r>
+          </a:p>
+          <a:p>
+            <a:pPr lvl="4"/>
+            <a:r>
+              <a:rPr lang="en-GB"/>
+              <a:t>Fifth level</a:t>
+            </a:r>
+            <a:endParaRPr lang="en-US"/>
+          </a:p>
+        </p:txBody>
+      </p:sp>
+      <p:sp>
+        <p:nvSpPr>
+          <p:cNvPr id="6" name="Footer Placeholder 5"/>
+          <p:cNvSpPr>
+            <a:spLocks noGrp="1"/>
+          </p:cNvSpPr>
+          <p:nvPr>
+            <p:ph type="ftr" sz="quarter" idx="4"/>
+          </p:nvPr>
+        </p:nvSpPr>
+        <p:spPr>
+          <a:xfrm>
+            <a:off x="0" y="8685213"/>
+            <a:ext cx="2971800" cy="458787"/>
+          </a:xfrm>
+          <a:prstGeom prst="rect">
+            <a:avLst/>
+          </a:prstGeom>
+        </p:spPr>
+        <p:txBody>
+          <a:bodyPr vert="horz" lIns="91440" tIns="45720" rIns="91440" bIns="45720" rtlCol="0" anchor="b"/>
+          <a:lstStyle>
+            <a:lvl1pPr algn="l">
+              <a:defRPr sz="1200"/>
+            </a:lvl1pPr>
+          </a:lstStyle>
+          <a:p>
+            <a:endParaRPr lang="en-US"/>
+          </a:p>
+        </p:txBody>
+      </p:sp>
+      <p:sp>
+        <p:nvSpPr>
+          <p:cNvPr id="7" name="Slide Number Placeholder 6"/>
+          <p:cNvSpPr>
+            <a:spLocks noGrp="1"/>
+          </p:cNvSpPr>
+          <p:nvPr>
+            <p:ph type="sldNum" sz="quarter" idx="5"/>
+          </p:nvPr>
+        </p:nvSpPr>
+        <p:spPr>
+          <a:xfrm>
+            <a:off x="3884613" y="8685213"/>
+            <a:ext cx="2971800" cy="458787"/>
+          </a:xfrm>
+          <a:prstGeom prst="rect">
+            <a:avLst/>
+          </a:prstGeom>
+        </p:spPr>
+        <p:txBody>
+          <a:bodyPr vert="horz" lIns="91440" tIns="45720" rIns="91440" bIns="45720" rtlCol="0" anchor="b"/>
+          <a:lstStyle>
+            <a:lvl1pPr algn="r">
+              <a:defRPr sz="1200"/>
+            </a:lvl1pPr>
+          </a:lstStyle>
+          <a:p>
+            <a:fld id="{1D830CF7-A629-914D-98CC-E4B93BB0DA0C}" type="slidenum">
+              <a:t>‹#›</a:t>
+            </a:fld>
+            <a:endParaRPr lang="en-US"/>
+          </a:p>
+        </p:txBody>
+      </p:sp>
+    </p:spTree>
+    <p:extLst>
+      <p:ext uri="{BB962C8B-B14F-4D97-AF65-F5344CB8AC3E}">
+        <p14:creationId xmlns:p14="http://schemas.microsoft.com/office/powerpoint/2010/main" val="3082966192"/>
+      </p:ext>
+    </p:extLst>
+  </p:cSld>
+  <p:clrMap bg1="lt1" tx1="dk1" bg2="lt2" tx2="dk2" accent1="accent1" accent2="accent2" accent3="accent3" accent4="accent4" accent5="accent5" accent6="accent6" hlink="hlink" folHlink="folHlink"/>
+  <p:notesStyle>
+    <a:lvl1pPr marL="0" algn="l" defTabSz="914400" rtl="0" eaLnBrk="1" latinLnBrk="0" hangingPunct="1">
+      <a:defRPr sz="1200" kern="1200">
+        <a:solidFill>
+          <a:schemeClr val="tx1"/>
+        </a:solidFill>
+        <a:latin typeface="+mn-lt"/>
+        <a:ea typeface="+mn-ea"/>
+        <a:cs typeface="+mn-cs"/>
+      </a:defRPr>
+    </a:lvl1pPr>
+    <a:lvl2pPr marL="457200" algn="l" defTabSz="914400" rtl="0" eaLnBrk="1" latinLnBrk="0" hangingPunct="1">
+      <a:defRPr sz="1200" kern="1200">
+        <a:solidFill>
+          <a:schemeClr val="tx1"/>
+        </a:solidFill>
+        <a:latin typeface="+mn-lt"/>
+        <a:ea typeface="+mn-ea"/>
+        <a:cs typeface="+mn-cs"/>
+      </a:defRPr>
+    </a:lvl2pPr>
+    <a:lvl3pPr marL="914400" algn="l" defTabSz="914400" rtl="0" eaLnBrk="1" latinLnBrk="0" hangingPunct="1">
+      <a:defRPr sz="1200" kern="1200">
+        <a:solidFill>
+          <a:schemeClr val="tx1"/>
+        </a:solidFill>
+        <a:latin typeface="+mn-lt"/>
+        <a:ea typeface="+mn-ea"/>
+        <a:cs typeface="+mn-cs"/>
+      </a:defRPr>
+    </a:lvl3pPr>
+    <a:lvl4pPr marL="1371600" algn="l" defTabSz="914400" rtl="0" eaLnBrk="1" latinLnBrk="0" hangingPunct="1">
+      <a:defRPr sz="1200" kern="1200">
+        <a:solidFill>
+          <a:schemeClr val="tx1"/>
+        </a:solidFill>
+        <a:latin typeface="+mn-lt"/>
+        <a:ea typeface="+mn-ea"/>
+        <a:cs typeface="+mn-cs"/>
+      </a:defRPr>
+    </a:lvl4pPr>
+    <a:lvl5pPr marL="1828800" algn="l" defTabSz="914400" rtl="0" eaLnBrk="1" latinLnBrk="0" hangingPunct="1">
+      <a:defRPr sz="1200" kern="1200">
+        <a:solidFill>
+          <a:schemeClr val="tx1"/>
+        </a:solidFill>
+        <a:latin typeface="+mn-lt"/>
+        <a:ea typeface="+mn-ea"/>
+        <a:cs typeface="+mn-cs"/>
+      </a:defRPr>
+    </a:lvl5pPr>
+    <a:lvl6pPr marL="2286000" algn="l" defTabSz="914400" rtl="0" eaLnBrk="1" latinLnBrk="0" hangingPunct="1">
+      <a:defRPr sz="1200" kern="1200">
+        <a:solidFill>
+          <a:schemeClr val="tx1"/>
+        </a:solidFill>
+        <a:latin typeface="+mn-lt"/>
+        <a:ea typeface="+mn-ea"/>
+        <a:cs typeface="+mn-cs"/>
+      </a:defRPr>
+    </a:lvl6pPr>
+    <a:lvl7pPr marL="2743200" algn="l" defTabSz="914400" rtl="0" eaLnBrk="1" latinLnBrk="0" hangingPunct="1">
+      <a:defRPr sz="1200" kern="1200">
+        <a:solidFill>
+          <a:schemeClr val="tx1"/>
+        </a:solidFill>
+        <a:latin typeface="+mn-lt"/>
+        <a:ea typeface="+mn-ea"/>
+        <a:cs typeface="+mn-cs"/>
+      </a:defRPr>
+    </a:lvl7pPr>
+    <a:lvl8pPr marL="3200400" algn="l" defTabSz="914400" rtl="0" eaLnBrk="1" latinLnBrk="0" hangingPunct="1">
+      <a:defRPr sz="1200" kern="1200">
+        <a:solidFill>
+          <a:schemeClr val="tx1"/>
+        </a:solidFill>
+        <a:latin typeface="+mn-lt"/>
+        <a:ea typeface="+mn-ea"/>
+        <a:cs typeface="+mn-cs"/>
+      </a:defRPr>
+    </a:lvl8pPr>
+    <a:lvl9pPr marL="3657600" algn="l" defTabSz="914400" rtl="0" eaLnBrk="1" latinLnBrk="0" hangingPunct="1">
+      <a:defRPr sz="1200" kern="1200">
+        <a:solidFill>
+          <a:schemeClr val="tx1"/>
+        </a:solidFill>
+        <a:latin typeface="+mn-lt"/>
+        <a:ea typeface="+mn-ea"/>
+        <a:cs typeface="+mn-cs"/>
+      </a:defRPr>
+    </a:lvl9pPr>
+  </p:notesStyle>
+</p:notesMaster>
+</file>
+
+<file path=ppt/notesSlides/notesSlide1.xml><?xml version="1.0" encoding="utf-8"?>
+<p:notes xmlns:a="http://schemas.openxmlformats.org/drawingml/2006/main" xmlns:r="http://schemas.openxmlformats.org/officeDocument/2006/relationships" xmlns:p="http://schemas.openxmlformats.org/presentationml/2006/main">
+  <p:cSld>
+    <p:spTree>
+      <p:nvGrpSpPr>
+        <p:cNvPr id="1" name=""/>
+        <p:cNvGrpSpPr/>
+        <p:nvPr/>
+      </p:nvGrpSpPr>
+      <p:grpSpPr>
+        <a:xfrm>
+          <a:off x="0" y="0"/>
+          <a:ext cx="0" cy="0"/>
+          <a:chOff x="0" y="0"/>
+          <a:chExt cx="0" cy="0"/>
+        </a:xfrm>
+      </p:grpSpPr>
+      <p:sp>
+        <p:nvSpPr>
+          <p:cNvPr id="2" name="Slide Image Placeholder 1"/>
+          <p:cNvSpPr>
+            <a:spLocks noGrp="1" noRot="1" noChangeAspect="1"/>
+          </p:cNvSpPr>
+          <p:nvPr>
+            <p:ph type="sldImg"/>
+          </p:nvPr>
+        </p:nvSpPr>
+        <p:spPr/>
+      </p:sp>
+      <p:sp>
+        <p:nvSpPr>
+          <p:cNvPr id="3" name="Notes Placeholder 2"/>
+          <p:cNvSpPr>
+            <a:spLocks noGrp="1"/>
+          </p:cNvSpPr>
+          <p:nvPr>
+            <p:ph type="body" idx="1"/>
+          </p:nvPr>
+        </p:nvSpPr>
+        <p:spPr/>
+        <p:txBody>
+          <a:bodyPr/>
+          <a:lstStyle/>
+          <a:p>
+            <a:endParaRPr lang="en-US"/>
+          </a:p>
+        </p:txBody>
+      </p:sp>
+      <p:sp>
+        <p:nvSpPr>
+          <p:cNvPr id="4" name="Slide Number Placeholder 3"/>
+          <p:cNvSpPr>
+            <a:spLocks noGrp="1"/>
+          </p:cNvSpPr>
+          <p:nvPr>
+            <p:ph type="sldNum" sz="quarter" idx="5"/>
+          </p:nvPr>
+        </p:nvSpPr>
+        <p:spPr/>
+        <p:txBody>
+          <a:bodyPr/>
+          <a:lstStyle/>
+          <a:p>
+            <a:fld id="{1D830CF7-A629-914D-98CC-E4B93BB0DA0C}" type="slidenum">
+              <a:t>3</a:t>
+            </a:fld>
+            <a:endParaRPr lang="en-US"/>
+          </a:p>
+        </p:txBody>
+      </p:sp>
+    </p:spTree>
+    <p:extLst>
+      <p:ext uri="{BB962C8B-B14F-4D97-AF65-F5344CB8AC3E}">
+        <p14:creationId xmlns:p14="http://schemas.microsoft.com/office/powerpoint/2010/main" val="260988271"/>
+      </p:ext>
+    </p:extLst>
+  </p:cSld>
+  <p:clrMapOvr>
+    <a:masterClrMapping/>
+  </p:clrMapOvr>
+</p:notes>
+</file>
+
+<file path=ppt/notesSlides/notesSlide2.xml><?xml version="1.0" encoding="utf-8"?>
+<p:notes xmlns:a="http://schemas.openxmlformats.org/drawingml/2006/main" xmlns:r="http://schemas.openxmlformats.org/officeDocument/2006/relationships" xmlns:p="http://schemas.openxmlformats.org/presentationml/2006/main">
+  <p:cSld>
+    <p:spTree>
+      <p:nvGrpSpPr>
+        <p:cNvPr id="1" name=""/>
+        <p:cNvGrpSpPr/>
+        <p:nvPr/>
+      </p:nvGrpSpPr>
+      <p:grpSpPr>
+        <a:xfrm>
+          <a:off x="0" y="0"/>
+          <a:ext cx="0" cy="0"/>
+          <a:chOff x="0" y="0"/>
+          <a:chExt cx="0" cy="0"/>
+        </a:xfrm>
+      </p:grpSpPr>
+      <p:sp>
+        <p:nvSpPr>
+          <p:cNvPr id="2" name="Slide Image Placeholder 1"/>
+          <p:cNvSpPr>
+            <a:spLocks noGrp="1" noRot="1" noChangeAspect="1"/>
+          </p:cNvSpPr>
+          <p:nvPr>
+            <p:ph type="sldImg"/>
+          </p:nvPr>
+        </p:nvSpPr>
+        <p:spPr/>
+      </p:sp>
+      <p:sp>
+        <p:nvSpPr>
+          <p:cNvPr id="3" name="Notes Placeholder 2"/>
+          <p:cNvSpPr>
+            <a:spLocks noGrp="1"/>
+          </p:cNvSpPr>
+          <p:nvPr>
+            <p:ph type="body" idx="1"/>
+          </p:nvPr>
+        </p:nvSpPr>
+        <p:spPr/>
+        <p:txBody>
+          <a:bodyPr/>
+          <a:lstStyle/>
+          <a:p>
+            <a:endParaRPr lang="en-US"/>
+          </a:p>
+        </p:txBody>
+      </p:sp>
+      <p:sp>
+        <p:nvSpPr>
+          <p:cNvPr id="4" name="Slide Number Placeholder 3"/>
+          <p:cNvSpPr>
+            <a:spLocks noGrp="1"/>
+          </p:cNvSpPr>
+          <p:nvPr>
+            <p:ph type="sldNum" sz="quarter" idx="5"/>
+          </p:nvPr>
+        </p:nvSpPr>
+        <p:spPr/>
+        <p:txBody>
+          <a:bodyPr/>
+          <a:lstStyle/>
+          <a:p>
+            <a:fld id="{1D830CF7-A629-914D-98CC-E4B93BB0DA0C}" type="slidenum">
+              <a:t>4</a:t>
+            </a:fld>
+            <a:endParaRPr lang="en-US"/>
+          </a:p>
+        </p:txBody>
+      </p:sp>
+    </p:spTree>
+    <p:extLst>
+      <p:ext uri="{BB962C8B-B14F-4D97-AF65-F5344CB8AC3E}">
+        <p14:creationId xmlns:p14="http://schemas.microsoft.com/office/powerpoint/2010/main" val="567348833"/>
+      </p:ext>
+    </p:extLst>
+  </p:cSld>
+  <p:clrMapOvr>
+    <a:masterClrMapping/>
+  </p:clrMapOvr>
+</p:notes>
+</file>
+
 <file path=ppt/slideLayouts/slideLayout1.xml><?xml version="1.0" encoding="utf-8"?>
 <p:sldLayout xmlns:a="http://schemas.openxmlformats.org/drawingml/2006/main" xmlns:r="http://schemas.openxmlformats.org/officeDocument/2006/relationships" xmlns:p="http://schemas.openxmlformats.org/presentationml/2006/main" type="title" preserve="1">
   <p:cSld name="Title Slide">
@@ -261,7 +780,7 @@
           <a:lstStyle/>
           <a:p>
             <a:fld id="{803220A4-8895-6D46-A558-2CE2469121C7}" type="datetimeFigureOut">
-              <a:t>4/25/20</a:t>
+              <a:t>5/24/20</a:t>
             </a:fld>
             <a:endParaRPr lang="en-US"/>
           </a:p>
@@ -459,7 +978,7 @@
           <a:lstStyle/>
           <a:p>
             <a:fld id="{803220A4-8895-6D46-A558-2CE2469121C7}" type="datetimeFigureOut">
-              <a:t>4/25/20</a:t>
+              <a:t>5/24/20</a:t>
             </a:fld>
             <a:endParaRPr lang="en-US"/>
           </a:p>
@@ -667,7 +1186,7 @@
           <a:lstStyle/>
           <a:p>
             <a:fld id="{803220A4-8895-6D46-A558-2CE2469121C7}" type="datetimeFigureOut">
-              <a:t>4/25/20</a:t>
+              <a:t>5/24/20</a:t>
             </a:fld>
             <a:endParaRPr lang="en-US"/>
           </a:p>
@@ -865,7 +1384,7 @@
           <a:lstStyle/>
           <a:p>
             <a:fld id="{803220A4-8895-6D46-A558-2CE2469121C7}" type="datetimeFigureOut">
-              <a:t>4/25/20</a:t>
+              <a:t>5/24/20</a:t>
             </a:fld>
             <a:endParaRPr lang="en-US"/>
           </a:p>
@@ -1139,7 +1658,7 @@
           <a:lstStyle/>
           <a:p>
             <a:fld id="{803220A4-8895-6D46-A558-2CE2469121C7}" type="datetimeFigureOut">
-              <a:t>4/25/20</a:t>
+              <a:t>5/24/20</a:t>
             </a:fld>
             <a:endParaRPr lang="en-US"/>
           </a:p>
@@ -1405,7 +1924,7 @@
           <a:lstStyle/>
           <a:p>
             <a:fld id="{803220A4-8895-6D46-A558-2CE2469121C7}" type="datetimeFigureOut">
-              <a:t>4/25/20</a:t>
+              <a:t>5/24/20</a:t>
             </a:fld>
             <a:endParaRPr lang="en-US"/>
           </a:p>
@@ -1818,7 +2337,7 @@
           <a:lstStyle/>
           <a:p>
             <a:fld id="{803220A4-8895-6D46-A558-2CE2469121C7}" type="datetimeFigureOut">
-              <a:t>4/25/20</a:t>
+              <a:t>5/24/20</a:t>
             </a:fld>
             <a:endParaRPr lang="en-US"/>
           </a:p>
@@ -1958,7 +2477,7 @@
           <a:lstStyle/>
           <a:p>
             <a:fld id="{803220A4-8895-6D46-A558-2CE2469121C7}" type="datetimeFigureOut">
-              <a:t>4/25/20</a:t>
+              <a:t>5/24/20</a:t>
             </a:fld>
             <a:endParaRPr lang="en-US"/>
           </a:p>
@@ -2069,7 +2588,7 @@
           <a:lstStyle/>
           <a:p>
             <a:fld id="{803220A4-8895-6D46-A558-2CE2469121C7}" type="datetimeFigureOut">
-              <a:t>4/25/20</a:t>
+              <a:t>5/24/20</a:t>
             </a:fld>
             <a:endParaRPr lang="en-US"/>
           </a:p>
@@ -2380,7 +2899,7 @@
           <a:lstStyle/>
           <a:p>
             <a:fld id="{803220A4-8895-6D46-A558-2CE2469121C7}" type="datetimeFigureOut">
-              <a:t>4/25/20</a:t>
+              <a:t>5/24/20</a:t>
             </a:fld>
             <a:endParaRPr lang="en-US"/>
           </a:p>
@@ -2667,7 +3186,7 @@
           <a:lstStyle/>
           <a:p>
             <a:fld id="{803220A4-8895-6D46-A558-2CE2469121C7}" type="datetimeFigureOut">
-              <a:t>4/25/20</a:t>
+              <a:t>5/24/20</a:t>
             </a:fld>
             <a:endParaRPr lang="en-US"/>
           </a:p>
@@ -2908,7 +3427,7 @@
           </a:lstStyle>
           <a:p>
             <a:fld id="{803220A4-8895-6D46-A558-2CE2469121C7}" type="datetimeFigureOut">
-              <a:t>4/25/20</a:t>
+              <a:t>5/24/20</a:t>
             </a:fld>
             <a:endParaRPr lang="en-US"/>
           </a:p>
@@ -7985,6 +8504,3200 @@
 </p:sld>
 </file>
 
+<file path=ppt/slides/slide3.xml><?xml version="1.0" encoding="utf-8"?>
+<p:sld xmlns:a="http://schemas.openxmlformats.org/drawingml/2006/main" xmlns:r="http://schemas.openxmlformats.org/officeDocument/2006/relationships" xmlns:p="http://schemas.openxmlformats.org/presentationml/2006/main">
+  <p:cSld>
+    <p:spTree>
+      <p:nvGrpSpPr>
+        <p:cNvPr id="1" name=""/>
+        <p:cNvGrpSpPr/>
+        <p:nvPr/>
+      </p:nvGrpSpPr>
+      <p:grpSpPr>
+        <a:xfrm>
+          <a:off x="0" y="0"/>
+          <a:ext cx="0" cy="0"/>
+          <a:chOff x="0" y="0"/>
+          <a:chExt cx="0" cy="0"/>
+        </a:xfrm>
+      </p:grpSpPr>
+      <p:sp>
+        <p:nvSpPr>
+          <p:cNvPr id="4" name="Hexagon 3">
+            <a:extLst>
+              <a:ext uri="{FF2B5EF4-FFF2-40B4-BE49-F238E27FC236}">
+                <a16:creationId xmlns:a16="http://schemas.microsoft.com/office/drawing/2014/main" id="{23CB137D-5BB4-1242-8225-A9DF14533DE8}"/>
+              </a:ext>
+            </a:extLst>
+          </p:cNvPr>
+          <p:cNvSpPr/>
+          <p:nvPr/>
+        </p:nvSpPr>
+        <p:spPr>
+          <a:xfrm>
+            <a:off x="2595206" y="1738595"/>
+            <a:ext cx="1614272" cy="1238261"/>
+          </a:xfrm>
+          <a:prstGeom prst="hexagon">
+            <a:avLst/>
+          </a:prstGeom>
+        </p:spPr>
+        <p:style>
+          <a:lnRef idx="1">
+            <a:schemeClr val="accent6"/>
+          </a:lnRef>
+          <a:fillRef idx="2">
+            <a:schemeClr val="accent6"/>
+          </a:fillRef>
+          <a:effectRef idx="1">
+            <a:schemeClr val="accent6"/>
+          </a:effectRef>
+          <a:fontRef idx="minor">
+            <a:schemeClr val="dk1"/>
+          </a:fontRef>
+        </p:style>
+        <p:txBody>
+          <a:bodyPr lIns="36000" rIns="36000" rtlCol="0" anchor="ctr"/>
+          <a:lstStyle/>
+          <a:p>
+            <a:pPr algn="ctr"/>
+            <a:r>
+              <a:rPr lang="en-US"/>
+              <a:t>Sense:</a:t>
+            </a:r>
+            <a:br>
+              <a:rPr lang="en-US"/>
+            </a:br>
+            <a:r>
+              <a:rPr lang="en-US" b="1"/>
+              <a:t>move.n.03</a:t>
+            </a:r>
+          </a:p>
+        </p:txBody>
+      </p:sp>
+      <p:sp>
+        <p:nvSpPr>
+          <p:cNvPr id="5" name="Hexagon 4">
+            <a:extLst>
+              <a:ext uri="{FF2B5EF4-FFF2-40B4-BE49-F238E27FC236}">
+                <a16:creationId xmlns:a16="http://schemas.microsoft.com/office/drawing/2014/main" id="{737AC331-5BBD-FA48-A45D-777447720597}"/>
+              </a:ext>
+            </a:extLst>
+          </p:cNvPr>
+          <p:cNvSpPr/>
+          <p:nvPr/>
+        </p:nvSpPr>
+        <p:spPr>
+          <a:xfrm>
+            <a:off x="7432254" y="1793022"/>
+            <a:ext cx="1614272" cy="1238262"/>
+          </a:xfrm>
+          <a:prstGeom prst="hexagon">
+            <a:avLst/>
+          </a:prstGeom>
+        </p:spPr>
+        <p:style>
+          <a:lnRef idx="1">
+            <a:schemeClr val="accent6"/>
+          </a:lnRef>
+          <a:fillRef idx="2">
+            <a:schemeClr val="accent6"/>
+          </a:fillRef>
+          <a:effectRef idx="1">
+            <a:schemeClr val="accent6"/>
+          </a:effectRef>
+          <a:fontRef idx="minor">
+            <a:schemeClr val="dk1"/>
+          </a:fontRef>
+        </p:style>
+        <p:txBody>
+          <a:bodyPr lIns="72000" rIns="72000" rtlCol="0" anchor="ctr"/>
+          <a:lstStyle/>
+          <a:p>
+            <a:pPr algn="ctr"/>
+            <a:r>
+              <a:rPr lang="en-US"/>
+              <a:t>Sense</a:t>
+            </a:r>
+            <a:r>
+              <a:rPr lang="en-US" b="1"/>
+              <a:t>: move.v.01</a:t>
+            </a:r>
+          </a:p>
+        </p:txBody>
+      </p:sp>
+      <p:sp>
+        <p:nvSpPr>
+          <p:cNvPr id="10" name="Oval 9">
+            <a:extLst>
+              <a:ext uri="{FF2B5EF4-FFF2-40B4-BE49-F238E27FC236}">
+                <a16:creationId xmlns:a16="http://schemas.microsoft.com/office/drawing/2014/main" id="{FB1EEE0F-550B-0240-B3E5-35DDEF14A90F}"/>
+              </a:ext>
+            </a:extLst>
+          </p:cNvPr>
+          <p:cNvSpPr/>
+          <p:nvPr/>
+        </p:nvSpPr>
+        <p:spPr>
+          <a:xfrm>
+            <a:off x="274567" y="5229705"/>
+            <a:ext cx="3135366" cy="1329869"/>
+          </a:xfrm>
+          <a:prstGeom prst="ellipse">
+            <a:avLst/>
+          </a:prstGeom>
+        </p:spPr>
+        <p:style>
+          <a:lnRef idx="1">
+            <a:schemeClr val="accent5"/>
+          </a:lnRef>
+          <a:fillRef idx="2">
+            <a:schemeClr val="accent5"/>
+          </a:fillRef>
+          <a:effectRef idx="1">
+            <a:schemeClr val="accent5"/>
+          </a:effectRef>
+          <a:fontRef idx="minor">
+            <a:schemeClr val="dk1"/>
+          </a:fontRef>
+        </p:style>
+        <p:txBody>
+          <a:bodyPr wrap="square" lIns="0" tIns="36000" rIns="0" bIns="36000" rtlCol="0" anchor="ctr"/>
+          <a:lstStyle/>
+          <a:p>
+            <a:pPr algn="ctr"/>
+            <a:r>
+              <a:rPr lang="en-GB"/>
+              <a:t>(game) a player's turn</a:t>
+            </a:r>
+            <a:br>
+              <a:rPr lang="en-GB"/>
+            </a:br>
+            <a:r>
+              <a:rPr lang="en-GB"/>
+              <a:t> to take some action </a:t>
+            </a:r>
+            <a:br>
+              <a:rPr lang="en-GB"/>
+            </a:br>
+            <a:r>
+              <a:rPr lang="en-GB"/>
+              <a:t>permitted by the rules of the game</a:t>
+            </a:r>
+          </a:p>
+        </p:txBody>
+      </p:sp>
+      <p:sp>
+        <p:nvSpPr>
+          <p:cNvPr id="15" name="Oval 14">
+            <a:extLst>
+              <a:ext uri="{FF2B5EF4-FFF2-40B4-BE49-F238E27FC236}">
+                <a16:creationId xmlns:a16="http://schemas.microsoft.com/office/drawing/2014/main" id="{4B3A3DA1-3524-6947-AEC8-7B51B2E19083}"/>
+              </a:ext>
+            </a:extLst>
+          </p:cNvPr>
+          <p:cNvSpPr/>
+          <p:nvPr/>
+        </p:nvSpPr>
+        <p:spPr>
+          <a:xfrm>
+            <a:off x="10100729" y="2013940"/>
+            <a:ext cx="1942825" cy="1415060"/>
+          </a:xfrm>
+          <a:prstGeom prst="ellipse">
+            <a:avLst/>
+          </a:prstGeom>
+        </p:spPr>
+        <p:style>
+          <a:lnRef idx="1">
+            <a:schemeClr val="accent5"/>
+          </a:lnRef>
+          <a:fillRef idx="3">
+            <a:schemeClr val="accent5"/>
+          </a:fillRef>
+          <a:effectRef idx="2">
+            <a:schemeClr val="accent5"/>
+          </a:effectRef>
+          <a:fontRef idx="minor">
+            <a:schemeClr val="lt1"/>
+          </a:fontRef>
+        </p:style>
+        <p:txBody>
+          <a:bodyPr rtlCol="0" anchor="ctr"/>
+          <a:lstStyle/>
+          <a:p>
+            <a:pPr algn="ctr"/>
+            <a:r>
+              <a:rPr lang="en-US"/>
+              <a:t>We moved from Idaho to Nebraska</a:t>
+            </a:r>
+          </a:p>
+        </p:txBody>
+      </p:sp>
+      <p:sp>
+        <p:nvSpPr>
+          <p:cNvPr id="16" name="Oval 15">
+            <a:extLst>
+              <a:ext uri="{FF2B5EF4-FFF2-40B4-BE49-F238E27FC236}">
+                <a16:creationId xmlns:a16="http://schemas.microsoft.com/office/drawing/2014/main" id="{34646155-B817-374A-A232-C0B892632DB7}"/>
+              </a:ext>
+            </a:extLst>
+          </p:cNvPr>
+          <p:cNvSpPr/>
+          <p:nvPr/>
+        </p:nvSpPr>
+        <p:spPr>
+          <a:xfrm>
+            <a:off x="9927587" y="3783666"/>
+            <a:ext cx="2247772" cy="1272479"/>
+          </a:xfrm>
+          <a:prstGeom prst="ellipse">
+            <a:avLst/>
+          </a:prstGeom>
+        </p:spPr>
+        <p:style>
+          <a:lnRef idx="1">
+            <a:schemeClr val="accent5"/>
+          </a:lnRef>
+          <a:fillRef idx="3">
+            <a:schemeClr val="accent5"/>
+          </a:fillRef>
+          <a:effectRef idx="2">
+            <a:schemeClr val="accent5"/>
+          </a:effectRef>
+          <a:fontRef idx="minor">
+            <a:schemeClr val="lt1"/>
+          </a:fontRef>
+        </p:style>
+        <p:txBody>
+          <a:bodyPr rtlCol="0" anchor="ctr"/>
+          <a:lstStyle/>
+          <a:p>
+            <a:pPr algn="ctr"/>
+            <a:r>
+              <a:rPr lang="en-US"/>
+              <a:t>The basketball player moved from one team to another</a:t>
+            </a:r>
+          </a:p>
+        </p:txBody>
+      </p:sp>
+      <p:cxnSp>
+        <p:nvCxnSpPr>
+          <p:cNvPr id="19" name="Straight Arrow Connector 18">
+            <a:extLst>
+              <a:ext uri="{FF2B5EF4-FFF2-40B4-BE49-F238E27FC236}">
+                <a16:creationId xmlns:a16="http://schemas.microsoft.com/office/drawing/2014/main" id="{57242243-82A7-9E4D-BE25-79B9DDF8054D}"/>
+              </a:ext>
+            </a:extLst>
+          </p:cNvPr>
+          <p:cNvCxnSpPr>
+            <a:cxnSpLocks/>
+            <a:stCxn id="144" idx="6"/>
+            <a:endCxn id="4" idx="3"/>
+          </p:cNvCxnSpPr>
+          <p:nvPr/>
+        </p:nvCxnSpPr>
+        <p:spPr>
+          <a:xfrm>
+            <a:off x="1941056" y="2335824"/>
+            <a:ext cx="654150" cy="21902"/>
+          </a:xfrm>
+          <a:prstGeom prst="straightConnector1">
+            <a:avLst/>
+          </a:prstGeom>
+          <a:ln w="19050">
+            <a:tailEnd type="triangle"/>
+          </a:ln>
+        </p:spPr>
+        <p:style>
+          <a:lnRef idx="1">
+            <a:schemeClr val="accent1"/>
+          </a:lnRef>
+          <a:fillRef idx="0">
+            <a:schemeClr val="accent1"/>
+          </a:fillRef>
+          <a:effectRef idx="0">
+            <a:schemeClr val="accent1"/>
+          </a:effectRef>
+          <a:fontRef idx="minor">
+            <a:schemeClr val="tx1"/>
+          </a:fontRef>
+        </p:style>
+      </p:cxnSp>
+      <p:cxnSp>
+        <p:nvCxnSpPr>
+          <p:cNvPr id="21" name="Straight Arrow Connector 20">
+            <a:extLst>
+              <a:ext uri="{FF2B5EF4-FFF2-40B4-BE49-F238E27FC236}">
+                <a16:creationId xmlns:a16="http://schemas.microsoft.com/office/drawing/2014/main" id="{2CC2FD02-87A6-7445-B7DF-8DA0E85D885E}"/>
+              </a:ext>
+            </a:extLst>
+          </p:cNvPr>
+          <p:cNvCxnSpPr>
+            <a:cxnSpLocks/>
+            <a:stCxn id="141" idx="4"/>
+            <a:endCxn id="4" idx="4"/>
+          </p:cNvCxnSpPr>
+          <p:nvPr/>
+        </p:nvCxnSpPr>
+        <p:spPr>
+          <a:xfrm>
+            <a:off x="2595206" y="1140903"/>
+            <a:ext cx="309565" cy="597692"/>
+          </a:xfrm>
+          <a:prstGeom prst="straightConnector1">
+            <a:avLst/>
+          </a:prstGeom>
+          <a:ln w="19050">
+            <a:tailEnd type="triangle"/>
+          </a:ln>
+        </p:spPr>
+        <p:style>
+          <a:lnRef idx="1">
+            <a:schemeClr val="accent1"/>
+          </a:lnRef>
+          <a:fillRef idx="0">
+            <a:schemeClr val="accent1"/>
+          </a:fillRef>
+          <a:effectRef idx="0">
+            <a:schemeClr val="accent1"/>
+          </a:effectRef>
+          <a:fontRef idx="minor">
+            <a:schemeClr val="tx1"/>
+          </a:fontRef>
+        </p:style>
+      </p:cxnSp>
+      <p:cxnSp>
+        <p:nvCxnSpPr>
+          <p:cNvPr id="26" name="Straight Arrow Connector 25">
+            <a:extLst>
+              <a:ext uri="{FF2B5EF4-FFF2-40B4-BE49-F238E27FC236}">
+                <a16:creationId xmlns:a16="http://schemas.microsoft.com/office/drawing/2014/main" id="{BFC77110-2ABC-564B-B7D2-77DA3A0028E0}"/>
+              </a:ext>
+            </a:extLst>
+          </p:cNvPr>
+          <p:cNvCxnSpPr>
+            <a:cxnSpLocks/>
+            <a:stCxn id="10" idx="0"/>
+            <a:endCxn id="120" idx="2"/>
+          </p:cNvCxnSpPr>
+          <p:nvPr/>
+        </p:nvCxnSpPr>
+        <p:spPr>
+          <a:xfrm flipV="1">
+            <a:off x="1842250" y="4625914"/>
+            <a:ext cx="1079659" cy="603791"/>
+          </a:xfrm>
+          <a:prstGeom prst="straightConnector1">
+            <a:avLst/>
+          </a:prstGeom>
+          <a:ln w="19050">
+            <a:tailEnd type="triangle"/>
+          </a:ln>
+        </p:spPr>
+        <p:style>
+          <a:lnRef idx="1">
+            <a:schemeClr val="accent1"/>
+          </a:lnRef>
+          <a:fillRef idx="0">
+            <a:schemeClr val="accent1"/>
+          </a:fillRef>
+          <a:effectRef idx="0">
+            <a:schemeClr val="accent1"/>
+          </a:effectRef>
+          <a:fontRef idx="minor">
+            <a:schemeClr val="tx1"/>
+          </a:fontRef>
+        </p:style>
+      </p:cxnSp>
+      <p:cxnSp>
+        <p:nvCxnSpPr>
+          <p:cNvPr id="37" name="Straight Arrow Connector 36">
+            <a:extLst>
+              <a:ext uri="{FF2B5EF4-FFF2-40B4-BE49-F238E27FC236}">
+                <a16:creationId xmlns:a16="http://schemas.microsoft.com/office/drawing/2014/main" id="{492A2287-310F-B946-AEF1-82B998E15392}"/>
+              </a:ext>
+            </a:extLst>
+          </p:cNvPr>
+          <p:cNvCxnSpPr>
+            <a:cxnSpLocks/>
+            <a:stCxn id="15" idx="2"/>
+            <a:endCxn id="5" idx="0"/>
+          </p:cNvCxnSpPr>
+          <p:nvPr/>
+        </p:nvCxnSpPr>
+        <p:spPr>
+          <a:xfrm flipH="1" flipV="1">
+            <a:off x="9046526" y="2412153"/>
+            <a:ext cx="1054203" cy="309317"/>
+          </a:xfrm>
+          <a:prstGeom prst="straightConnector1">
+            <a:avLst/>
+          </a:prstGeom>
+          <a:ln w="19050">
+            <a:tailEnd type="triangle"/>
+          </a:ln>
+        </p:spPr>
+        <p:style>
+          <a:lnRef idx="1">
+            <a:schemeClr val="accent1"/>
+          </a:lnRef>
+          <a:fillRef idx="0">
+            <a:schemeClr val="accent1"/>
+          </a:fillRef>
+          <a:effectRef idx="0">
+            <a:schemeClr val="accent1"/>
+          </a:effectRef>
+          <a:fontRef idx="minor">
+            <a:schemeClr val="tx1"/>
+          </a:fontRef>
+        </p:style>
+      </p:cxnSp>
+      <p:cxnSp>
+        <p:nvCxnSpPr>
+          <p:cNvPr id="39" name="Straight Arrow Connector 38">
+            <a:extLst>
+              <a:ext uri="{FF2B5EF4-FFF2-40B4-BE49-F238E27FC236}">
+                <a16:creationId xmlns:a16="http://schemas.microsoft.com/office/drawing/2014/main" id="{94CD089F-5773-E04C-BDC5-512549EA62F0}"/>
+              </a:ext>
+            </a:extLst>
+          </p:cNvPr>
+          <p:cNvCxnSpPr>
+            <a:cxnSpLocks/>
+            <a:stCxn id="16" idx="1"/>
+            <a:endCxn id="5" idx="1"/>
+          </p:cNvCxnSpPr>
+          <p:nvPr/>
+        </p:nvCxnSpPr>
+        <p:spPr>
+          <a:xfrm flipH="1" flipV="1">
+            <a:off x="8736961" y="3031284"/>
+            <a:ext cx="1519805" cy="938732"/>
+          </a:xfrm>
+          <a:prstGeom prst="straightConnector1">
+            <a:avLst/>
+          </a:prstGeom>
+          <a:ln w="19050">
+            <a:tailEnd type="triangle"/>
+          </a:ln>
+        </p:spPr>
+        <p:style>
+          <a:lnRef idx="1">
+            <a:schemeClr val="accent1"/>
+          </a:lnRef>
+          <a:fillRef idx="0">
+            <a:schemeClr val="accent1"/>
+          </a:fillRef>
+          <a:effectRef idx="0">
+            <a:schemeClr val="accent1"/>
+          </a:effectRef>
+          <a:fontRef idx="minor">
+            <a:schemeClr val="tx1"/>
+          </a:fontRef>
+        </p:style>
+      </p:cxnSp>
+      <p:sp>
+        <p:nvSpPr>
+          <p:cNvPr id="50" name="Rectangle 49">
+            <a:extLst>
+              <a:ext uri="{FF2B5EF4-FFF2-40B4-BE49-F238E27FC236}">
+                <a16:creationId xmlns:a16="http://schemas.microsoft.com/office/drawing/2014/main" id="{B8D579BA-5C4C-E14D-A374-B9DDC758B117}"/>
+              </a:ext>
+            </a:extLst>
+          </p:cNvPr>
+          <p:cNvSpPr/>
+          <p:nvPr/>
+        </p:nvSpPr>
+        <p:spPr>
+          <a:xfrm>
+            <a:off x="5006994" y="2718127"/>
+            <a:ext cx="1181046" cy="1005204"/>
+          </a:xfrm>
+          <a:prstGeom prst="rect">
+            <a:avLst/>
+          </a:prstGeom>
+        </p:spPr>
+        <p:style>
+          <a:lnRef idx="2">
+            <a:schemeClr val="accent4">
+              <a:shade val="50000"/>
+            </a:schemeClr>
+          </a:lnRef>
+          <a:fillRef idx="1">
+            <a:schemeClr val="accent4"/>
+          </a:fillRef>
+          <a:effectRef idx="0">
+            <a:schemeClr val="accent4"/>
+          </a:effectRef>
+          <a:fontRef idx="minor">
+            <a:schemeClr val="lt1"/>
+          </a:fontRef>
+        </p:style>
+        <p:txBody>
+          <a:bodyPr rtlCol="0" anchor="ctr"/>
+          <a:lstStyle/>
+          <a:p>
+            <a:pPr algn="ctr"/>
+            <a:r>
+              <a:rPr lang="en-US" b="1"/>
+              <a:t>move</a:t>
+            </a:r>
+          </a:p>
+        </p:txBody>
+      </p:sp>
+      <p:cxnSp>
+        <p:nvCxnSpPr>
+          <p:cNvPr id="74" name="Straight Arrow Connector 73">
+            <a:extLst>
+              <a:ext uri="{FF2B5EF4-FFF2-40B4-BE49-F238E27FC236}">
+                <a16:creationId xmlns:a16="http://schemas.microsoft.com/office/drawing/2014/main" id="{2CA80652-C6E3-4A4A-9B7C-3339EEF97881}"/>
+              </a:ext>
+            </a:extLst>
+          </p:cNvPr>
+          <p:cNvCxnSpPr>
+            <a:cxnSpLocks/>
+            <a:endCxn id="4" idx="0"/>
+          </p:cNvCxnSpPr>
+          <p:nvPr/>
+        </p:nvCxnSpPr>
+        <p:spPr>
+          <a:xfrm flipH="1" flipV="1">
+            <a:off x="4209478" y="2357726"/>
+            <a:ext cx="780378" cy="357467"/>
+          </a:xfrm>
+          <a:prstGeom prst="straightConnector1">
+            <a:avLst/>
+          </a:prstGeom>
+          <a:ln w="19050">
+            <a:tailEnd type="triangle"/>
+          </a:ln>
+        </p:spPr>
+        <p:style>
+          <a:lnRef idx="1">
+            <a:schemeClr val="accent1"/>
+          </a:lnRef>
+          <a:fillRef idx="0">
+            <a:schemeClr val="accent1"/>
+          </a:fillRef>
+          <a:effectRef idx="0">
+            <a:schemeClr val="accent1"/>
+          </a:effectRef>
+          <a:fontRef idx="minor">
+            <a:schemeClr val="tx1"/>
+          </a:fontRef>
+        </p:style>
+      </p:cxnSp>
+      <p:cxnSp>
+        <p:nvCxnSpPr>
+          <p:cNvPr id="77" name="Straight Arrow Connector 76">
+            <a:extLst>
+              <a:ext uri="{FF2B5EF4-FFF2-40B4-BE49-F238E27FC236}">
+                <a16:creationId xmlns:a16="http://schemas.microsoft.com/office/drawing/2014/main" id="{FCC9F9F5-A0D1-274E-8660-513EEA6C0190}"/>
+              </a:ext>
+            </a:extLst>
+          </p:cNvPr>
+          <p:cNvCxnSpPr>
+            <a:cxnSpLocks/>
+            <a:endCxn id="5" idx="3"/>
+          </p:cNvCxnSpPr>
+          <p:nvPr/>
+        </p:nvCxnSpPr>
+        <p:spPr>
+          <a:xfrm flipV="1">
+            <a:off x="6205178" y="2412153"/>
+            <a:ext cx="1227076" cy="325296"/>
+          </a:xfrm>
+          <a:prstGeom prst="straightConnector1">
+            <a:avLst/>
+          </a:prstGeom>
+          <a:ln w="19050">
+            <a:tailEnd type="triangle"/>
+          </a:ln>
+        </p:spPr>
+        <p:style>
+          <a:lnRef idx="1">
+            <a:schemeClr val="accent1"/>
+          </a:lnRef>
+          <a:fillRef idx="0">
+            <a:schemeClr val="accent1"/>
+          </a:fillRef>
+          <a:effectRef idx="0">
+            <a:schemeClr val="accent1"/>
+          </a:effectRef>
+          <a:fontRef idx="minor">
+            <a:schemeClr val="tx1"/>
+          </a:fontRef>
+        </p:style>
+      </p:cxnSp>
+      <p:sp>
+        <p:nvSpPr>
+          <p:cNvPr id="87" name="Rectangle 86">
+            <a:extLst>
+              <a:ext uri="{FF2B5EF4-FFF2-40B4-BE49-F238E27FC236}">
+                <a16:creationId xmlns:a16="http://schemas.microsoft.com/office/drawing/2014/main" id="{DF7E396D-D895-144E-ABBF-93B50E5CBD08}"/>
+              </a:ext>
+            </a:extLst>
+          </p:cNvPr>
+          <p:cNvSpPr/>
+          <p:nvPr/>
+        </p:nvSpPr>
+        <p:spPr>
+          <a:xfrm>
+            <a:off x="4656789" y="5350476"/>
+            <a:ext cx="1181047" cy="1005204"/>
+          </a:xfrm>
+          <a:prstGeom prst="rect">
+            <a:avLst/>
+          </a:prstGeom>
+        </p:spPr>
+        <p:style>
+          <a:lnRef idx="2">
+            <a:schemeClr val="accent4">
+              <a:shade val="50000"/>
+            </a:schemeClr>
+          </a:lnRef>
+          <a:fillRef idx="1">
+            <a:schemeClr val="accent4"/>
+          </a:fillRef>
+          <a:effectRef idx="0">
+            <a:schemeClr val="accent4"/>
+          </a:effectRef>
+          <a:fontRef idx="minor">
+            <a:schemeClr val="lt1"/>
+          </a:fontRef>
+        </p:style>
+        <p:txBody>
+          <a:bodyPr rtlCol="0" anchor="ctr"/>
+          <a:lstStyle/>
+          <a:p>
+            <a:pPr algn="ctr"/>
+            <a:r>
+              <a:rPr lang="en-US" b="1"/>
+              <a:t>relocation</a:t>
+            </a:r>
+          </a:p>
+        </p:txBody>
+      </p:sp>
+      <p:sp>
+        <p:nvSpPr>
+          <p:cNvPr id="88" name="Rectangle 87">
+            <a:extLst>
+              <a:ext uri="{FF2B5EF4-FFF2-40B4-BE49-F238E27FC236}">
+                <a16:creationId xmlns:a16="http://schemas.microsoft.com/office/drawing/2014/main" id="{60E71F45-C6CC-0B4A-BF8B-7B8E99EC8AC5}"/>
+              </a:ext>
+            </a:extLst>
+          </p:cNvPr>
+          <p:cNvSpPr/>
+          <p:nvPr/>
+        </p:nvSpPr>
+        <p:spPr>
+          <a:xfrm>
+            <a:off x="6875707" y="5350476"/>
+            <a:ext cx="1118380" cy="1005204"/>
+          </a:xfrm>
+          <a:prstGeom prst="rect">
+            <a:avLst/>
+          </a:prstGeom>
+        </p:spPr>
+        <p:style>
+          <a:lnRef idx="2">
+            <a:schemeClr val="accent4">
+              <a:shade val="50000"/>
+            </a:schemeClr>
+          </a:lnRef>
+          <a:fillRef idx="1">
+            <a:schemeClr val="accent4"/>
+          </a:fillRef>
+          <a:effectRef idx="0">
+            <a:schemeClr val="accent4"/>
+          </a:effectRef>
+          <a:fontRef idx="minor">
+            <a:schemeClr val="lt1"/>
+          </a:fontRef>
+        </p:style>
+        <p:txBody>
+          <a:bodyPr rtlCol="0" anchor="ctr"/>
+          <a:lstStyle/>
+          <a:p>
+            <a:pPr algn="ctr"/>
+            <a:r>
+              <a:rPr lang="en-US" b="1"/>
+              <a:t>displace</a:t>
+            </a:r>
+          </a:p>
+        </p:txBody>
+      </p:sp>
+      <p:sp>
+        <p:nvSpPr>
+          <p:cNvPr id="89" name="Rectangle 88">
+            <a:extLst>
+              <a:ext uri="{FF2B5EF4-FFF2-40B4-BE49-F238E27FC236}">
+                <a16:creationId xmlns:a16="http://schemas.microsoft.com/office/drawing/2014/main" id="{60F5BE5E-7866-9F47-9CB4-9ED7E0155F3F}"/>
+              </a:ext>
+            </a:extLst>
+          </p:cNvPr>
+          <p:cNvSpPr/>
+          <p:nvPr/>
+        </p:nvSpPr>
+        <p:spPr>
+          <a:xfrm>
+            <a:off x="8736961" y="5350476"/>
+            <a:ext cx="1210306" cy="1005204"/>
+          </a:xfrm>
+          <a:prstGeom prst="rect">
+            <a:avLst/>
+          </a:prstGeom>
+        </p:spPr>
+        <p:style>
+          <a:lnRef idx="2">
+            <a:schemeClr val="accent4">
+              <a:shade val="50000"/>
+            </a:schemeClr>
+          </a:lnRef>
+          <a:fillRef idx="1">
+            <a:schemeClr val="accent4"/>
+          </a:fillRef>
+          <a:effectRef idx="0">
+            <a:schemeClr val="accent4"/>
+          </a:effectRef>
+          <a:fontRef idx="minor">
+            <a:schemeClr val="lt1"/>
+          </a:fontRef>
+        </p:style>
+        <p:txBody>
+          <a:bodyPr rtlCol="0" anchor="ctr"/>
+          <a:lstStyle/>
+          <a:p>
+            <a:pPr algn="ctr"/>
+            <a:r>
+              <a:rPr lang="en-US" b="1"/>
+              <a:t>stay</a:t>
+            </a:r>
+          </a:p>
+        </p:txBody>
+      </p:sp>
+      <p:cxnSp>
+        <p:nvCxnSpPr>
+          <p:cNvPr id="91" name="Straight Arrow Connector 90">
+            <a:extLst>
+              <a:ext uri="{FF2B5EF4-FFF2-40B4-BE49-F238E27FC236}">
+                <a16:creationId xmlns:a16="http://schemas.microsoft.com/office/drawing/2014/main" id="{3EA62AF8-D830-9541-863A-8A0083BBB424}"/>
+              </a:ext>
+            </a:extLst>
+          </p:cNvPr>
+          <p:cNvCxnSpPr>
+            <a:cxnSpLocks/>
+            <a:stCxn id="50" idx="2"/>
+            <a:endCxn id="87" idx="0"/>
+          </p:cNvCxnSpPr>
+          <p:nvPr/>
+        </p:nvCxnSpPr>
+        <p:spPr>
+          <a:xfrm flipH="1">
+            <a:off x="5247313" y="3723331"/>
+            <a:ext cx="350204" cy="1627145"/>
+          </a:xfrm>
+          <a:prstGeom prst="straightConnector1">
+            <a:avLst/>
+          </a:prstGeom>
+          <a:ln w="19050">
+            <a:tailEnd type="triangle"/>
+          </a:ln>
+        </p:spPr>
+        <p:style>
+          <a:lnRef idx="1">
+            <a:schemeClr val="accent1"/>
+          </a:lnRef>
+          <a:fillRef idx="0">
+            <a:schemeClr val="accent1"/>
+          </a:fillRef>
+          <a:effectRef idx="0">
+            <a:schemeClr val="accent1"/>
+          </a:effectRef>
+          <a:fontRef idx="minor">
+            <a:schemeClr val="tx1"/>
+          </a:fontRef>
+        </p:style>
+      </p:cxnSp>
+      <p:cxnSp>
+        <p:nvCxnSpPr>
+          <p:cNvPr id="93" name="Straight Arrow Connector 92">
+            <a:extLst>
+              <a:ext uri="{FF2B5EF4-FFF2-40B4-BE49-F238E27FC236}">
+                <a16:creationId xmlns:a16="http://schemas.microsoft.com/office/drawing/2014/main" id="{04101A02-DFC9-BA45-A82C-C65FDD6BF8DF}"/>
+              </a:ext>
+            </a:extLst>
+          </p:cNvPr>
+          <p:cNvCxnSpPr>
+            <a:cxnSpLocks/>
+            <a:stCxn id="50" idx="2"/>
+            <a:endCxn id="88" idx="0"/>
+          </p:cNvCxnSpPr>
+          <p:nvPr/>
+        </p:nvCxnSpPr>
+        <p:spPr>
+          <a:xfrm>
+            <a:off x="5597517" y="3723331"/>
+            <a:ext cx="1837380" cy="1627145"/>
+          </a:xfrm>
+          <a:prstGeom prst="straightConnector1">
+            <a:avLst/>
+          </a:prstGeom>
+          <a:ln w="19050">
+            <a:tailEnd type="triangle"/>
+          </a:ln>
+        </p:spPr>
+        <p:style>
+          <a:lnRef idx="1">
+            <a:schemeClr val="accent1"/>
+          </a:lnRef>
+          <a:fillRef idx="0">
+            <a:schemeClr val="accent1"/>
+          </a:fillRef>
+          <a:effectRef idx="0">
+            <a:schemeClr val="accent1"/>
+          </a:effectRef>
+          <a:fontRef idx="minor">
+            <a:schemeClr val="tx1"/>
+          </a:fontRef>
+        </p:style>
+      </p:cxnSp>
+      <p:cxnSp>
+        <p:nvCxnSpPr>
+          <p:cNvPr id="95" name="Straight Arrow Connector 94">
+            <a:extLst>
+              <a:ext uri="{FF2B5EF4-FFF2-40B4-BE49-F238E27FC236}">
+                <a16:creationId xmlns:a16="http://schemas.microsoft.com/office/drawing/2014/main" id="{0135BF46-92CE-8F48-96D7-C7AA19A18277}"/>
+              </a:ext>
+            </a:extLst>
+          </p:cNvPr>
+          <p:cNvCxnSpPr>
+            <a:cxnSpLocks/>
+            <a:stCxn id="50" idx="2"/>
+            <a:endCxn id="89" idx="0"/>
+          </p:cNvCxnSpPr>
+          <p:nvPr/>
+        </p:nvCxnSpPr>
+        <p:spPr>
+          <a:xfrm>
+            <a:off x="5597517" y="3723331"/>
+            <a:ext cx="3744597" cy="1627145"/>
+          </a:xfrm>
+          <a:prstGeom prst="straightConnector1">
+            <a:avLst/>
+          </a:prstGeom>
+          <a:ln w="19050">
+            <a:tailEnd type="triangle"/>
+          </a:ln>
+        </p:spPr>
+        <p:style>
+          <a:lnRef idx="1">
+            <a:schemeClr val="accent1"/>
+          </a:lnRef>
+          <a:fillRef idx="0">
+            <a:schemeClr val="accent1"/>
+          </a:fillRef>
+          <a:effectRef idx="0">
+            <a:schemeClr val="accent1"/>
+          </a:effectRef>
+          <a:fontRef idx="minor">
+            <a:schemeClr val="tx1"/>
+          </a:fontRef>
+        </p:style>
+      </p:cxnSp>
+      <p:sp>
+        <p:nvSpPr>
+          <p:cNvPr id="106" name="TextBox 105">
+            <a:extLst>
+              <a:ext uri="{FF2B5EF4-FFF2-40B4-BE49-F238E27FC236}">
+                <a16:creationId xmlns:a16="http://schemas.microsoft.com/office/drawing/2014/main" id="{76C2895E-8C5E-CF42-93AD-FF09BA0C859D}"/>
+              </a:ext>
+            </a:extLst>
+          </p:cNvPr>
+          <p:cNvSpPr txBox="1"/>
+          <p:nvPr/>
+        </p:nvSpPr>
+        <p:spPr>
+          <a:xfrm flipH="1">
+            <a:off x="7739081" y="113909"/>
+            <a:ext cx="1307445" cy="369332"/>
+          </a:xfrm>
+          <a:prstGeom prst="rect">
+            <a:avLst/>
+          </a:prstGeom>
+          <a:noFill/>
+        </p:spPr>
+        <p:txBody>
+          <a:bodyPr wrap="square" rtlCol="0">
+            <a:spAutoFit/>
+          </a:bodyPr>
+          <a:lstStyle/>
+          <a:p>
+            <a:r>
+              <a:rPr lang="en-US" b="1" i="1"/>
+              <a:t>DEFINITION</a:t>
+            </a:r>
+            <a:endParaRPr lang="en-US" sz="1600" b="1" i="1"/>
+          </a:p>
+        </p:txBody>
+      </p:sp>
+      <p:sp>
+        <p:nvSpPr>
+          <p:cNvPr id="67" name="TextBox 66">
+            <a:extLst>
+              <a:ext uri="{FF2B5EF4-FFF2-40B4-BE49-F238E27FC236}">
+                <a16:creationId xmlns:a16="http://schemas.microsoft.com/office/drawing/2014/main" id="{D15D117F-DE55-514C-A46C-B16CCFE3D32F}"/>
+              </a:ext>
+            </a:extLst>
+          </p:cNvPr>
+          <p:cNvSpPr txBox="1"/>
+          <p:nvPr/>
+        </p:nvSpPr>
+        <p:spPr>
+          <a:xfrm flipH="1">
+            <a:off x="10436654" y="1738595"/>
+            <a:ext cx="1307445" cy="369332"/>
+          </a:xfrm>
+          <a:prstGeom prst="rect">
+            <a:avLst/>
+          </a:prstGeom>
+          <a:noFill/>
+        </p:spPr>
+        <p:txBody>
+          <a:bodyPr wrap="square" rtlCol="0">
+            <a:spAutoFit/>
+          </a:bodyPr>
+          <a:lstStyle/>
+          <a:p>
+            <a:r>
+              <a:rPr lang="en-US" b="1" i="1"/>
+              <a:t>EXAMPLE</a:t>
+            </a:r>
+          </a:p>
+        </p:txBody>
+      </p:sp>
+      <p:sp>
+        <p:nvSpPr>
+          <p:cNvPr id="94" name="TextBox 93">
+            <a:extLst>
+              <a:ext uri="{FF2B5EF4-FFF2-40B4-BE49-F238E27FC236}">
+                <a16:creationId xmlns:a16="http://schemas.microsoft.com/office/drawing/2014/main" id="{E6C67359-C947-EA4B-A4EB-DE4B5946B458}"/>
+              </a:ext>
+            </a:extLst>
+          </p:cNvPr>
+          <p:cNvSpPr txBox="1"/>
+          <p:nvPr/>
+        </p:nvSpPr>
+        <p:spPr>
+          <a:xfrm flipH="1">
+            <a:off x="10439701" y="3507741"/>
+            <a:ext cx="1307445" cy="369332"/>
+          </a:xfrm>
+          <a:prstGeom prst="rect">
+            <a:avLst/>
+          </a:prstGeom>
+          <a:noFill/>
+        </p:spPr>
+        <p:txBody>
+          <a:bodyPr wrap="square" rtlCol="0">
+            <a:spAutoFit/>
+          </a:bodyPr>
+          <a:lstStyle/>
+          <a:p>
+            <a:r>
+              <a:rPr lang="en-US" b="1" i="1"/>
+              <a:t>EXAMPLE</a:t>
+            </a:r>
+          </a:p>
+        </p:txBody>
+      </p:sp>
+      <p:sp>
+        <p:nvSpPr>
+          <p:cNvPr id="96" name="TextBox 95">
+            <a:extLst>
+              <a:ext uri="{FF2B5EF4-FFF2-40B4-BE49-F238E27FC236}">
+                <a16:creationId xmlns:a16="http://schemas.microsoft.com/office/drawing/2014/main" id="{9FA822F6-EC11-2A48-BF3F-54B80B6898AC}"/>
+              </a:ext>
+            </a:extLst>
+          </p:cNvPr>
+          <p:cNvSpPr txBox="1"/>
+          <p:nvPr/>
+        </p:nvSpPr>
+        <p:spPr>
+          <a:xfrm flipH="1">
+            <a:off x="5063963" y="4519398"/>
+            <a:ext cx="1307445" cy="369332"/>
+          </a:xfrm>
+          <a:prstGeom prst="rect">
+            <a:avLst/>
+          </a:prstGeom>
+          <a:noFill/>
+        </p:spPr>
+        <p:txBody>
+          <a:bodyPr wrap="square" rtlCol="0">
+            <a:spAutoFit/>
+          </a:bodyPr>
+          <a:lstStyle/>
+          <a:p>
+            <a:r>
+              <a:rPr lang="en-US" b="1" i="1"/>
+              <a:t>SYNONYM</a:t>
+            </a:r>
+          </a:p>
+        </p:txBody>
+      </p:sp>
+      <p:sp>
+        <p:nvSpPr>
+          <p:cNvPr id="99" name="TextBox 98">
+            <a:extLst>
+              <a:ext uri="{FF2B5EF4-FFF2-40B4-BE49-F238E27FC236}">
+                <a16:creationId xmlns:a16="http://schemas.microsoft.com/office/drawing/2014/main" id="{4877CF83-028F-444C-BEFD-86347FC11DDB}"/>
+              </a:ext>
+            </a:extLst>
+          </p:cNvPr>
+          <p:cNvSpPr txBox="1"/>
+          <p:nvPr/>
+        </p:nvSpPr>
+        <p:spPr>
+          <a:xfrm flipH="1">
+            <a:off x="6493488" y="4519398"/>
+            <a:ext cx="1307445" cy="369332"/>
+          </a:xfrm>
+          <a:prstGeom prst="rect">
+            <a:avLst/>
+          </a:prstGeom>
+          <a:noFill/>
+        </p:spPr>
+        <p:txBody>
+          <a:bodyPr wrap="square" rtlCol="0">
+            <a:spAutoFit/>
+          </a:bodyPr>
+          <a:lstStyle/>
+          <a:p>
+            <a:r>
+              <a:rPr lang="en-US" b="1" i="1"/>
+              <a:t>SYNONYM</a:t>
+            </a:r>
+          </a:p>
+        </p:txBody>
+      </p:sp>
+      <p:sp>
+        <p:nvSpPr>
+          <p:cNvPr id="119" name="TextBox 118">
+            <a:extLst>
+              <a:ext uri="{FF2B5EF4-FFF2-40B4-BE49-F238E27FC236}">
+                <a16:creationId xmlns:a16="http://schemas.microsoft.com/office/drawing/2014/main" id="{0C88A224-B3CF-E74F-B286-6B1DF9492558}"/>
+              </a:ext>
+            </a:extLst>
+          </p:cNvPr>
+          <p:cNvSpPr txBox="1"/>
+          <p:nvPr/>
+        </p:nvSpPr>
+        <p:spPr>
+          <a:xfrm flipH="1">
+            <a:off x="7881134" y="4519398"/>
+            <a:ext cx="1307445" cy="369332"/>
+          </a:xfrm>
+          <a:prstGeom prst="rect">
+            <a:avLst/>
+          </a:prstGeom>
+          <a:noFill/>
+        </p:spPr>
+        <p:txBody>
+          <a:bodyPr wrap="square" rtlCol="0">
+            <a:spAutoFit/>
+          </a:bodyPr>
+          <a:lstStyle/>
+          <a:p>
+            <a:r>
+              <a:rPr lang="en-US" b="1" i="1"/>
+              <a:t>ANTONYM</a:t>
+            </a:r>
+          </a:p>
+        </p:txBody>
+      </p:sp>
+      <p:sp>
+        <p:nvSpPr>
+          <p:cNvPr id="120" name="Hexagon 119">
+            <a:extLst>
+              <a:ext uri="{FF2B5EF4-FFF2-40B4-BE49-F238E27FC236}">
+                <a16:creationId xmlns:a16="http://schemas.microsoft.com/office/drawing/2014/main" id="{6A597F53-D67B-B943-840A-7D28259A16E3}"/>
+              </a:ext>
+            </a:extLst>
+          </p:cNvPr>
+          <p:cNvSpPr/>
+          <p:nvPr/>
+        </p:nvSpPr>
+        <p:spPr>
+          <a:xfrm>
+            <a:off x="2612344" y="3387653"/>
+            <a:ext cx="1614272" cy="1238261"/>
+          </a:xfrm>
+          <a:prstGeom prst="hexagon">
+            <a:avLst/>
+          </a:prstGeom>
+        </p:spPr>
+        <p:style>
+          <a:lnRef idx="1">
+            <a:schemeClr val="accent6"/>
+          </a:lnRef>
+          <a:fillRef idx="2">
+            <a:schemeClr val="accent6"/>
+          </a:fillRef>
+          <a:effectRef idx="1">
+            <a:schemeClr val="accent6"/>
+          </a:effectRef>
+          <a:fontRef idx="minor">
+            <a:schemeClr val="dk1"/>
+          </a:fontRef>
+        </p:style>
+        <p:txBody>
+          <a:bodyPr lIns="36000" rIns="36000" rtlCol="0" anchor="ctr"/>
+          <a:lstStyle/>
+          <a:p>
+            <a:pPr algn="ctr"/>
+            <a:r>
+              <a:rPr lang="en-US"/>
+              <a:t>Sense:</a:t>
+            </a:r>
+            <a:br>
+              <a:rPr lang="en-US"/>
+            </a:br>
+            <a:r>
+              <a:rPr lang="en-US" b="1"/>
+              <a:t>move.n.05</a:t>
+            </a:r>
+          </a:p>
+        </p:txBody>
+      </p:sp>
+      <p:sp>
+        <p:nvSpPr>
+          <p:cNvPr id="121" name="Oval 120">
+            <a:extLst>
+              <a:ext uri="{FF2B5EF4-FFF2-40B4-BE49-F238E27FC236}">
+                <a16:creationId xmlns:a16="http://schemas.microsoft.com/office/drawing/2014/main" id="{9A153748-E6F1-2D43-8B19-189335285E73}"/>
+              </a:ext>
+            </a:extLst>
+          </p:cNvPr>
+          <p:cNvSpPr/>
+          <p:nvPr/>
+        </p:nvSpPr>
+        <p:spPr>
+          <a:xfrm>
+            <a:off x="6188040" y="391633"/>
+            <a:ext cx="4624122" cy="842478"/>
+          </a:xfrm>
+          <a:prstGeom prst="ellipse">
+            <a:avLst/>
+          </a:prstGeom>
+        </p:spPr>
+        <p:style>
+          <a:lnRef idx="1">
+            <a:schemeClr val="accent5"/>
+          </a:lnRef>
+          <a:fillRef idx="2">
+            <a:schemeClr val="accent5"/>
+          </a:fillRef>
+          <a:effectRef idx="1">
+            <a:schemeClr val="accent5"/>
+          </a:effectRef>
+          <a:fontRef idx="minor">
+            <a:schemeClr val="dk1"/>
+          </a:fontRef>
+        </p:style>
+        <p:txBody>
+          <a:bodyPr wrap="square" lIns="0" tIns="36000" rIns="0" bIns="36000" rtlCol="0" anchor="t"/>
+          <a:lstStyle/>
+          <a:p>
+            <a:pPr algn="ctr"/>
+            <a:r>
+              <a:rPr lang="en-GB"/>
+              <a:t>change location; move, travel, or proceed, also metaphorically</a:t>
+            </a:r>
+            <a:endParaRPr lang="en-US"/>
+          </a:p>
+        </p:txBody>
+      </p:sp>
+      <p:cxnSp>
+        <p:nvCxnSpPr>
+          <p:cNvPr id="122" name="Straight Arrow Connector 121">
+            <a:extLst>
+              <a:ext uri="{FF2B5EF4-FFF2-40B4-BE49-F238E27FC236}">
+                <a16:creationId xmlns:a16="http://schemas.microsoft.com/office/drawing/2014/main" id="{723705FC-7C60-C044-9010-A334038F8E14}"/>
+              </a:ext>
+            </a:extLst>
+          </p:cNvPr>
+          <p:cNvCxnSpPr>
+            <a:cxnSpLocks/>
+            <a:stCxn id="121" idx="3"/>
+            <a:endCxn id="5" idx="4"/>
+          </p:cNvCxnSpPr>
+          <p:nvPr/>
+        </p:nvCxnSpPr>
+        <p:spPr>
+          <a:xfrm>
+            <a:off x="6865227" y="1110733"/>
+            <a:ext cx="876593" cy="682289"/>
+          </a:xfrm>
+          <a:prstGeom prst="straightConnector1">
+            <a:avLst/>
+          </a:prstGeom>
+          <a:ln w="19050">
+            <a:tailEnd type="triangle"/>
+          </a:ln>
+        </p:spPr>
+        <p:style>
+          <a:lnRef idx="1">
+            <a:schemeClr val="accent1"/>
+          </a:lnRef>
+          <a:fillRef idx="0">
+            <a:schemeClr val="accent1"/>
+          </a:fillRef>
+          <a:effectRef idx="0">
+            <a:schemeClr val="accent1"/>
+          </a:effectRef>
+          <a:fontRef idx="minor">
+            <a:schemeClr val="tx1"/>
+          </a:fontRef>
+        </p:style>
+      </p:cxnSp>
+      <p:sp>
+        <p:nvSpPr>
+          <p:cNvPr id="123" name="TextBox 122">
+            <a:extLst>
+              <a:ext uri="{FF2B5EF4-FFF2-40B4-BE49-F238E27FC236}">
+                <a16:creationId xmlns:a16="http://schemas.microsoft.com/office/drawing/2014/main" id="{E0B4B326-7D62-DD4B-9D8F-31D57E20C545}"/>
+              </a:ext>
+            </a:extLst>
+          </p:cNvPr>
+          <p:cNvSpPr txBox="1"/>
+          <p:nvPr/>
+        </p:nvSpPr>
+        <p:spPr>
+          <a:xfrm flipH="1">
+            <a:off x="1061935" y="4847799"/>
+            <a:ext cx="1307445" cy="369332"/>
+          </a:xfrm>
+          <a:prstGeom prst="rect">
+            <a:avLst/>
+          </a:prstGeom>
+          <a:noFill/>
+        </p:spPr>
+        <p:txBody>
+          <a:bodyPr wrap="square" rtlCol="0">
+            <a:spAutoFit/>
+          </a:bodyPr>
+          <a:lstStyle/>
+          <a:p>
+            <a:r>
+              <a:rPr lang="en-US" b="1" i="1"/>
+              <a:t>DEFINITION</a:t>
+            </a:r>
+            <a:endParaRPr lang="en-US" sz="1600" b="1" i="1"/>
+          </a:p>
+        </p:txBody>
+      </p:sp>
+      <p:sp>
+        <p:nvSpPr>
+          <p:cNvPr id="140" name="TextBox 139">
+            <a:extLst>
+              <a:ext uri="{FF2B5EF4-FFF2-40B4-BE49-F238E27FC236}">
+                <a16:creationId xmlns:a16="http://schemas.microsoft.com/office/drawing/2014/main" id="{1A91514C-955C-0F46-8F0C-BE2784A4D643}"/>
+              </a:ext>
+            </a:extLst>
+          </p:cNvPr>
+          <p:cNvSpPr txBox="1"/>
+          <p:nvPr/>
+        </p:nvSpPr>
+        <p:spPr>
+          <a:xfrm flipH="1">
+            <a:off x="1834186" y="20701"/>
+            <a:ext cx="1307445" cy="369332"/>
+          </a:xfrm>
+          <a:prstGeom prst="rect">
+            <a:avLst/>
+          </a:prstGeom>
+          <a:noFill/>
+        </p:spPr>
+        <p:txBody>
+          <a:bodyPr wrap="square" rtlCol="0">
+            <a:spAutoFit/>
+          </a:bodyPr>
+          <a:lstStyle/>
+          <a:p>
+            <a:r>
+              <a:rPr lang="en-US" b="1" i="1"/>
+              <a:t>DEFINITION</a:t>
+            </a:r>
+            <a:endParaRPr lang="en-US" sz="1600" b="1" i="1"/>
+          </a:p>
+        </p:txBody>
+      </p:sp>
+      <p:sp>
+        <p:nvSpPr>
+          <p:cNvPr id="141" name="Oval 140">
+            <a:extLst>
+              <a:ext uri="{FF2B5EF4-FFF2-40B4-BE49-F238E27FC236}">
+                <a16:creationId xmlns:a16="http://schemas.microsoft.com/office/drawing/2014/main" id="{ED426D45-EA3D-3943-8765-E472A301DF79}"/>
+              </a:ext>
+            </a:extLst>
+          </p:cNvPr>
+          <p:cNvSpPr/>
+          <p:nvPr/>
+        </p:nvSpPr>
+        <p:spPr>
+          <a:xfrm>
+            <a:off x="283145" y="298425"/>
+            <a:ext cx="4624122" cy="842478"/>
+          </a:xfrm>
+          <a:prstGeom prst="ellipse">
+            <a:avLst/>
+          </a:prstGeom>
+        </p:spPr>
+        <p:style>
+          <a:lnRef idx="1">
+            <a:schemeClr val="accent5"/>
+          </a:lnRef>
+          <a:fillRef idx="2">
+            <a:schemeClr val="accent5"/>
+          </a:fillRef>
+          <a:effectRef idx="1">
+            <a:schemeClr val="accent5"/>
+          </a:effectRef>
+          <a:fontRef idx="minor">
+            <a:schemeClr val="dk1"/>
+          </a:fontRef>
+        </p:style>
+        <p:txBody>
+          <a:bodyPr wrap="square" lIns="0" tIns="36000" rIns="0" bIns="36000" rtlCol="0" anchor="t"/>
+          <a:lstStyle/>
+          <a:p>
+            <a:pPr algn="ctr"/>
+            <a:r>
+              <a:rPr lang="en-GB"/>
+              <a:t>a change of position that does not entail a change of location</a:t>
+            </a:r>
+          </a:p>
+          <a:p>
+            <a:pPr algn="ctr"/>
+            <a:endParaRPr lang="en-US"/>
+          </a:p>
+        </p:txBody>
+      </p:sp>
+      <p:sp>
+        <p:nvSpPr>
+          <p:cNvPr id="144" name="Oval 143">
+            <a:extLst>
+              <a:ext uri="{FF2B5EF4-FFF2-40B4-BE49-F238E27FC236}">
+                <a16:creationId xmlns:a16="http://schemas.microsoft.com/office/drawing/2014/main" id="{11A8D600-A772-5246-AB7D-1208D3625CE1}"/>
+              </a:ext>
+            </a:extLst>
+          </p:cNvPr>
+          <p:cNvSpPr/>
+          <p:nvPr/>
+        </p:nvSpPr>
+        <p:spPr>
+          <a:xfrm>
+            <a:off x="-1769" y="1628294"/>
+            <a:ext cx="1942825" cy="1415060"/>
+          </a:xfrm>
+          <a:prstGeom prst="ellipse">
+            <a:avLst/>
+          </a:prstGeom>
+        </p:spPr>
+        <p:style>
+          <a:lnRef idx="1">
+            <a:schemeClr val="accent5"/>
+          </a:lnRef>
+          <a:fillRef idx="3">
+            <a:schemeClr val="accent5"/>
+          </a:fillRef>
+          <a:effectRef idx="2">
+            <a:schemeClr val="accent5"/>
+          </a:effectRef>
+          <a:fontRef idx="minor">
+            <a:schemeClr val="lt1"/>
+          </a:fontRef>
+        </p:style>
+        <p:txBody>
+          <a:bodyPr rtlCol="0" anchor="ctr"/>
+          <a:lstStyle/>
+          <a:p>
+            <a:pPr algn="ctr"/>
+            <a:r>
+              <a:rPr lang="en-US"/>
+              <a:t>An impatient move of her hand</a:t>
+            </a:r>
+          </a:p>
+        </p:txBody>
+      </p:sp>
+      <p:sp>
+        <p:nvSpPr>
+          <p:cNvPr id="148" name="TextBox 147">
+            <a:extLst>
+              <a:ext uri="{FF2B5EF4-FFF2-40B4-BE49-F238E27FC236}">
+                <a16:creationId xmlns:a16="http://schemas.microsoft.com/office/drawing/2014/main" id="{EDC83985-27E1-F04A-9412-51D4DA6A3C75}"/>
+              </a:ext>
+            </a:extLst>
+          </p:cNvPr>
+          <p:cNvSpPr txBox="1"/>
+          <p:nvPr/>
+        </p:nvSpPr>
+        <p:spPr>
+          <a:xfrm flipH="1">
+            <a:off x="473673" y="1343561"/>
+            <a:ext cx="1307445" cy="369332"/>
+          </a:xfrm>
+          <a:prstGeom prst="rect">
+            <a:avLst/>
+          </a:prstGeom>
+          <a:noFill/>
+        </p:spPr>
+        <p:txBody>
+          <a:bodyPr wrap="square" rtlCol="0">
+            <a:spAutoFit/>
+          </a:bodyPr>
+          <a:lstStyle/>
+          <a:p>
+            <a:r>
+              <a:rPr lang="en-US" b="1" i="1"/>
+              <a:t>EXAMPLE</a:t>
+            </a:r>
+          </a:p>
+        </p:txBody>
+      </p:sp>
+      <p:cxnSp>
+        <p:nvCxnSpPr>
+          <p:cNvPr id="153" name="Straight Arrow Connector 152">
+            <a:extLst>
+              <a:ext uri="{FF2B5EF4-FFF2-40B4-BE49-F238E27FC236}">
+                <a16:creationId xmlns:a16="http://schemas.microsoft.com/office/drawing/2014/main" id="{BB1289D5-76F3-8A43-A742-2598CA0B9BEC}"/>
+              </a:ext>
+            </a:extLst>
+          </p:cNvPr>
+          <p:cNvCxnSpPr>
+            <a:cxnSpLocks/>
+            <a:endCxn id="120" idx="0"/>
+          </p:cNvCxnSpPr>
+          <p:nvPr/>
+        </p:nvCxnSpPr>
+        <p:spPr>
+          <a:xfrm flipH="1">
+            <a:off x="4226616" y="3720397"/>
+            <a:ext cx="780378" cy="286387"/>
+          </a:xfrm>
+          <a:prstGeom prst="straightConnector1">
+            <a:avLst/>
+          </a:prstGeom>
+          <a:ln w="19050">
+            <a:tailEnd type="triangle"/>
+          </a:ln>
+        </p:spPr>
+        <p:style>
+          <a:lnRef idx="1">
+            <a:schemeClr val="accent1"/>
+          </a:lnRef>
+          <a:fillRef idx="0">
+            <a:schemeClr val="accent1"/>
+          </a:fillRef>
+          <a:effectRef idx="0">
+            <a:schemeClr val="accent1"/>
+          </a:effectRef>
+          <a:fontRef idx="minor">
+            <a:schemeClr val="tx1"/>
+          </a:fontRef>
+        </p:style>
+      </p:cxnSp>
+    </p:spTree>
+    <p:extLst>
+      <p:ext uri="{BB962C8B-B14F-4D97-AF65-F5344CB8AC3E}">
+        <p14:creationId xmlns:p14="http://schemas.microsoft.com/office/powerpoint/2010/main" val="3677344836"/>
+      </p:ext>
+    </p:extLst>
+  </p:cSld>
+  <p:clrMapOvr>
+    <a:masterClrMapping/>
+  </p:clrMapOvr>
+</p:sld>
+</file>
+
+<file path=ppt/slides/slide4.xml><?xml version="1.0" encoding="utf-8"?>
+<p:sld xmlns:a="http://schemas.openxmlformats.org/drawingml/2006/main" xmlns:r="http://schemas.openxmlformats.org/officeDocument/2006/relationships" xmlns:p="http://schemas.openxmlformats.org/presentationml/2006/main">
+  <p:cSld>
+    <p:spTree>
+      <p:nvGrpSpPr>
+        <p:cNvPr id="1" name=""/>
+        <p:cNvGrpSpPr/>
+        <p:nvPr/>
+      </p:nvGrpSpPr>
+      <p:grpSpPr>
+        <a:xfrm>
+          <a:off x="0" y="0"/>
+          <a:ext cx="0" cy="0"/>
+          <a:chOff x="0" y="0"/>
+          <a:chExt cx="0" cy="0"/>
+        </a:xfrm>
+      </p:grpSpPr>
+      <p:sp>
+        <p:nvSpPr>
+          <p:cNvPr id="4" name="Hexagon 3">
+            <a:extLst>
+              <a:ext uri="{FF2B5EF4-FFF2-40B4-BE49-F238E27FC236}">
+                <a16:creationId xmlns:a16="http://schemas.microsoft.com/office/drawing/2014/main" id="{23CB137D-5BB4-1242-8225-A9DF14533DE8}"/>
+              </a:ext>
+            </a:extLst>
+          </p:cNvPr>
+          <p:cNvSpPr/>
+          <p:nvPr/>
+        </p:nvSpPr>
+        <p:spPr>
+          <a:xfrm>
+            <a:off x="2743200" y="1733226"/>
+            <a:ext cx="1614272" cy="1238261"/>
+          </a:xfrm>
+          <a:prstGeom prst="hexagon">
+            <a:avLst/>
+          </a:prstGeom>
+          <a:ln w="31750">
+            <a:solidFill>
+              <a:schemeClr val="tx1"/>
+            </a:solidFill>
+          </a:ln>
+        </p:spPr>
+        <p:style>
+          <a:lnRef idx="1">
+            <a:schemeClr val="accent6"/>
+          </a:lnRef>
+          <a:fillRef idx="2">
+            <a:schemeClr val="accent6"/>
+          </a:fillRef>
+          <a:effectRef idx="1">
+            <a:schemeClr val="accent6"/>
+          </a:effectRef>
+          <a:fontRef idx="minor">
+            <a:schemeClr val="dk1"/>
+          </a:fontRef>
+        </p:style>
+        <p:txBody>
+          <a:bodyPr lIns="36000" rIns="36000" rtlCol="0" anchor="ctr"/>
+          <a:lstStyle/>
+          <a:p>
+            <a:pPr algn="ctr"/>
+            <a:r>
+              <a:rPr lang="en-US"/>
+              <a:t>Sense:</a:t>
+            </a:r>
+            <a:br>
+              <a:rPr lang="en-US"/>
+            </a:br>
+            <a:r>
+              <a:rPr lang="en-US" b="1"/>
+              <a:t>bank.n.02</a:t>
+            </a:r>
+          </a:p>
+        </p:txBody>
+      </p:sp>
+      <p:sp>
+        <p:nvSpPr>
+          <p:cNvPr id="5" name="Hexagon 4">
+            <a:extLst>
+              <a:ext uri="{FF2B5EF4-FFF2-40B4-BE49-F238E27FC236}">
+                <a16:creationId xmlns:a16="http://schemas.microsoft.com/office/drawing/2014/main" id="{737AC331-5BBD-FA48-A45D-777447720597}"/>
+              </a:ext>
+            </a:extLst>
+          </p:cNvPr>
+          <p:cNvSpPr/>
+          <p:nvPr/>
+        </p:nvSpPr>
+        <p:spPr>
+          <a:xfrm>
+            <a:off x="7432254" y="1782962"/>
+            <a:ext cx="1614272" cy="1238262"/>
+          </a:xfrm>
+          <a:prstGeom prst="hexagon">
+            <a:avLst/>
+          </a:prstGeom>
+          <a:ln w="31750">
+            <a:solidFill>
+              <a:schemeClr val="tx1"/>
+            </a:solidFill>
+          </a:ln>
+        </p:spPr>
+        <p:style>
+          <a:lnRef idx="1">
+            <a:schemeClr val="accent6"/>
+          </a:lnRef>
+          <a:fillRef idx="2">
+            <a:schemeClr val="accent6"/>
+          </a:fillRef>
+          <a:effectRef idx="1">
+            <a:schemeClr val="accent6"/>
+          </a:effectRef>
+          <a:fontRef idx="minor">
+            <a:schemeClr val="dk1"/>
+          </a:fontRef>
+        </p:style>
+        <p:txBody>
+          <a:bodyPr lIns="72000" rIns="72000" rtlCol="0" anchor="ctr"/>
+          <a:lstStyle/>
+          <a:p>
+            <a:pPr algn="ctr"/>
+            <a:r>
+              <a:rPr lang="en-US"/>
+              <a:t>Sense</a:t>
+            </a:r>
+            <a:r>
+              <a:rPr lang="en-US" b="1"/>
+              <a:t>: bank.n.01</a:t>
+            </a:r>
+          </a:p>
+        </p:txBody>
+      </p:sp>
+      <p:sp>
+        <p:nvSpPr>
+          <p:cNvPr id="15" name="Oval 14">
+            <a:extLst>
+              <a:ext uri="{FF2B5EF4-FFF2-40B4-BE49-F238E27FC236}">
+                <a16:creationId xmlns:a16="http://schemas.microsoft.com/office/drawing/2014/main" id="{4B3A3DA1-3524-6947-AEC8-7B51B2E19083}"/>
+              </a:ext>
+            </a:extLst>
+          </p:cNvPr>
+          <p:cNvSpPr/>
+          <p:nvPr/>
+        </p:nvSpPr>
+        <p:spPr>
+          <a:xfrm>
+            <a:off x="10001873" y="1470237"/>
+            <a:ext cx="1942825" cy="1415060"/>
+          </a:xfrm>
+          <a:prstGeom prst="ellipse">
+            <a:avLst/>
+          </a:prstGeom>
+        </p:spPr>
+        <p:style>
+          <a:lnRef idx="1">
+            <a:schemeClr val="accent5"/>
+          </a:lnRef>
+          <a:fillRef idx="3">
+            <a:schemeClr val="accent5"/>
+          </a:fillRef>
+          <a:effectRef idx="2">
+            <a:schemeClr val="accent5"/>
+          </a:effectRef>
+          <a:fontRef idx="minor">
+            <a:schemeClr val="lt1"/>
+          </a:fontRef>
+        </p:style>
+        <p:txBody>
+          <a:bodyPr rtlCol="0" anchor="ctr"/>
+          <a:lstStyle/>
+          <a:p>
+            <a:pPr algn="ctr"/>
+            <a:r>
+              <a:rPr lang="en-US"/>
+              <a:t>they pulled the canoe up on the bank</a:t>
+            </a:r>
+          </a:p>
+        </p:txBody>
+      </p:sp>
+      <p:sp>
+        <p:nvSpPr>
+          <p:cNvPr id="16" name="Oval 15">
+            <a:extLst>
+              <a:ext uri="{FF2B5EF4-FFF2-40B4-BE49-F238E27FC236}">
+                <a16:creationId xmlns:a16="http://schemas.microsoft.com/office/drawing/2014/main" id="{34646155-B817-374A-A232-C0B892632DB7}"/>
+              </a:ext>
+            </a:extLst>
+          </p:cNvPr>
+          <p:cNvSpPr/>
+          <p:nvPr/>
+        </p:nvSpPr>
+        <p:spPr>
+          <a:xfrm>
+            <a:off x="9696926" y="3266847"/>
+            <a:ext cx="2247772" cy="1663712"/>
+          </a:xfrm>
+          <a:prstGeom prst="ellipse">
+            <a:avLst/>
+          </a:prstGeom>
+        </p:spPr>
+        <p:style>
+          <a:lnRef idx="1">
+            <a:schemeClr val="accent5"/>
+          </a:lnRef>
+          <a:fillRef idx="3">
+            <a:schemeClr val="accent5"/>
+          </a:fillRef>
+          <a:effectRef idx="2">
+            <a:schemeClr val="accent5"/>
+          </a:effectRef>
+          <a:fontRef idx="minor">
+            <a:schemeClr val="lt1"/>
+          </a:fontRef>
+        </p:style>
+        <p:txBody>
+          <a:bodyPr rtlCol="0" anchor="ctr"/>
+          <a:lstStyle/>
+          <a:p>
+            <a:pPr algn="ctr"/>
+            <a:r>
+              <a:rPr lang="en-US"/>
+              <a:t>she sat on the bank of the river and watched the currents</a:t>
+            </a:r>
+          </a:p>
+        </p:txBody>
+      </p:sp>
+      <p:cxnSp>
+        <p:nvCxnSpPr>
+          <p:cNvPr id="19" name="Straight Arrow Connector 18">
+            <a:extLst>
+              <a:ext uri="{FF2B5EF4-FFF2-40B4-BE49-F238E27FC236}">
+                <a16:creationId xmlns:a16="http://schemas.microsoft.com/office/drawing/2014/main" id="{57242243-82A7-9E4D-BE25-79B9DDF8054D}"/>
+              </a:ext>
+            </a:extLst>
+          </p:cNvPr>
+          <p:cNvCxnSpPr>
+            <a:cxnSpLocks/>
+            <a:stCxn id="144" idx="6"/>
+            <a:endCxn id="4" idx="3"/>
+          </p:cNvCxnSpPr>
+          <p:nvPr/>
+        </p:nvCxnSpPr>
+        <p:spPr>
+          <a:xfrm>
+            <a:off x="2207236" y="2348416"/>
+            <a:ext cx="535964" cy="3941"/>
+          </a:xfrm>
+          <a:prstGeom prst="straightConnector1">
+            <a:avLst/>
+          </a:prstGeom>
+          <a:ln w="19050">
+            <a:tailEnd type="triangle"/>
+          </a:ln>
+        </p:spPr>
+        <p:style>
+          <a:lnRef idx="1">
+            <a:schemeClr val="accent1"/>
+          </a:lnRef>
+          <a:fillRef idx="0">
+            <a:schemeClr val="accent1"/>
+          </a:fillRef>
+          <a:effectRef idx="0">
+            <a:schemeClr val="accent1"/>
+          </a:effectRef>
+          <a:fontRef idx="minor">
+            <a:schemeClr val="tx1"/>
+          </a:fontRef>
+        </p:style>
+      </p:cxnSp>
+      <p:cxnSp>
+        <p:nvCxnSpPr>
+          <p:cNvPr id="21" name="Straight Arrow Connector 20">
+            <a:extLst>
+              <a:ext uri="{FF2B5EF4-FFF2-40B4-BE49-F238E27FC236}">
+                <a16:creationId xmlns:a16="http://schemas.microsoft.com/office/drawing/2014/main" id="{2CC2FD02-87A6-7445-B7DF-8DA0E85D885E}"/>
+              </a:ext>
+            </a:extLst>
+          </p:cNvPr>
+          <p:cNvCxnSpPr>
+            <a:cxnSpLocks/>
+            <a:endCxn id="4" idx="4"/>
+          </p:cNvCxnSpPr>
+          <p:nvPr/>
+        </p:nvCxnSpPr>
+        <p:spPr>
+          <a:xfrm>
+            <a:off x="3052765" y="1379558"/>
+            <a:ext cx="0" cy="353668"/>
+          </a:xfrm>
+          <a:prstGeom prst="straightConnector1">
+            <a:avLst/>
+          </a:prstGeom>
+          <a:ln w="19050">
+            <a:tailEnd type="triangle"/>
+          </a:ln>
+        </p:spPr>
+        <p:style>
+          <a:lnRef idx="1">
+            <a:schemeClr val="accent1"/>
+          </a:lnRef>
+          <a:fillRef idx="0">
+            <a:schemeClr val="accent1"/>
+          </a:fillRef>
+          <a:effectRef idx="0">
+            <a:schemeClr val="accent1"/>
+          </a:effectRef>
+          <a:fontRef idx="minor">
+            <a:schemeClr val="tx1"/>
+          </a:fontRef>
+        </p:style>
+      </p:cxnSp>
+      <p:cxnSp>
+        <p:nvCxnSpPr>
+          <p:cNvPr id="37" name="Straight Arrow Connector 36">
+            <a:extLst>
+              <a:ext uri="{FF2B5EF4-FFF2-40B4-BE49-F238E27FC236}">
+                <a16:creationId xmlns:a16="http://schemas.microsoft.com/office/drawing/2014/main" id="{492A2287-310F-B946-AEF1-82B998E15392}"/>
+              </a:ext>
+            </a:extLst>
+          </p:cNvPr>
+          <p:cNvCxnSpPr>
+            <a:cxnSpLocks/>
+            <a:stCxn id="15" idx="2"/>
+            <a:endCxn id="5" idx="0"/>
+          </p:cNvCxnSpPr>
+          <p:nvPr/>
+        </p:nvCxnSpPr>
+        <p:spPr>
+          <a:xfrm flipH="1">
+            <a:off x="9046526" y="2177767"/>
+            <a:ext cx="955347" cy="224326"/>
+          </a:xfrm>
+          <a:prstGeom prst="straightConnector1">
+            <a:avLst/>
+          </a:prstGeom>
+          <a:ln w="19050">
+            <a:tailEnd type="triangle"/>
+          </a:ln>
+        </p:spPr>
+        <p:style>
+          <a:lnRef idx="1">
+            <a:schemeClr val="accent1"/>
+          </a:lnRef>
+          <a:fillRef idx="0">
+            <a:schemeClr val="accent1"/>
+          </a:fillRef>
+          <a:effectRef idx="0">
+            <a:schemeClr val="accent1"/>
+          </a:effectRef>
+          <a:fontRef idx="minor">
+            <a:schemeClr val="tx1"/>
+          </a:fontRef>
+        </p:style>
+      </p:cxnSp>
+      <p:cxnSp>
+        <p:nvCxnSpPr>
+          <p:cNvPr id="39" name="Straight Arrow Connector 38">
+            <a:extLst>
+              <a:ext uri="{FF2B5EF4-FFF2-40B4-BE49-F238E27FC236}">
+                <a16:creationId xmlns:a16="http://schemas.microsoft.com/office/drawing/2014/main" id="{94CD089F-5773-E04C-BDC5-512549EA62F0}"/>
+              </a:ext>
+            </a:extLst>
+          </p:cNvPr>
+          <p:cNvCxnSpPr>
+            <a:cxnSpLocks/>
+            <a:stCxn id="16" idx="1"/>
+            <a:endCxn id="5" idx="1"/>
+          </p:cNvCxnSpPr>
+          <p:nvPr/>
+        </p:nvCxnSpPr>
+        <p:spPr>
+          <a:xfrm flipH="1" flipV="1">
+            <a:off x="8736961" y="3021224"/>
+            <a:ext cx="1289144" cy="489268"/>
+          </a:xfrm>
+          <a:prstGeom prst="straightConnector1">
+            <a:avLst/>
+          </a:prstGeom>
+          <a:ln w="19050">
+            <a:tailEnd type="triangle"/>
+          </a:ln>
+        </p:spPr>
+        <p:style>
+          <a:lnRef idx="1">
+            <a:schemeClr val="accent1"/>
+          </a:lnRef>
+          <a:fillRef idx="0">
+            <a:schemeClr val="accent1"/>
+          </a:fillRef>
+          <a:effectRef idx="0">
+            <a:schemeClr val="accent1"/>
+          </a:effectRef>
+          <a:fontRef idx="minor">
+            <a:schemeClr val="tx1"/>
+          </a:fontRef>
+        </p:style>
+      </p:cxnSp>
+      <p:sp>
+        <p:nvSpPr>
+          <p:cNvPr id="50" name="Rectangle 49">
+            <a:extLst>
+              <a:ext uri="{FF2B5EF4-FFF2-40B4-BE49-F238E27FC236}">
+                <a16:creationId xmlns:a16="http://schemas.microsoft.com/office/drawing/2014/main" id="{B8D579BA-5C4C-E14D-A374-B9DDC758B117}"/>
+              </a:ext>
+            </a:extLst>
+          </p:cNvPr>
+          <p:cNvSpPr/>
+          <p:nvPr/>
+        </p:nvSpPr>
+        <p:spPr>
+          <a:xfrm>
+            <a:off x="5006994" y="2705983"/>
+            <a:ext cx="1181046" cy="1005204"/>
+          </a:xfrm>
+          <a:prstGeom prst="rect">
+            <a:avLst/>
+          </a:prstGeom>
+          <a:ln w="31750">
+            <a:solidFill>
+              <a:schemeClr val="tx1"/>
+            </a:solidFill>
+          </a:ln>
+        </p:spPr>
+        <p:style>
+          <a:lnRef idx="2">
+            <a:schemeClr val="accent4">
+              <a:shade val="50000"/>
+            </a:schemeClr>
+          </a:lnRef>
+          <a:fillRef idx="1">
+            <a:schemeClr val="accent4"/>
+          </a:fillRef>
+          <a:effectRef idx="0">
+            <a:schemeClr val="accent4"/>
+          </a:effectRef>
+          <a:fontRef idx="minor">
+            <a:schemeClr val="lt1"/>
+          </a:fontRef>
+        </p:style>
+        <p:txBody>
+          <a:bodyPr rtlCol="0" anchor="ctr"/>
+          <a:lstStyle/>
+          <a:p>
+            <a:pPr algn="ctr"/>
+            <a:r>
+              <a:rPr lang="en-US" sz="2400" b="1"/>
+              <a:t>bank</a:t>
+            </a:r>
+            <a:endParaRPr lang="en-US" b="1"/>
+          </a:p>
+        </p:txBody>
+      </p:sp>
+      <p:cxnSp>
+        <p:nvCxnSpPr>
+          <p:cNvPr id="74" name="Straight Arrow Connector 73">
+            <a:extLst>
+              <a:ext uri="{FF2B5EF4-FFF2-40B4-BE49-F238E27FC236}">
+                <a16:creationId xmlns:a16="http://schemas.microsoft.com/office/drawing/2014/main" id="{2CA80652-C6E3-4A4A-9B7C-3339EEF97881}"/>
+              </a:ext>
+            </a:extLst>
+          </p:cNvPr>
+          <p:cNvCxnSpPr>
+            <a:cxnSpLocks/>
+            <a:endCxn id="4" idx="0"/>
+          </p:cNvCxnSpPr>
+          <p:nvPr/>
+        </p:nvCxnSpPr>
+        <p:spPr>
+          <a:xfrm flipH="1" flipV="1">
+            <a:off x="4357472" y="2352357"/>
+            <a:ext cx="632384" cy="375032"/>
+          </a:xfrm>
+          <a:prstGeom prst="straightConnector1">
+            <a:avLst/>
+          </a:prstGeom>
+          <a:ln w="19050">
+            <a:tailEnd type="triangle"/>
+          </a:ln>
+        </p:spPr>
+        <p:style>
+          <a:lnRef idx="1">
+            <a:schemeClr val="accent1"/>
+          </a:lnRef>
+          <a:fillRef idx="0">
+            <a:schemeClr val="accent1"/>
+          </a:fillRef>
+          <a:effectRef idx="0">
+            <a:schemeClr val="accent1"/>
+          </a:effectRef>
+          <a:fontRef idx="minor">
+            <a:schemeClr val="tx1"/>
+          </a:fontRef>
+        </p:style>
+      </p:cxnSp>
+      <p:cxnSp>
+        <p:nvCxnSpPr>
+          <p:cNvPr id="77" name="Straight Arrow Connector 76">
+            <a:extLst>
+              <a:ext uri="{FF2B5EF4-FFF2-40B4-BE49-F238E27FC236}">
+                <a16:creationId xmlns:a16="http://schemas.microsoft.com/office/drawing/2014/main" id="{FCC9F9F5-A0D1-274E-8660-513EEA6C0190}"/>
+              </a:ext>
+            </a:extLst>
+          </p:cNvPr>
+          <p:cNvCxnSpPr>
+            <a:cxnSpLocks/>
+            <a:endCxn id="5" idx="3"/>
+          </p:cNvCxnSpPr>
+          <p:nvPr/>
+        </p:nvCxnSpPr>
+        <p:spPr>
+          <a:xfrm flipV="1">
+            <a:off x="6205178" y="2402093"/>
+            <a:ext cx="1227076" cy="325296"/>
+          </a:xfrm>
+          <a:prstGeom prst="straightConnector1">
+            <a:avLst/>
+          </a:prstGeom>
+          <a:ln w="19050">
+            <a:tailEnd type="triangle"/>
+          </a:ln>
+        </p:spPr>
+        <p:style>
+          <a:lnRef idx="1">
+            <a:schemeClr val="accent1"/>
+          </a:lnRef>
+          <a:fillRef idx="0">
+            <a:schemeClr val="accent1"/>
+          </a:fillRef>
+          <a:effectRef idx="0">
+            <a:schemeClr val="accent1"/>
+          </a:effectRef>
+          <a:fontRef idx="minor">
+            <a:schemeClr val="tx1"/>
+          </a:fontRef>
+        </p:style>
+      </p:cxnSp>
+      <p:sp>
+        <p:nvSpPr>
+          <p:cNvPr id="87" name="Rectangle 86">
+            <a:extLst>
+              <a:ext uri="{FF2B5EF4-FFF2-40B4-BE49-F238E27FC236}">
+                <a16:creationId xmlns:a16="http://schemas.microsoft.com/office/drawing/2014/main" id="{DF7E396D-D895-144E-ABBF-93B50E5CBD08}"/>
+              </a:ext>
+            </a:extLst>
+          </p:cNvPr>
+          <p:cNvSpPr/>
+          <p:nvPr/>
+        </p:nvSpPr>
+        <p:spPr>
+          <a:xfrm>
+            <a:off x="4965706" y="5362834"/>
+            <a:ext cx="1181047" cy="1005204"/>
+          </a:xfrm>
+          <a:prstGeom prst="rect">
+            <a:avLst/>
+          </a:prstGeom>
+          <a:ln w="12700"/>
+        </p:spPr>
+        <p:style>
+          <a:lnRef idx="2">
+            <a:schemeClr val="accent4">
+              <a:shade val="50000"/>
+            </a:schemeClr>
+          </a:lnRef>
+          <a:fillRef idx="1">
+            <a:schemeClr val="accent4"/>
+          </a:fillRef>
+          <a:effectRef idx="0">
+            <a:schemeClr val="accent4"/>
+          </a:effectRef>
+          <a:fontRef idx="minor">
+            <a:schemeClr val="lt1"/>
+          </a:fontRef>
+        </p:style>
+        <p:txBody>
+          <a:bodyPr rtlCol="0" anchor="ctr"/>
+          <a:lstStyle/>
+          <a:p>
+            <a:pPr algn="ctr"/>
+            <a:r>
+              <a:rPr lang="en-US" sz="2400" b="1"/>
+              <a:t>coast</a:t>
+            </a:r>
+            <a:endParaRPr lang="en-US" b="1"/>
+          </a:p>
+        </p:txBody>
+      </p:sp>
+      <p:sp>
+        <p:nvSpPr>
+          <p:cNvPr id="88" name="Rectangle 87">
+            <a:extLst>
+              <a:ext uri="{FF2B5EF4-FFF2-40B4-BE49-F238E27FC236}">
+                <a16:creationId xmlns:a16="http://schemas.microsoft.com/office/drawing/2014/main" id="{60E71F45-C6CC-0B4A-BF8B-7B8E99EC8AC5}"/>
+              </a:ext>
+            </a:extLst>
+          </p:cNvPr>
+          <p:cNvSpPr/>
+          <p:nvPr/>
+        </p:nvSpPr>
+        <p:spPr>
+          <a:xfrm>
+            <a:off x="6962205" y="5362834"/>
+            <a:ext cx="1118380" cy="1005204"/>
+          </a:xfrm>
+          <a:prstGeom prst="rect">
+            <a:avLst/>
+          </a:prstGeom>
+          <a:ln w="12700"/>
+        </p:spPr>
+        <p:style>
+          <a:lnRef idx="2">
+            <a:schemeClr val="accent4">
+              <a:shade val="50000"/>
+            </a:schemeClr>
+          </a:lnRef>
+          <a:fillRef idx="1">
+            <a:schemeClr val="accent4"/>
+          </a:fillRef>
+          <a:effectRef idx="0">
+            <a:schemeClr val="accent4"/>
+          </a:effectRef>
+          <a:fontRef idx="minor">
+            <a:schemeClr val="lt1"/>
+          </a:fontRef>
+        </p:style>
+        <p:txBody>
+          <a:bodyPr rtlCol="0" anchor="ctr"/>
+          <a:lstStyle/>
+          <a:p>
+            <a:pPr algn="ctr"/>
+            <a:r>
+              <a:rPr lang="en-US" sz="2400" b="1"/>
+              <a:t>row</a:t>
+            </a:r>
+            <a:endParaRPr lang="en-US" b="1"/>
+          </a:p>
+        </p:txBody>
+      </p:sp>
+      <p:cxnSp>
+        <p:nvCxnSpPr>
+          <p:cNvPr id="91" name="Straight Arrow Connector 90">
+            <a:extLst>
+              <a:ext uri="{FF2B5EF4-FFF2-40B4-BE49-F238E27FC236}">
+                <a16:creationId xmlns:a16="http://schemas.microsoft.com/office/drawing/2014/main" id="{3EA62AF8-D830-9541-863A-8A0083BBB424}"/>
+              </a:ext>
+            </a:extLst>
+          </p:cNvPr>
+          <p:cNvCxnSpPr>
+            <a:cxnSpLocks/>
+            <a:stCxn id="50" idx="2"/>
+            <a:endCxn id="87" idx="0"/>
+          </p:cNvCxnSpPr>
+          <p:nvPr/>
+        </p:nvCxnSpPr>
+        <p:spPr>
+          <a:xfrm flipH="1">
+            <a:off x="5556230" y="3711187"/>
+            <a:ext cx="41287" cy="1651647"/>
+          </a:xfrm>
+          <a:prstGeom prst="straightConnector1">
+            <a:avLst/>
+          </a:prstGeom>
+          <a:ln w="19050">
+            <a:tailEnd type="triangle"/>
+          </a:ln>
+        </p:spPr>
+        <p:style>
+          <a:lnRef idx="1">
+            <a:schemeClr val="accent1"/>
+          </a:lnRef>
+          <a:fillRef idx="0">
+            <a:schemeClr val="accent1"/>
+          </a:fillRef>
+          <a:effectRef idx="0">
+            <a:schemeClr val="accent1"/>
+          </a:effectRef>
+          <a:fontRef idx="minor">
+            <a:schemeClr val="tx1"/>
+          </a:fontRef>
+        </p:style>
+      </p:cxnSp>
+      <p:cxnSp>
+        <p:nvCxnSpPr>
+          <p:cNvPr id="93" name="Straight Arrow Connector 92">
+            <a:extLst>
+              <a:ext uri="{FF2B5EF4-FFF2-40B4-BE49-F238E27FC236}">
+                <a16:creationId xmlns:a16="http://schemas.microsoft.com/office/drawing/2014/main" id="{04101A02-DFC9-BA45-A82C-C65FDD6BF8DF}"/>
+              </a:ext>
+            </a:extLst>
+          </p:cNvPr>
+          <p:cNvCxnSpPr>
+            <a:cxnSpLocks/>
+            <a:stCxn id="50" idx="2"/>
+            <a:endCxn id="88" idx="0"/>
+          </p:cNvCxnSpPr>
+          <p:nvPr/>
+        </p:nvCxnSpPr>
+        <p:spPr>
+          <a:xfrm>
+            <a:off x="5597517" y="3711187"/>
+            <a:ext cx="1923878" cy="1651647"/>
+          </a:xfrm>
+          <a:prstGeom prst="straightConnector1">
+            <a:avLst/>
+          </a:prstGeom>
+          <a:ln w="19050">
+            <a:tailEnd type="triangle"/>
+          </a:ln>
+        </p:spPr>
+        <p:style>
+          <a:lnRef idx="1">
+            <a:schemeClr val="accent1"/>
+          </a:lnRef>
+          <a:fillRef idx="0">
+            <a:schemeClr val="accent1"/>
+          </a:fillRef>
+          <a:effectRef idx="0">
+            <a:schemeClr val="accent1"/>
+          </a:effectRef>
+          <a:fontRef idx="minor">
+            <a:schemeClr val="tx1"/>
+          </a:fontRef>
+        </p:style>
+      </p:cxnSp>
+      <p:sp>
+        <p:nvSpPr>
+          <p:cNvPr id="106" name="TextBox 105">
+            <a:extLst>
+              <a:ext uri="{FF2B5EF4-FFF2-40B4-BE49-F238E27FC236}">
+                <a16:creationId xmlns:a16="http://schemas.microsoft.com/office/drawing/2014/main" id="{76C2895E-8C5E-CF42-93AD-FF09BA0C859D}"/>
+              </a:ext>
+            </a:extLst>
+          </p:cNvPr>
+          <p:cNvSpPr txBox="1"/>
+          <p:nvPr/>
+        </p:nvSpPr>
+        <p:spPr>
+          <a:xfrm flipH="1">
+            <a:off x="7739081" y="113909"/>
+            <a:ext cx="1307445" cy="369332"/>
+          </a:xfrm>
+          <a:prstGeom prst="rect">
+            <a:avLst/>
+          </a:prstGeom>
+          <a:noFill/>
+        </p:spPr>
+        <p:txBody>
+          <a:bodyPr wrap="square" rtlCol="0">
+            <a:spAutoFit/>
+          </a:bodyPr>
+          <a:lstStyle/>
+          <a:p>
+            <a:r>
+              <a:rPr lang="en-US" b="1" i="1"/>
+              <a:t>DEFINITION</a:t>
+            </a:r>
+            <a:endParaRPr lang="en-US" sz="1600" b="1" i="1"/>
+          </a:p>
+        </p:txBody>
+      </p:sp>
+      <p:sp>
+        <p:nvSpPr>
+          <p:cNvPr id="67" name="TextBox 66">
+            <a:extLst>
+              <a:ext uri="{FF2B5EF4-FFF2-40B4-BE49-F238E27FC236}">
+                <a16:creationId xmlns:a16="http://schemas.microsoft.com/office/drawing/2014/main" id="{D15D117F-DE55-514C-A46C-B16CCFE3D32F}"/>
+              </a:ext>
+            </a:extLst>
+          </p:cNvPr>
+          <p:cNvSpPr txBox="1"/>
+          <p:nvPr/>
+        </p:nvSpPr>
+        <p:spPr>
+          <a:xfrm flipH="1">
+            <a:off x="10337798" y="1194892"/>
+            <a:ext cx="1307445" cy="369332"/>
+          </a:xfrm>
+          <a:prstGeom prst="rect">
+            <a:avLst/>
+          </a:prstGeom>
+          <a:noFill/>
+        </p:spPr>
+        <p:txBody>
+          <a:bodyPr wrap="square" rtlCol="0">
+            <a:spAutoFit/>
+          </a:bodyPr>
+          <a:lstStyle/>
+          <a:p>
+            <a:r>
+              <a:rPr lang="en-US" b="1" i="1"/>
+              <a:t>EXAMPLE</a:t>
+            </a:r>
+          </a:p>
+        </p:txBody>
+      </p:sp>
+      <p:sp>
+        <p:nvSpPr>
+          <p:cNvPr id="94" name="TextBox 93">
+            <a:extLst>
+              <a:ext uri="{FF2B5EF4-FFF2-40B4-BE49-F238E27FC236}">
+                <a16:creationId xmlns:a16="http://schemas.microsoft.com/office/drawing/2014/main" id="{E6C67359-C947-EA4B-A4EB-DE4B5946B458}"/>
+              </a:ext>
+            </a:extLst>
+          </p:cNvPr>
+          <p:cNvSpPr txBox="1"/>
+          <p:nvPr/>
+        </p:nvSpPr>
+        <p:spPr>
+          <a:xfrm flipH="1">
+            <a:off x="10319562" y="2956571"/>
+            <a:ext cx="1307445" cy="369332"/>
+          </a:xfrm>
+          <a:prstGeom prst="rect">
+            <a:avLst/>
+          </a:prstGeom>
+          <a:noFill/>
+        </p:spPr>
+        <p:txBody>
+          <a:bodyPr wrap="square" rtlCol="0">
+            <a:spAutoFit/>
+          </a:bodyPr>
+          <a:lstStyle/>
+          <a:p>
+            <a:r>
+              <a:rPr lang="en-US" b="1" i="1"/>
+              <a:t>EXAMPLE</a:t>
+            </a:r>
+          </a:p>
+        </p:txBody>
+      </p:sp>
+      <p:sp>
+        <p:nvSpPr>
+          <p:cNvPr id="96" name="TextBox 95">
+            <a:extLst>
+              <a:ext uri="{FF2B5EF4-FFF2-40B4-BE49-F238E27FC236}">
+                <a16:creationId xmlns:a16="http://schemas.microsoft.com/office/drawing/2014/main" id="{9FA822F6-EC11-2A48-BF3F-54B80B6898AC}"/>
+              </a:ext>
+            </a:extLst>
+          </p:cNvPr>
+          <p:cNvSpPr txBox="1"/>
+          <p:nvPr/>
+        </p:nvSpPr>
+        <p:spPr>
+          <a:xfrm flipH="1">
+            <a:off x="4921792" y="4882465"/>
+            <a:ext cx="1307445" cy="369332"/>
+          </a:xfrm>
+          <a:prstGeom prst="rect">
+            <a:avLst/>
+          </a:prstGeom>
+          <a:noFill/>
+        </p:spPr>
+        <p:txBody>
+          <a:bodyPr wrap="square" rtlCol="0">
+            <a:spAutoFit/>
+          </a:bodyPr>
+          <a:lstStyle/>
+          <a:p>
+            <a:r>
+              <a:rPr lang="en-US" b="1" i="1"/>
+              <a:t>SYNONYM</a:t>
+            </a:r>
+          </a:p>
+        </p:txBody>
+      </p:sp>
+      <p:sp>
+        <p:nvSpPr>
+          <p:cNvPr id="99" name="TextBox 98">
+            <a:extLst>
+              <a:ext uri="{FF2B5EF4-FFF2-40B4-BE49-F238E27FC236}">
+                <a16:creationId xmlns:a16="http://schemas.microsoft.com/office/drawing/2014/main" id="{4877CF83-028F-444C-BEFD-86347FC11DDB}"/>
+              </a:ext>
+            </a:extLst>
+          </p:cNvPr>
+          <p:cNvSpPr txBox="1"/>
+          <p:nvPr/>
+        </p:nvSpPr>
+        <p:spPr>
+          <a:xfrm flipH="1">
+            <a:off x="6729103" y="4884333"/>
+            <a:ext cx="1307445" cy="369332"/>
+          </a:xfrm>
+          <a:prstGeom prst="rect">
+            <a:avLst/>
+          </a:prstGeom>
+          <a:noFill/>
+        </p:spPr>
+        <p:txBody>
+          <a:bodyPr wrap="square" rtlCol="0">
+            <a:spAutoFit/>
+          </a:bodyPr>
+          <a:lstStyle/>
+          <a:p>
+            <a:r>
+              <a:rPr lang="en-US" b="1" i="1"/>
+              <a:t>SYNONYM</a:t>
+            </a:r>
+          </a:p>
+        </p:txBody>
+      </p:sp>
+      <p:sp>
+        <p:nvSpPr>
+          <p:cNvPr id="121" name="Oval 120">
+            <a:extLst>
+              <a:ext uri="{FF2B5EF4-FFF2-40B4-BE49-F238E27FC236}">
+                <a16:creationId xmlns:a16="http://schemas.microsoft.com/office/drawing/2014/main" id="{9A153748-E6F1-2D43-8B19-189335285E73}"/>
+              </a:ext>
+            </a:extLst>
+          </p:cNvPr>
+          <p:cNvSpPr/>
+          <p:nvPr/>
+        </p:nvSpPr>
+        <p:spPr>
+          <a:xfrm>
+            <a:off x="6544225" y="428672"/>
+            <a:ext cx="3969214" cy="842478"/>
+          </a:xfrm>
+          <a:prstGeom prst="ellipse">
+            <a:avLst/>
+          </a:prstGeom>
+        </p:spPr>
+        <p:style>
+          <a:lnRef idx="1">
+            <a:schemeClr val="accent5"/>
+          </a:lnRef>
+          <a:fillRef idx="2">
+            <a:schemeClr val="accent5"/>
+          </a:fillRef>
+          <a:effectRef idx="1">
+            <a:schemeClr val="accent5"/>
+          </a:effectRef>
+          <a:fontRef idx="minor">
+            <a:schemeClr val="dk1"/>
+          </a:fontRef>
+        </p:style>
+        <p:txBody>
+          <a:bodyPr wrap="square" lIns="0" tIns="36000" rIns="0" bIns="36000" rtlCol="0" anchor="t"/>
+          <a:lstStyle/>
+          <a:p>
+            <a:pPr algn="ctr"/>
+            <a:r>
+              <a:rPr lang="en-GB"/>
+              <a:t>sloping land (especially the slope beside a body of water)</a:t>
+            </a:r>
+          </a:p>
+        </p:txBody>
+      </p:sp>
+      <p:cxnSp>
+        <p:nvCxnSpPr>
+          <p:cNvPr id="122" name="Straight Arrow Connector 121">
+            <a:extLst>
+              <a:ext uri="{FF2B5EF4-FFF2-40B4-BE49-F238E27FC236}">
+                <a16:creationId xmlns:a16="http://schemas.microsoft.com/office/drawing/2014/main" id="{723705FC-7C60-C044-9010-A334038F8E14}"/>
+              </a:ext>
+            </a:extLst>
+          </p:cNvPr>
+          <p:cNvCxnSpPr>
+            <a:cxnSpLocks/>
+            <a:endCxn id="5" idx="4"/>
+          </p:cNvCxnSpPr>
+          <p:nvPr/>
+        </p:nvCxnSpPr>
+        <p:spPr>
+          <a:xfrm>
+            <a:off x="7741820" y="1247414"/>
+            <a:ext cx="0" cy="535548"/>
+          </a:xfrm>
+          <a:prstGeom prst="straightConnector1">
+            <a:avLst/>
+          </a:prstGeom>
+          <a:ln w="19050">
+            <a:tailEnd type="triangle"/>
+          </a:ln>
+        </p:spPr>
+        <p:style>
+          <a:lnRef idx="1">
+            <a:schemeClr val="accent1"/>
+          </a:lnRef>
+          <a:fillRef idx="0">
+            <a:schemeClr val="accent1"/>
+          </a:fillRef>
+          <a:effectRef idx="0">
+            <a:schemeClr val="accent1"/>
+          </a:effectRef>
+          <a:fontRef idx="minor">
+            <a:schemeClr val="tx1"/>
+          </a:fontRef>
+        </p:style>
+      </p:cxnSp>
+      <p:sp>
+        <p:nvSpPr>
+          <p:cNvPr id="140" name="TextBox 139">
+            <a:extLst>
+              <a:ext uri="{FF2B5EF4-FFF2-40B4-BE49-F238E27FC236}">
+                <a16:creationId xmlns:a16="http://schemas.microsoft.com/office/drawing/2014/main" id="{1A91514C-955C-0F46-8F0C-BE2784A4D643}"/>
+              </a:ext>
+            </a:extLst>
+          </p:cNvPr>
+          <p:cNvSpPr txBox="1"/>
+          <p:nvPr/>
+        </p:nvSpPr>
+        <p:spPr>
+          <a:xfrm flipH="1">
+            <a:off x="2712525" y="19007"/>
+            <a:ext cx="1307445" cy="369332"/>
+          </a:xfrm>
+          <a:prstGeom prst="rect">
+            <a:avLst/>
+          </a:prstGeom>
+          <a:noFill/>
+        </p:spPr>
+        <p:txBody>
+          <a:bodyPr wrap="square" rtlCol="0">
+            <a:spAutoFit/>
+          </a:bodyPr>
+          <a:lstStyle/>
+          <a:p>
+            <a:r>
+              <a:rPr lang="en-US" b="1" i="1"/>
+              <a:t>DEFINITION</a:t>
+            </a:r>
+            <a:endParaRPr lang="en-US" sz="1600" b="1" i="1"/>
+          </a:p>
+        </p:txBody>
+      </p:sp>
+      <p:sp>
+        <p:nvSpPr>
+          <p:cNvPr id="141" name="Oval 140">
+            <a:extLst>
+              <a:ext uri="{FF2B5EF4-FFF2-40B4-BE49-F238E27FC236}">
+                <a16:creationId xmlns:a16="http://schemas.microsoft.com/office/drawing/2014/main" id="{ED426D45-EA3D-3943-8765-E472A301DF79}"/>
+              </a:ext>
+            </a:extLst>
+          </p:cNvPr>
+          <p:cNvSpPr/>
+          <p:nvPr/>
+        </p:nvSpPr>
+        <p:spPr>
+          <a:xfrm>
+            <a:off x="1136776" y="336464"/>
+            <a:ext cx="4624122" cy="1045136"/>
+          </a:xfrm>
+          <a:prstGeom prst="ellipse">
+            <a:avLst/>
+          </a:prstGeom>
+        </p:spPr>
+        <p:style>
+          <a:lnRef idx="1">
+            <a:schemeClr val="accent5"/>
+          </a:lnRef>
+          <a:fillRef idx="2">
+            <a:schemeClr val="accent5"/>
+          </a:fillRef>
+          <a:effectRef idx="1">
+            <a:schemeClr val="accent5"/>
+          </a:effectRef>
+          <a:fontRef idx="minor">
+            <a:schemeClr val="dk1"/>
+          </a:fontRef>
+        </p:style>
+        <p:txBody>
+          <a:bodyPr wrap="square" lIns="0" tIns="36000" rIns="0" bIns="36000" rtlCol="0" anchor="ctr"/>
+          <a:lstStyle/>
+          <a:p>
+            <a:pPr algn="ctr"/>
+            <a:r>
+              <a:rPr lang="en-US"/>
+              <a:t>a financial institution that accepts deposits and channels the money into lending activities</a:t>
+            </a:r>
+          </a:p>
+        </p:txBody>
+      </p:sp>
+      <p:sp>
+        <p:nvSpPr>
+          <p:cNvPr id="144" name="Oval 143">
+            <a:extLst>
+              <a:ext uri="{FF2B5EF4-FFF2-40B4-BE49-F238E27FC236}">
+                <a16:creationId xmlns:a16="http://schemas.microsoft.com/office/drawing/2014/main" id="{11A8D600-A772-5246-AB7D-1208D3625CE1}"/>
+              </a:ext>
+            </a:extLst>
+          </p:cNvPr>
+          <p:cNvSpPr/>
+          <p:nvPr/>
+        </p:nvSpPr>
+        <p:spPr>
+          <a:xfrm>
+            <a:off x="424349" y="1798868"/>
+            <a:ext cx="1782887" cy="1099095"/>
+          </a:xfrm>
+          <a:prstGeom prst="ellipse">
+            <a:avLst/>
+          </a:prstGeom>
+        </p:spPr>
+        <p:style>
+          <a:lnRef idx="1">
+            <a:schemeClr val="accent5"/>
+          </a:lnRef>
+          <a:fillRef idx="3">
+            <a:schemeClr val="accent5"/>
+          </a:fillRef>
+          <a:effectRef idx="2">
+            <a:schemeClr val="accent5"/>
+          </a:effectRef>
+          <a:fontRef idx="minor">
+            <a:schemeClr val="lt1"/>
+          </a:fontRef>
+        </p:style>
+        <p:txBody>
+          <a:bodyPr rtlCol="0" anchor="ctr"/>
+          <a:lstStyle/>
+          <a:p>
+            <a:pPr algn="ctr"/>
+            <a:r>
+              <a:rPr lang="en-US"/>
+              <a:t>he cashed a check at the bank</a:t>
+            </a:r>
+          </a:p>
+        </p:txBody>
+      </p:sp>
+      <p:sp>
+        <p:nvSpPr>
+          <p:cNvPr id="148" name="TextBox 147">
+            <a:extLst>
+              <a:ext uri="{FF2B5EF4-FFF2-40B4-BE49-F238E27FC236}">
+                <a16:creationId xmlns:a16="http://schemas.microsoft.com/office/drawing/2014/main" id="{EDC83985-27E1-F04A-9412-51D4DA6A3C75}"/>
+              </a:ext>
+            </a:extLst>
+          </p:cNvPr>
+          <p:cNvSpPr txBox="1"/>
+          <p:nvPr/>
+        </p:nvSpPr>
+        <p:spPr>
+          <a:xfrm flipH="1">
+            <a:off x="765741" y="1500779"/>
+            <a:ext cx="1307445" cy="369332"/>
+          </a:xfrm>
+          <a:prstGeom prst="rect">
+            <a:avLst/>
+          </a:prstGeom>
+          <a:noFill/>
+        </p:spPr>
+        <p:txBody>
+          <a:bodyPr wrap="square" rtlCol="0">
+            <a:spAutoFit/>
+          </a:bodyPr>
+          <a:lstStyle/>
+          <a:p>
+            <a:r>
+              <a:rPr lang="en-US" b="1" i="1"/>
+              <a:t>EXAMPLE</a:t>
+            </a:r>
+          </a:p>
+        </p:txBody>
+      </p:sp>
+      <p:cxnSp>
+        <p:nvCxnSpPr>
+          <p:cNvPr id="153" name="Straight Arrow Connector 152">
+            <a:extLst>
+              <a:ext uri="{FF2B5EF4-FFF2-40B4-BE49-F238E27FC236}">
+                <a16:creationId xmlns:a16="http://schemas.microsoft.com/office/drawing/2014/main" id="{BB1289D5-76F3-8A43-A742-2598CA0B9BEC}"/>
+              </a:ext>
+            </a:extLst>
+          </p:cNvPr>
+          <p:cNvCxnSpPr>
+            <a:cxnSpLocks/>
+          </p:cNvCxnSpPr>
+          <p:nvPr/>
+        </p:nvCxnSpPr>
+        <p:spPr>
+          <a:xfrm flipH="1">
+            <a:off x="4226616" y="3720397"/>
+            <a:ext cx="780378" cy="286387"/>
+          </a:xfrm>
+          <a:prstGeom prst="straightConnector1">
+            <a:avLst/>
+          </a:prstGeom>
+          <a:ln w="19050">
+            <a:tailEnd type="triangle"/>
+          </a:ln>
+        </p:spPr>
+        <p:style>
+          <a:lnRef idx="1">
+            <a:schemeClr val="accent1"/>
+          </a:lnRef>
+          <a:fillRef idx="0">
+            <a:schemeClr val="accent1"/>
+          </a:fillRef>
+          <a:effectRef idx="0">
+            <a:schemeClr val="accent1"/>
+          </a:effectRef>
+          <a:fontRef idx="minor">
+            <a:schemeClr val="tx1"/>
+          </a:fontRef>
+        </p:style>
+      </p:cxnSp>
+      <p:sp>
+        <p:nvSpPr>
+          <p:cNvPr id="49" name="Hexagon 48">
+            <a:extLst>
+              <a:ext uri="{FF2B5EF4-FFF2-40B4-BE49-F238E27FC236}">
+                <a16:creationId xmlns:a16="http://schemas.microsoft.com/office/drawing/2014/main" id="{D1EBF0EB-BBAA-2046-BDFB-9CA6C3A30FB7}"/>
+              </a:ext>
+            </a:extLst>
+          </p:cNvPr>
+          <p:cNvSpPr/>
+          <p:nvPr/>
+        </p:nvSpPr>
+        <p:spPr>
+          <a:xfrm>
+            <a:off x="2712651" y="3692298"/>
+            <a:ext cx="1614272" cy="1238261"/>
+          </a:xfrm>
+          <a:prstGeom prst="hexagon">
+            <a:avLst/>
+          </a:prstGeom>
+          <a:ln w="31750">
+            <a:solidFill>
+              <a:schemeClr val="tx1"/>
+            </a:solidFill>
+          </a:ln>
+        </p:spPr>
+        <p:style>
+          <a:lnRef idx="1">
+            <a:schemeClr val="accent6"/>
+          </a:lnRef>
+          <a:fillRef idx="2">
+            <a:schemeClr val="accent6"/>
+          </a:fillRef>
+          <a:effectRef idx="1">
+            <a:schemeClr val="accent6"/>
+          </a:effectRef>
+          <a:fontRef idx="minor">
+            <a:schemeClr val="dk1"/>
+          </a:fontRef>
+        </p:style>
+        <p:txBody>
+          <a:bodyPr lIns="36000" rIns="36000" rtlCol="0" anchor="ctr"/>
+          <a:lstStyle/>
+          <a:p>
+            <a:pPr algn="ctr"/>
+            <a:r>
+              <a:rPr lang="en-US"/>
+              <a:t>Sense:</a:t>
+            </a:r>
+            <a:br>
+              <a:rPr lang="en-US"/>
+            </a:br>
+            <a:r>
+              <a:rPr lang="en-US" b="1"/>
+              <a:t>bank.v.01</a:t>
+            </a:r>
+          </a:p>
+        </p:txBody>
+      </p:sp>
+      <p:cxnSp>
+        <p:nvCxnSpPr>
+          <p:cNvPr id="51" name="Straight Arrow Connector 50">
+            <a:extLst>
+              <a:ext uri="{FF2B5EF4-FFF2-40B4-BE49-F238E27FC236}">
+                <a16:creationId xmlns:a16="http://schemas.microsoft.com/office/drawing/2014/main" id="{4B500F91-96E3-DE46-BCC0-3A9AE3854927}"/>
+              </a:ext>
+            </a:extLst>
+          </p:cNvPr>
+          <p:cNvCxnSpPr>
+            <a:cxnSpLocks/>
+            <a:stCxn id="56" idx="6"/>
+            <a:endCxn id="49" idx="2"/>
+          </p:cNvCxnSpPr>
+          <p:nvPr/>
+        </p:nvCxnSpPr>
+        <p:spPr>
+          <a:xfrm flipV="1">
+            <a:off x="2312368" y="4930559"/>
+            <a:ext cx="709848" cy="906857"/>
+          </a:xfrm>
+          <a:prstGeom prst="straightConnector1">
+            <a:avLst/>
+          </a:prstGeom>
+          <a:ln w="19050">
+            <a:tailEnd type="triangle"/>
+          </a:ln>
+        </p:spPr>
+        <p:style>
+          <a:lnRef idx="1">
+            <a:schemeClr val="accent1"/>
+          </a:lnRef>
+          <a:fillRef idx="0">
+            <a:schemeClr val="accent1"/>
+          </a:fillRef>
+          <a:effectRef idx="0">
+            <a:schemeClr val="accent1"/>
+          </a:effectRef>
+          <a:fontRef idx="minor">
+            <a:schemeClr val="tx1"/>
+          </a:fontRef>
+        </p:style>
+      </p:cxnSp>
+      <p:cxnSp>
+        <p:nvCxnSpPr>
+          <p:cNvPr id="52" name="Straight Arrow Connector 51">
+            <a:extLst>
+              <a:ext uri="{FF2B5EF4-FFF2-40B4-BE49-F238E27FC236}">
+                <a16:creationId xmlns:a16="http://schemas.microsoft.com/office/drawing/2014/main" id="{AA01D027-5C06-BE4E-8578-1C273DF43995}"/>
+              </a:ext>
+            </a:extLst>
+          </p:cNvPr>
+          <p:cNvCxnSpPr>
+            <a:cxnSpLocks/>
+            <a:stCxn id="55" idx="4"/>
+            <a:endCxn id="49" idx="3"/>
+          </p:cNvCxnSpPr>
+          <p:nvPr/>
+        </p:nvCxnSpPr>
+        <p:spPr>
+          <a:xfrm flipV="1">
+            <a:off x="1321142" y="4311429"/>
+            <a:ext cx="1391509" cy="251167"/>
+          </a:xfrm>
+          <a:prstGeom prst="straightConnector1">
+            <a:avLst/>
+          </a:prstGeom>
+          <a:ln w="19050">
+            <a:tailEnd type="triangle"/>
+          </a:ln>
+        </p:spPr>
+        <p:style>
+          <a:lnRef idx="1">
+            <a:schemeClr val="accent1"/>
+          </a:lnRef>
+          <a:fillRef idx="0">
+            <a:schemeClr val="accent1"/>
+          </a:fillRef>
+          <a:effectRef idx="0">
+            <a:schemeClr val="accent1"/>
+          </a:effectRef>
+          <a:fontRef idx="minor">
+            <a:schemeClr val="tx1"/>
+          </a:fontRef>
+        </p:style>
+      </p:cxnSp>
+      <p:sp>
+        <p:nvSpPr>
+          <p:cNvPr id="54" name="TextBox 53">
+            <a:extLst>
+              <a:ext uri="{FF2B5EF4-FFF2-40B4-BE49-F238E27FC236}">
+                <a16:creationId xmlns:a16="http://schemas.microsoft.com/office/drawing/2014/main" id="{F2715D03-AEA4-2247-98AF-C765B304340A}"/>
+              </a:ext>
+            </a:extLst>
+          </p:cNvPr>
+          <p:cNvSpPr txBox="1"/>
+          <p:nvPr/>
+        </p:nvSpPr>
+        <p:spPr>
+          <a:xfrm flipH="1">
+            <a:off x="659259" y="3585028"/>
+            <a:ext cx="1307445" cy="369332"/>
+          </a:xfrm>
+          <a:prstGeom prst="rect">
+            <a:avLst/>
+          </a:prstGeom>
+          <a:noFill/>
+        </p:spPr>
+        <p:txBody>
+          <a:bodyPr wrap="square" rtlCol="0">
+            <a:spAutoFit/>
+          </a:bodyPr>
+          <a:lstStyle/>
+          <a:p>
+            <a:r>
+              <a:rPr lang="en-US" b="1" i="1"/>
+              <a:t>DEFINITION</a:t>
+            </a:r>
+            <a:endParaRPr lang="en-US" sz="1600" b="1" i="1"/>
+          </a:p>
+        </p:txBody>
+      </p:sp>
+      <p:sp>
+        <p:nvSpPr>
+          <p:cNvPr id="55" name="Oval 54">
+            <a:extLst>
+              <a:ext uri="{FF2B5EF4-FFF2-40B4-BE49-F238E27FC236}">
+                <a16:creationId xmlns:a16="http://schemas.microsoft.com/office/drawing/2014/main" id="{50C189DA-11E6-3047-BBF7-73DC07461BB7}"/>
+              </a:ext>
+            </a:extLst>
+          </p:cNvPr>
+          <p:cNvSpPr/>
+          <p:nvPr/>
+        </p:nvSpPr>
+        <p:spPr>
+          <a:xfrm>
+            <a:off x="533267" y="3888495"/>
+            <a:ext cx="1575749" cy="674101"/>
+          </a:xfrm>
+          <a:prstGeom prst="ellipse">
+            <a:avLst/>
+          </a:prstGeom>
+        </p:spPr>
+        <p:style>
+          <a:lnRef idx="1">
+            <a:schemeClr val="accent5"/>
+          </a:lnRef>
+          <a:fillRef idx="2">
+            <a:schemeClr val="accent5"/>
+          </a:fillRef>
+          <a:effectRef idx="1">
+            <a:schemeClr val="accent5"/>
+          </a:effectRef>
+          <a:fontRef idx="minor">
+            <a:schemeClr val="dk1"/>
+          </a:fontRef>
+        </p:style>
+        <p:txBody>
+          <a:bodyPr wrap="square" lIns="0" tIns="36000" rIns="0" bIns="36000" rtlCol="0" anchor="ctr"/>
+          <a:lstStyle/>
+          <a:p>
+            <a:pPr algn="ctr"/>
+            <a:r>
+              <a:rPr lang="en-US"/>
+              <a:t>tip laterally</a:t>
+            </a:r>
+          </a:p>
+        </p:txBody>
+      </p:sp>
+      <p:sp>
+        <p:nvSpPr>
+          <p:cNvPr id="56" name="Oval 55">
+            <a:extLst>
+              <a:ext uri="{FF2B5EF4-FFF2-40B4-BE49-F238E27FC236}">
+                <a16:creationId xmlns:a16="http://schemas.microsoft.com/office/drawing/2014/main" id="{DF88DED9-26A7-EB4E-B028-9DC4CB0AB9DB}"/>
+              </a:ext>
+            </a:extLst>
+          </p:cNvPr>
+          <p:cNvSpPr/>
+          <p:nvPr/>
+        </p:nvSpPr>
+        <p:spPr>
+          <a:xfrm>
+            <a:off x="419611" y="5193534"/>
+            <a:ext cx="1892757" cy="1287763"/>
+          </a:xfrm>
+          <a:prstGeom prst="ellipse">
+            <a:avLst/>
+          </a:prstGeom>
+        </p:spPr>
+        <p:style>
+          <a:lnRef idx="1">
+            <a:schemeClr val="accent5"/>
+          </a:lnRef>
+          <a:fillRef idx="3">
+            <a:schemeClr val="accent5"/>
+          </a:fillRef>
+          <a:effectRef idx="2">
+            <a:schemeClr val="accent5"/>
+          </a:effectRef>
+          <a:fontRef idx="minor">
+            <a:schemeClr val="lt1"/>
+          </a:fontRef>
+        </p:style>
+        <p:txBody>
+          <a:bodyPr rtlCol="0" anchor="ctr"/>
+          <a:lstStyle/>
+          <a:p>
+            <a:pPr algn="ctr"/>
+            <a:r>
+              <a:rPr lang="en-US"/>
+              <a:t>The pilot had to bank the aircraft</a:t>
+            </a:r>
+          </a:p>
+        </p:txBody>
+      </p:sp>
+      <p:sp>
+        <p:nvSpPr>
+          <p:cNvPr id="57" name="TextBox 56">
+            <a:extLst>
+              <a:ext uri="{FF2B5EF4-FFF2-40B4-BE49-F238E27FC236}">
+                <a16:creationId xmlns:a16="http://schemas.microsoft.com/office/drawing/2014/main" id="{0E328A0F-25B3-C343-995C-852E82BABCAC}"/>
+              </a:ext>
+            </a:extLst>
+          </p:cNvPr>
+          <p:cNvSpPr txBox="1"/>
+          <p:nvPr/>
+        </p:nvSpPr>
+        <p:spPr>
+          <a:xfrm flipH="1">
+            <a:off x="672602" y="4888817"/>
+            <a:ext cx="1307445" cy="369332"/>
+          </a:xfrm>
+          <a:prstGeom prst="rect">
+            <a:avLst/>
+          </a:prstGeom>
+          <a:noFill/>
+        </p:spPr>
+        <p:txBody>
+          <a:bodyPr wrap="square" rtlCol="0">
+            <a:spAutoFit/>
+          </a:bodyPr>
+          <a:lstStyle/>
+          <a:p>
+            <a:r>
+              <a:rPr lang="en-US" b="1" i="1"/>
+              <a:t>EXAMPLE</a:t>
+            </a:r>
+          </a:p>
+        </p:txBody>
+      </p:sp>
+      <p:cxnSp>
+        <p:nvCxnSpPr>
+          <p:cNvPr id="64" name="Straight Arrow Connector 63">
+            <a:extLst>
+              <a:ext uri="{FF2B5EF4-FFF2-40B4-BE49-F238E27FC236}">
+                <a16:creationId xmlns:a16="http://schemas.microsoft.com/office/drawing/2014/main" id="{19A6CFC1-A0B8-3349-B081-798D28C78933}"/>
+              </a:ext>
+            </a:extLst>
+          </p:cNvPr>
+          <p:cNvCxnSpPr>
+            <a:cxnSpLocks/>
+          </p:cNvCxnSpPr>
+          <p:nvPr/>
+        </p:nvCxnSpPr>
+        <p:spPr>
+          <a:xfrm>
+            <a:off x="6203867" y="3177222"/>
+            <a:ext cx="1035793" cy="659555"/>
+          </a:xfrm>
+          <a:prstGeom prst="straightConnector1">
+            <a:avLst/>
+          </a:prstGeom>
+          <a:ln w="19050">
+            <a:tailEnd type="triangle"/>
+          </a:ln>
+        </p:spPr>
+        <p:style>
+          <a:lnRef idx="1">
+            <a:schemeClr val="accent1"/>
+          </a:lnRef>
+          <a:fillRef idx="0">
+            <a:schemeClr val="accent1"/>
+          </a:fillRef>
+          <a:effectRef idx="0">
+            <a:schemeClr val="accent1"/>
+          </a:effectRef>
+          <a:fontRef idx="minor">
+            <a:schemeClr val="tx1"/>
+          </a:fontRef>
+        </p:style>
+      </p:cxnSp>
+      <p:cxnSp>
+        <p:nvCxnSpPr>
+          <p:cNvPr id="68" name="Straight Arrow Connector 67">
+            <a:extLst>
+              <a:ext uri="{FF2B5EF4-FFF2-40B4-BE49-F238E27FC236}">
+                <a16:creationId xmlns:a16="http://schemas.microsoft.com/office/drawing/2014/main" id="{925EAE22-773D-9D4C-ADA4-F06298C02A8D}"/>
+              </a:ext>
+            </a:extLst>
+          </p:cNvPr>
+          <p:cNvCxnSpPr>
+            <a:cxnSpLocks/>
+          </p:cNvCxnSpPr>
+          <p:nvPr/>
+        </p:nvCxnSpPr>
+        <p:spPr>
+          <a:xfrm flipH="1" flipV="1">
+            <a:off x="8239391" y="3019644"/>
+            <a:ext cx="1185940" cy="2090910"/>
+          </a:xfrm>
+          <a:prstGeom prst="straightConnector1">
+            <a:avLst/>
+          </a:prstGeom>
+          <a:ln w="19050">
+            <a:tailEnd type="triangle"/>
+          </a:ln>
+        </p:spPr>
+        <p:style>
+          <a:lnRef idx="1">
+            <a:schemeClr val="accent1"/>
+          </a:lnRef>
+          <a:fillRef idx="0">
+            <a:schemeClr val="accent1"/>
+          </a:fillRef>
+          <a:effectRef idx="0">
+            <a:schemeClr val="accent1"/>
+          </a:effectRef>
+          <a:fontRef idx="minor">
+            <a:schemeClr val="tx1"/>
+          </a:fontRef>
+        </p:style>
+      </p:cxnSp>
+      <p:sp>
+        <p:nvSpPr>
+          <p:cNvPr id="41" name="TextBox 40">
+            <a:extLst>
+              <a:ext uri="{FF2B5EF4-FFF2-40B4-BE49-F238E27FC236}">
+                <a16:creationId xmlns:a16="http://schemas.microsoft.com/office/drawing/2014/main" id="{A9BF5FBB-47B0-7A4A-8533-6AEE368170F0}"/>
+              </a:ext>
+            </a:extLst>
+          </p:cNvPr>
+          <p:cNvSpPr txBox="1"/>
+          <p:nvPr/>
+        </p:nvSpPr>
+        <p:spPr>
+          <a:xfrm>
+            <a:off x="8937150" y="5033011"/>
+            <a:ext cx="2445258" cy="646331"/>
+          </a:xfrm>
+          <a:prstGeom prst="rect">
+            <a:avLst/>
+          </a:prstGeom>
+          <a:noFill/>
+        </p:spPr>
+        <p:txBody>
+          <a:bodyPr wrap="square" rtlCol="0">
+            <a:spAutoFit/>
+          </a:bodyPr>
+          <a:lstStyle/>
+          <a:p>
+            <a:r>
+              <a:rPr lang="en-US"/>
+              <a:t>Other definitions,</a:t>
+            </a:r>
+            <a:br>
+              <a:rPr lang="en-US"/>
+            </a:br>
+            <a:r>
+              <a:rPr lang="en-US"/>
+              <a:t>other examples, etc.</a:t>
+            </a:r>
+          </a:p>
+        </p:txBody>
+      </p:sp>
+      <p:sp>
+        <p:nvSpPr>
+          <p:cNvPr id="78" name="TextBox 77">
+            <a:extLst>
+              <a:ext uri="{FF2B5EF4-FFF2-40B4-BE49-F238E27FC236}">
+                <a16:creationId xmlns:a16="http://schemas.microsoft.com/office/drawing/2014/main" id="{79F10526-E17C-7241-BC05-8B51B4401015}"/>
+              </a:ext>
+            </a:extLst>
+          </p:cNvPr>
+          <p:cNvSpPr txBox="1"/>
+          <p:nvPr/>
+        </p:nvSpPr>
+        <p:spPr>
+          <a:xfrm>
+            <a:off x="6863708" y="3828428"/>
+            <a:ext cx="2445258" cy="369332"/>
+          </a:xfrm>
+          <a:prstGeom prst="rect">
+            <a:avLst/>
+          </a:prstGeom>
+          <a:noFill/>
+        </p:spPr>
+        <p:txBody>
+          <a:bodyPr wrap="square" rtlCol="0">
+            <a:spAutoFit/>
+          </a:bodyPr>
+          <a:lstStyle/>
+          <a:p>
+            <a:r>
+              <a:rPr lang="en-US"/>
+              <a:t>Other senses, etc.</a:t>
+            </a:r>
+          </a:p>
+        </p:txBody>
+      </p:sp>
+    </p:spTree>
+    <p:extLst>
+      <p:ext uri="{BB962C8B-B14F-4D97-AF65-F5344CB8AC3E}">
+        <p14:creationId xmlns:p14="http://schemas.microsoft.com/office/powerpoint/2010/main" val="2985392574"/>
+      </p:ext>
+    </p:extLst>
+  </p:cSld>
+  <p:clrMapOvr>
+    <a:masterClrMapping/>
+  </p:clrMapOvr>
+</p:sld>
+</file>
+
 <file path=ppt/theme/theme1.xml><?xml version="1.0" encoding="utf-8"?>
 <a:theme xmlns:a="http://schemas.openxmlformats.org/drawingml/2006/main" name="Office Theme">
   <a:themeElements>
@@ -8278,4 +11991,299 @@
     </a:ext>
   </a:extLst>
 </a:theme>
+</file>
+
+<file path=ppt/theme/theme2.xml><?xml version="1.0" encoding="utf-8"?>
+<a:theme xmlns:a="http://schemas.openxmlformats.org/drawingml/2006/main" name="Office Theme">
+  <a:themeElements>
+    <a:clrScheme name="Office">
+      <a:dk1>
+        <a:sysClr val="windowText" lastClr="000000"/>
+      </a:dk1>
+      <a:lt1>
+        <a:sysClr val="window" lastClr="FFFFFF"/>
+      </a:lt1>
+      <a:dk2>
+        <a:srgbClr val="44546A"/>
+      </a:dk2>
+      <a:lt2>
+        <a:srgbClr val="E7E6E6"/>
+      </a:lt2>
+      <a:accent1>
+        <a:srgbClr val="4472C4"/>
+      </a:accent1>
+      <a:accent2>
+        <a:srgbClr val="ED7D31"/>
+      </a:accent2>
+      <a:accent3>
+        <a:srgbClr val="A5A5A5"/>
+      </a:accent3>
+      <a:accent4>
+        <a:srgbClr val="FFC000"/>
+      </a:accent4>
+      <a:accent5>
+        <a:srgbClr val="5B9BD5"/>
+      </a:accent5>
+      <a:accent6>
+        <a:srgbClr val="70AD47"/>
+      </a:accent6>
+      <a:hlink>
+        <a:srgbClr val="0563C1"/>
+      </a:hlink>
+      <a:folHlink>
+        <a:srgbClr val="954F72"/>
+      </a:folHlink>
+    </a:clrScheme>
+    <a:fontScheme name="Office">
+      <a:majorFont>
+        <a:latin typeface="Calibri Light" panose="020F0302020204030204"/>
+        <a:ea typeface=""/>
+        <a:cs typeface=""/>
+        <a:font script="Jpan" typeface="游ゴシック Light"/>
+        <a:font script="Hang" typeface="맑은 고딕"/>
+        <a:font script="Hans" typeface="等线 Light"/>
+        <a:font script="Hant" typeface="新細明體"/>
+        <a:font script="Arab" typeface="Times New Roman"/>
+        <a:font script="Hebr" typeface="Times New Roman"/>
+        <a:font script="Thai" typeface="Angsana New"/>
+        <a:font script="Ethi" typeface="Nyala"/>
+        <a:font script="Beng" typeface="Vrinda"/>
+        <a:font script="Gujr" typeface="Shruti"/>
+        <a:font script="Khmr" typeface="MoolBoran"/>
+        <a:font script="Knda" typeface="Tunga"/>
+        <a:font script="Guru" typeface="Raavi"/>
+        <a:font script="Cans" typeface="Euphemia"/>
+        <a:font script="Cher" typeface="Plantagenet Cherokee"/>
+        <a:font script="Yiii" typeface="Microsoft Yi Baiti"/>
+        <a:font script="Tibt" typeface="Microsoft Himalaya"/>
+        <a:font script="Thaa" typeface="MV Boli"/>
+        <a:font script="Deva" typeface="Mangal"/>
+        <a:font script="Telu" typeface="Gautami"/>
+        <a:font script="Taml" typeface="Latha"/>
+        <a:font script="Syrc" typeface="Estrangelo Edessa"/>
+        <a:font script="Orya" typeface="Kalinga"/>
+        <a:font script="Mlym" typeface="Kartika"/>
+        <a:font script="Laoo" typeface="DokChampa"/>
+        <a:font script="Sinh" typeface="Iskoola Pota"/>
+        <a:font script="Mong" typeface="Mongolian Baiti"/>
+        <a:font script="Viet" typeface="Times New Roman"/>
+        <a:font script="Uigh" typeface="Microsoft Uighur"/>
+        <a:font script="Geor" typeface="Sylfaen"/>
+        <a:font script="Armn" typeface="Arial"/>
+        <a:font script="Bugi" typeface="Leelawadee UI"/>
+        <a:font script="Bopo" typeface="Microsoft JhengHei"/>
+        <a:font script="Java" typeface="Javanese Text"/>
+        <a:font script="Lisu" typeface="Segoe UI"/>
+        <a:font script="Mymr" typeface="Myanmar Text"/>
+        <a:font script="Nkoo" typeface="Ebrima"/>
+        <a:font script="Olck" typeface="Nirmala UI"/>
+        <a:font script="Osma" typeface="Ebrima"/>
+        <a:font script="Phag" typeface="Phagspa"/>
+        <a:font script="Syrn" typeface="Estrangelo Edessa"/>
+        <a:font script="Syrj" typeface="Estrangelo Edessa"/>
+        <a:font script="Syre" typeface="Estrangelo Edessa"/>
+        <a:font script="Sora" typeface="Nirmala UI"/>
+        <a:font script="Tale" typeface="Microsoft Tai Le"/>
+        <a:font script="Talu" typeface="Microsoft New Tai Lue"/>
+        <a:font script="Tfng" typeface="Ebrima"/>
+      </a:majorFont>
+      <a:minorFont>
+        <a:latin typeface="Calibri" panose="020F0502020204030204"/>
+        <a:ea typeface=""/>
+        <a:cs typeface=""/>
+        <a:font script="Jpan" typeface="游ゴシック"/>
+        <a:font script="Hang" typeface="맑은 고딕"/>
+        <a:font script="Hans" typeface="等线"/>
+        <a:font script="Hant" typeface="新細明體"/>
+        <a:font script="Arab" typeface="Arial"/>
+        <a:font script="Hebr" typeface="Arial"/>
+        <a:font script="Thai" typeface="Cordia New"/>
+        <a:font script="Ethi" typeface="Nyala"/>
+        <a:font script="Beng" typeface="Vrinda"/>
+        <a:font script="Gujr" typeface="Shruti"/>
+        <a:font script="Khmr" typeface="DaunPenh"/>
+        <a:font script="Knda" typeface="Tunga"/>
+        <a:font script="Guru" typeface="Raavi"/>
+        <a:font script="Cans" typeface="Euphemia"/>
+        <a:font script="Cher" typeface="Plantagenet Cherokee"/>
+        <a:font script="Yiii" typeface="Microsoft Yi Baiti"/>
+        <a:font script="Tibt" typeface="Microsoft Himalaya"/>
+        <a:font script="Thaa" typeface="MV Boli"/>
+        <a:font script="Deva" typeface="Mangal"/>
+        <a:font script="Telu" typeface="Gautami"/>
+        <a:font script="Taml" typeface="Latha"/>
+        <a:font script="Syrc" typeface="Estrangelo Edessa"/>
+        <a:font script="Orya" typeface="Kalinga"/>
+        <a:font script="Mlym" typeface="Kartika"/>
+        <a:font script="Laoo" typeface="DokChampa"/>
+        <a:font script="Sinh" typeface="Iskoola Pota"/>
+        <a:font script="Mong" typeface="Mongolian Baiti"/>
+        <a:font script="Viet" typeface="Arial"/>
+        <a:font script="Uigh" typeface="Microsoft Uighur"/>
+        <a:font script="Geor" typeface="Sylfaen"/>
+        <a:font script="Armn" typeface="Arial"/>
+        <a:font script="Bugi" typeface="Leelawadee UI"/>
+        <a:font script="Bopo" typeface="Microsoft JhengHei"/>
+        <a:font script="Java" typeface="Javanese Text"/>
+        <a:font script="Lisu" typeface="Segoe UI"/>
+        <a:font script="Mymr" typeface="Myanmar Text"/>
+        <a:font script="Nkoo" typeface="Ebrima"/>
+        <a:font script="Olck" typeface="Nirmala UI"/>
+        <a:font script="Osma" typeface="Ebrima"/>
+        <a:font script="Phag" typeface="Phagspa"/>
+        <a:font script="Syrn" typeface="Estrangelo Edessa"/>
+        <a:font script="Syrj" typeface="Estrangelo Edessa"/>
+        <a:font script="Syre" typeface="Estrangelo Edessa"/>
+        <a:font script="Sora" typeface="Nirmala UI"/>
+        <a:font script="Tale" typeface="Microsoft Tai Le"/>
+        <a:font script="Talu" typeface="Microsoft New Tai Lue"/>
+        <a:font script="Tfng" typeface="Ebrima"/>
+      </a:minorFont>
+    </a:fontScheme>
+    <a:fmtScheme name="Office">
+      <a:fillStyleLst>
+        <a:solidFill>
+          <a:schemeClr val="phClr"/>
+        </a:solidFill>
+        <a:gradFill rotWithShape="1">
+          <a:gsLst>
+            <a:gs pos="0">
+              <a:schemeClr val="phClr">
+                <a:lumMod val="110000"/>
+                <a:satMod val="105000"/>
+                <a:tint val="67000"/>
+              </a:schemeClr>
+            </a:gs>
+            <a:gs pos="50000">
+              <a:schemeClr val="phClr">
+                <a:lumMod val="105000"/>
+                <a:satMod val="103000"/>
+                <a:tint val="73000"/>
+              </a:schemeClr>
+            </a:gs>
+            <a:gs pos="100000">
+              <a:schemeClr val="phClr">
+                <a:lumMod val="105000"/>
+                <a:satMod val="109000"/>
+                <a:tint val="81000"/>
+              </a:schemeClr>
+            </a:gs>
+          </a:gsLst>
+          <a:lin ang="5400000" scaled="0"/>
+        </a:gradFill>
+        <a:gradFill rotWithShape="1">
+          <a:gsLst>
+            <a:gs pos="0">
+              <a:schemeClr val="phClr">
+                <a:satMod val="103000"/>
+                <a:lumMod val="102000"/>
+                <a:tint val="94000"/>
+              </a:schemeClr>
+            </a:gs>
+            <a:gs pos="50000">
+              <a:schemeClr val="phClr">
+                <a:satMod val="110000"/>
+                <a:lumMod val="100000"/>
+                <a:shade val="100000"/>
+              </a:schemeClr>
+            </a:gs>
+            <a:gs pos="100000">
+              <a:schemeClr val="phClr">
+                <a:lumMod val="99000"/>
+                <a:satMod val="120000"/>
+                <a:shade val="78000"/>
+              </a:schemeClr>
+            </a:gs>
+          </a:gsLst>
+          <a:lin ang="5400000" scaled="0"/>
+        </a:gradFill>
+      </a:fillStyleLst>
+      <a:lnStyleLst>
+        <a:ln w="6350" cap="flat" cmpd="sng" algn="ctr">
+          <a:solidFill>
+            <a:schemeClr val="phClr"/>
+          </a:solidFill>
+          <a:prstDash val="solid"/>
+          <a:miter lim="800000"/>
+        </a:ln>
+        <a:ln w="12700" cap="flat" cmpd="sng" algn="ctr">
+          <a:solidFill>
+            <a:schemeClr val="phClr"/>
+          </a:solidFill>
+          <a:prstDash val="solid"/>
+          <a:miter lim="800000"/>
+        </a:ln>
+        <a:ln w="19050" cap="flat" cmpd="sng" algn="ctr">
+          <a:solidFill>
+            <a:schemeClr val="phClr"/>
+          </a:solidFill>
+          <a:prstDash val="solid"/>
+          <a:miter lim="800000"/>
+        </a:ln>
+      </a:lnStyleLst>
+      <a:effectStyleLst>
+        <a:effectStyle>
+          <a:effectLst/>
+        </a:effectStyle>
+        <a:effectStyle>
+          <a:effectLst/>
+        </a:effectStyle>
+        <a:effectStyle>
+          <a:effectLst>
+            <a:outerShdw blurRad="57150" dist="19050" dir="5400000" algn="ctr" rotWithShape="0">
+              <a:srgbClr val="000000">
+                <a:alpha val="63000"/>
+              </a:srgbClr>
+            </a:outerShdw>
+          </a:effectLst>
+        </a:effectStyle>
+      </a:effectStyleLst>
+      <a:bgFillStyleLst>
+        <a:solidFill>
+          <a:schemeClr val="phClr"/>
+        </a:solidFill>
+        <a:solidFill>
+          <a:schemeClr val="phClr">
+            <a:tint val="95000"/>
+            <a:satMod val="170000"/>
+          </a:schemeClr>
+        </a:solidFill>
+        <a:gradFill rotWithShape="1">
+          <a:gsLst>
+            <a:gs pos="0">
+              <a:schemeClr val="phClr">
+                <a:tint val="93000"/>
+                <a:satMod val="150000"/>
+                <a:shade val="98000"/>
+                <a:lumMod val="102000"/>
+              </a:schemeClr>
+            </a:gs>
+            <a:gs pos="50000">
+              <a:schemeClr val="phClr">
+                <a:tint val="98000"/>
+                <a:satMod val="130000"/>
+                <a:shade val="90000"/>
+                <a:lumMod val="103000"/>
+              </a:schemeClr>
+            </a:gs>
+            <a:gs pos="100000">
+              <a:schemeClr val="phClr">
+                <a:shade val="63000"/>
+                <a:satMod val="120000"/>
+              </a:schemeClr>
+            </a:gs>
+          </a:gsLst>
+          <a:lin ang="5400000" scaled="0"/>
+        </a:gradFill>
+      </a:bgFillStyleLst>
+    </a:fmtScheme>
+  </a:themeElements>
+  <a:objectDefaults/>
+  <a:extraClrSchemeLst/>
+  <a:extLst>
+    <a:ext uri="{05A4C25C-085E-4340-85A3-A5531E510DB2}">
+      <thm15:themeFamily xmlns:thm15="http://schemas.microsoft.com/office/thememl/2012/main" name="Office Theme" id="{62F939B6-93AF-4DB8-9C6B-D6C7DFDC589F}" vid="{4A3C46E8-61CC-4603-A589-7422A47A8E4A}"/>
+    </a:ext>
+  </a:extLst>
+</a:theme>
 </file>
</xml_diff>

<commit_message>
=Graph version 2.0 now works as intended. Pipeline executed, graphs created. Must move on with model (warning: inflected, lemmas & senses...)
Former-commit-id: 50fe4068d2a7450512657909e564b2d279b994ef [formerly d903a59dfef157a00cbcdc147480511040da1619]
Former-commit-id: 77f5adec06cccb126226ed6217127f501e5b549f
Former-commit-id: ed2dc4f5b71672b313ae2495770ebc7cb22b13a0
</commit_message>
<xml_diff>
--- a/Media/Plan_Task1.pptx
+++ b/Media/Plan_Task1.pptx
@@ -199,7 +199,7 @@
           </a:lstStyle>
           <a:p>
             <a:fld id="{074A7C60-B66F-6647-A862-700E380C2D75}" type="datetimeFigureOut">
-              <a:t>5/24/20</a:t>
+              <a:t>12.10.2020</a:t>
             </a:fld>
             <a:endParaRPr lang="en-US"/>
           </a:p>
@@ -780,7 +780,7 @@
           <a:lstStyle/>
           <a:p>
             <a:fld id="{803220A4-8895-6D46-A558-2CE2469121C7}" type="datetimeFigureOut">
-              <a:t>5/24/20</a:t>
+              <a:t>12.10.2020</a:t>
             </a:fld>
             <a:endParaRPr lang="en-US"/>
           </a:p>
@@ -978,7 +978,7 @@
           <a:lstStyle/>
           <a:p>
             <a:fld id="{803220A4-8895-6D46-A558-2CE2469121C7}" type="datetimeFigureOut">
-              <a:t>5/24/20</a:t>
+              <a:t>12.10.2020</a:t>
             </a:fld>
             <a:endParaRPr lang="en-US"/>
           </a:p>
@@ -1186,7 +1186,7 @@
           <a:lstStyle/>
           <a:p>
             <a:fld id="{803220A4-8895-6D46-A558-2CE2469121C7}" type="datetimeFigureOut">
-              <a:t>5/24/20</a:t>
+              <a:t>12.10.2020</a:t>
             </a:fld>
             <a:endParaRPr lang="en-US"/>
           </a:p>
@@ -1384,7 +1384,7 @@
           <a:lstStyle/>
           <a:p>
             <a:fld id="{803220A4-8895-6D46-A558-2CE2469121C7}" type="datetimeFigureOut">
-              <a:t>5/24/20</a:t>
+              <a:t>12.10.2020</a:t>
             </a:fld>
             <a:endParaRPr lang="en-US"/>
           </a:p>
@@ -1658,7 +1658,7 @@
           <a:lstStyle/>
           <a:p>
             <a:fld id="{803220A4-8895-6D46-A558-2CE2469121C7}" type="datetimeFigureOut">
-              <a:t>5/24/20</a:t>
+              <a:t>12.10.2020</a:t>
             </a:fld>
             <a:endParaRPr lang="en-US"/>
           </a:p>
@@ -1924,7 +1924,7 @@
           <a:lstStyle/>
           <a:p>
             <a:fld id="{803220A4-8895-6D46-A558-2CE2469121C7}" type="datetimeFigureOut">
-              <a:t>5/24/20</a:t>
+              <a:t>12.10.2020</a:t>
             </a:fld>
             <a:endParaRPr lang="en-US"/>
           </a:p>
@@ -2337,7 +2337,7 @@
           <a:lstStyle/>
           <a:p>
             <a:fld id="{803220A4-8895-6D46-A558-2CE2469121C7}" type="datetimeFigureOut">
-              <a:t>5/24/20</a:t>
+              <a:t>12.10.2020</a:t>
             </a:fld>
             <a:endParaRPr lang="en-US"/>
           </a:p>
@@ -2477,7 +2477,7 @@
           <a:lstStyle/>
           <a:p>
             <a:fld id="{803220A4-8895-6D46-A558-2CE2469121C7}" type="datetimeFigureOut">
-              <a:t>5/24/20</a:t>
+              <a:t>12.10.2020</a:t>
             </a:fld>
             <a:endParaRPr lang="en-US"/>
           </a:p>
@@ -2588,7 +2588,7 @@
           <a:lstStyle/>
           <a:p>
             <a:fld id="{803220A4-8895-6D46-A558-2CE2469121C7}" type="datetimeFigureOut">
-              <a:t>5/24/20</a:t>
+              <a:t>12.10.2020</a:t>
             </a:fld>
             <a:endParaRPr lang="en-US"/>
           </a:p>
@@ -2899,7 +2899,7 @@
           <a:lstStyle/>
           <a:p>
             <a:fld id="{803220A4-8895-6D46-A558-2CE2469121C7}" type="datetimeFigureOut">
-              <a:t>5/24/20</a:t>
+              <a:t>12.10.2020</a:t>
             </a:fld>
             <a:endParaRPr lang="en-US"/>
           </a:p>
@@ -3186,7 +3186,7 @@
           <a:lstStyle/>
           <a:p>
             <a:fld id="{803220A4-8895-6D46-A558-2CE2469121C7}" type="datetimeFigureOut">
-              <a:t>5/24/20</a:t>
+              <a:t>12.10.2020</a:t>
             </a:fld>
             <a:endParaRPr lang="en-US"/>
           </a:p>
@@ -3427,7 +3427,7 @@
           </a:lstStyle>
           <a:p>
             <a:fld id="{803220A4-8895-6D46-A558-2CE2469121C7}" type="datetimeFigureOut">
-              <a:t>5/24/20</a:t>
+              <a:t>12.10.2020</a:t>
             </a:fld>
             <a:endParaRPr lang="en-US"/>
           </a:p>
@@ -10653,7 +10653,7 @@
             <a:pPr algn="ctr"/>
             <a:r>
               <a:rPr lang="en-US" sz="2400" b="1"/>
-              <a:t>row</a:t>
+              <a:t>banks</a:t>
             </a:r>
             <a:endParaRPr lang="en-US" b="1"/>
           </a:p>
@@ -10900,7 +10900,7 @@
         </p:nvSpPr>
         <p:spPr>
           <a:xfrm flipH="1">
-            <a:off x="6729103" y="4884333"/>
+            <a:off x="6877791" y="4882465"/>
             <a:ext cx="1307445" cy="369332"/>
           </a:xfrm>
           <a:prstGeom prst="rect">
@@ -10916,7 +10916,7 @@
           <a:p>
             <a:r>
               <a:rPr lang="en-US" b="1" i="1"/>
-              <a:t>SYNONYM</a:t>
+              <a:t>LEMMA</a:t>
             </a:r>
           </a:p>
         </p:txBody>

</xml_diff>